<commit_message>
Updated presentation (colors approved by Fränzi, removed some slides)
</commit_message>
<xml_diff>
--- a/Project Pink/doc/task01/Presentation - CS Task 1.pptx
+++ b/Project Pink/doc/task01/Presentation - CS Task 1.pptx
@@ -5,22 +5,19 @@
     <p:sldMasterId id="2147483648" r:id="rId1"/>
   </p:sldMasterIdLst>
   <p:notesMasterIdLst>
-    <p:notesMasterId r:id="rId15"/>
+    <p:notesMasterId r:id="rId12"/>
   </p:notesMasterIdLst>
   <p:sldIdLst>
     <p:sldId id="256" r:id="rId2"/>
-    <p:sldId id="257" r:id="rId3"/>
-    <p:sldId id="258" r:id="rId4"/>
-    <p:sldId id="260" r:id="rId5"/>
-    <p:sldId id="261" r:id="rId6"/>
-    <p:sldId id="263" r:id="rId7"/>
-    <p:sldId id="262" r:id="rId8"/>
-    <p:sldId id="264" r:id="rId9"/>
-    <p:sldId id="265" r:id="rId10"/>
-    <p:sldId id="266" r:id="rId11"/>
-    <p:sldId id="267" r:id="rId12"/>
-    <p:sldId id="268" r:id="rId13"/>
-    <p:sldId id="270" r:id="rId14"/>
+    <p:sldId id="258" r:id="rId3"/>
+    <p:sldId id="260" r:id="rId4"/>
+    <p:sldId id="261" r:id="rId5"/>
+    <p:sldId id="262" r:id="rId6"/>
+    <p:sldId id="264" r:id="rId7"/>
+    <p:sldId id="265" r:id="rId8"/>
+    <p:sldId id="266" r:id="rId9"/>
+    <p:sldId id="267" r:id="rId10"/>
+    <p:sldId id="268" r:id="rId11"/>
   </p:sldIdLst>
   <p:sldSz cx="9144000" cy="6858000" type="screen4x3"/>
   <p:notesSz cx="6858000" cy="9144000"/>
@@ -2497,7 +2494,7 @@
         <a:p>
           <a:r>
             <a:rPr lang="en-US" dirty="0" smtClean="0"/>
-            <a:t>Calendar</a:t>
+            <a:t>Appointments</a:t>
           </a:r>
           <a:endParaRPr lang="en-US" dirty="0"/>
         </a:p>
@@ -2571,7 +2568,7 @@
         <a:p>
           <a:r>
             <a:rPr lang="en-US" dirty="0" smtClean="0"/>
-            <a:t>Security</a:t>
+            <a:t>Security / Availability</a:t>
           </a:r>
           <a:endParaRPr lang="en-US" dirty="0"/>
         </a:p>
@@ -2607,6 +2604,13 @@
         </dgm:presLayoutVars>
       </dgm:prSet>
       <dgm:spPr/>
+      <dgm:t>
+        <a:bodyPr/>
+        <a:lstStyle/>
+        <a:p>
+          <a:endParaRPr lang="en-US"/>
+        </a:p>
+      </dgm:t>
     </dgm:pt>
     <dgm:pt modelId="{FB7A09C5-3EB6-D64E-AD07-D400418956C9}" type="pres">
       <dgm:prSet presAssocID="{F70DD82F-CAA9-F34B-9AF7-B922DE46369B}" presName="node" presStyleLbl="node1" presStyleIdx="0" presStyleCnt="6">
@@ -2710,22 +2714,29 @@
         </dgm:presLayoutVars>
       </dgm:prSet>
       <dgm:spPr/>
+      <dgm:t>
+        <a:bodyPr/>
+        <a:lstStyle/>
+        <a:p>
+          <a:endParaRPr lang="en-US"/>
+        </a:p>
+      </dgm:t>
     </dgm:pt>
   </dgm:ptLst>
   <dgm:cxnLst>
+    <dgm:cxn modelId="{50AEAB1C-F635-214C-BBE0-2D08CC50E872}" type="presOf" srcId="{60F475E4-09BB-BA47-A035-CD72F696976E}" destId="{14DA647D-CCE7-B645-ADDF-FE387A16FBB8}" srcOrd="0" destOrd="0" presId="urn:microsoft.com/office/officeart/2005/8/layout/default"/>
+    <dgm:cxn modelId="{375E2398-9132-9943-996A-485371DFF0E4}" srcId="{A557E678-8B76-BA42-8E58-CCD29F8CE914}" destId="{FF962DAA-31CB-D944-9327-BBE587A1CB0A}" srcOrd="2" destOrd="0" parTransId="{E612DA32-A795-FB4C-A20C-0E853132AFD0}" sibTransId="{DC778294-A926-B841-8166-4A46EE6D014C}"/>
+    <dgm:cxn modelId="{C75342F7-2FEB-B74D-8E8F-8901FECCFD5E}" type="presOf" srcId="{D5842269-86DD-AC44-86AB-12FFB8B7D054}" destId="{1360C53F-BB0E-7141-848F-5FAC756425A2}" srcOrd="0" destOrd="0" presId="urn:microsoft.com/office/officeart/2005/8/layout/default"/>
+    <dgm:cxn modelId="{2B9DE33F-DEE1-4F48-B79F-8AC35C493A73}" type="presOf" srcId="{F70DD82F-CAA9-F34B-9AF7-B922DE46369B}" destId="{FB7A09C5-3EB6-D64E-AD07-D400418956C9}" srcOrd="0" destOrd="0" presId="urn:microsoft.com/office/officeart/2005/8/layout/default"/>
+    <dgm:cxn modelId="{B1373FEE-6403-E74B-A2AE-B3EA80BF1E49}" type="presOf" srcId="{FF962DAA-31CB-D944-9327-BBE587A1CB0A}" destId="{E74B41FA-F320-8A41-8026-A5B13F2F9C1E}" srcOrd="0" destOrd="0" presId="urn:microsoft.com/office/officeart/2005/8/layout/default"/>
     <dgm:cxn modelId="{C57D7CA3-0656-4B46-9F31-6DCB1EBED36C}" srcId="{A557E678-8B76-BA42-8E58-CCD29F8CE914}" destId="{F70DD82F-CAA9-F34B-9AF7-B922DE46369B}" srcOrd="0" destOrd="0" parTransId="{5E8A10B3-1D51-1449-8C6B-660069989495}" sibTransId="{EE27F17E-A623-4A41-AFB6-EF47B5E037DA}"/>
-    <dgm:cxn modelId="{375E2398-9132-9943-996A-485371DFF0E4}" srcId="{A557E678-8B76-BA42-8E58-CCD29F8CE914}" destId="{FF962DAA-31CB-D944-9327-BBE587A1CB0A}" srcOrd="2" destOrd="0" parTransId="{E612DA32-A795-FB4C-A20C-0E853132AFD0}" sibTransId="{DC778294-A926-B841-8166-4A46EE6D014C}"/>
-    <dgm:cxn modelId="{2B9DE33F-DEE1-4F48-B79F-8AC35C493A73}" type="presOf" srcId="{F70DD82F-CAA9-F34B-9AF7-B922DE46369B}" destId="{FB7A09C5-3EB6-D64E-AD07-D400418956C9}" srcOrd="0" destOrd="0" presId="urn:microsoft.com/office/officeart/2005/8/layout/default"/>
-    <dgm:cxn modelId="{C75342F7-2FEB-B74D-8E8F-8901FECCFD5E}" type="presOf" srcId="{D5842269-86DD-AC44-86AB-12FFB8B7D054}" destId="{1360C53F-BB0E-7141-848F-5FAC756425A2}" srcOrd="0" destOrd="0" presId="urn:microsoft.com/office/officeart/2005/8/layout/default"/>
+    <dgm:cxn modelId="{CCB12CE7-E8ED-C044-B7E0-1BE56789BC75}" type="presOf" srcId="{2A334FA2-9A29-8146-AD6A-FDF6D797CB67}" destId="{E1821030-DEC0-A048-8788-8724D4ACACB4}" srcOrd="0" destOrd="0" presId="urn:microsoft.com/office/officeart/2005/8/layout/default"/>
+    <dgm:cxn modelId="{88FCFF81-97BF-0E4B-88C5-FAD7A3F127DB}" srcId="{A557E678-8B76-BA42-8E58-CCD29F8CE914}" destId="{D5842269-86DD-AC44-86AB-12FFB8B7D054}" srcOrd="1" destOrd="0" parTransId="{94EB76E9-9E8D-9441-8C88-D4C6DA20EF0A}" sibTransId="{9673C431-6ADD-E64D-A455-2BD038E69FED}"/>
     <dgm:cxn modelId="{654F820F-F980-F94F-9669-DB2E59F14405}" type="presOf" srcId="{14FB72F5-EB58-F54F-A01F-28F49443774E}" destId="{5C5B8154-AFD6-6742-B4B6-517B15039D54}" srcOrd="0" destOrd="0" presId="urn:microsoft.com/office/officeart/2005/8/layout/default"/>
-    <dgm:cxn modelId="{B1373FEE-6403-E74B-A2AE-B3EA80BF1E49}" type="presOf" srcId="{FF962DAA-31CB-D944-9327-BBE587A1CB0A}" destId="{E74B41FA-F320-8A41-8026-A5B13F2F9C1E}" srcOrd="0" destOrd="0" presId="urn:microsoft.com/office/officeart/2005/8/layout/default"/>
-    <dgm:cxn modelId="{F591FEB1-F214-824B-8D25-43B77DDC79FF}" srcId="{A557E678-8B76-BA42-8E58-CCD29F8CE914}" destId="{60F475E4-09BB-BA47-A035-CD72F696976E}" srcOrd="5" destOrd="0" parTransId="{161CA00A-34CF-8A4B-AEE7-8A7223245C45}" sibTransId="{FB7E0C12-49DB-5749-BB37-4A640B137843}"/>
-    <dgm:cxn modelId="{B0B02D49-3004-B34A-A4B7-26C75EE0CFA3}" srcId="{A557E678-8B76-BA42-8E58-CCD29F8CE914}" destId="{14FB72F5-EB58-F54F-A01F-28F49443774E}" srcOrd="4" destOrd="0" parTransId="{4C92F82E-340C-E64C-83BD-859EF05A69F1}" sibTransId="{7DFA0051-40E0-4249-8321-FDBD6B62359B}"/>
-    <dgm:cxn modelId="{50AEAB1C-F635-214C-BBE0-2D08CC50E872}" type="presOf" srcId="{60F475E4-09BB-BA47-A035-CD72F696976E}" destId="{14DA647D-CCE7-B645-ADDF-FE387A16FBB8}" srcOrd="0" destOrd="0" presId="urn:microsoft.com/office/officeart/2005/8/layout/default"/>
-    <dgm:cxn modelId="{88FCFF81-97BF-0E4B-88C5-FAD7A3F127DB}" srcId="{A557E678-8B76-BA42-8E58-CCD29F8CE914}" destId="{D5842269-86DD-AC44-86AB-12FFB8B7D054}" srcOrd="1" destOrd="0" parTransId="{94EB76E9-9E8D-9441-8C88-D4C6DA20EF0A}" sibTransId="{9673C431-6ADD-E64D-A455-2BD038E69FED}"/>
-    <dgm:cxn modelId="{CCB12CE7-E8ED-C044-B7E0-1BE56789BC75}" type="presOf" srcId="{2A334FA2-9A29-8146-AD6A-FDF6D797CB67}" destId="{E1821030-DEC0-A048-8788-8724D4ACACB4}" srcOrd="0" destOrd="0" presId="urn:microsoft.com/office/officeart/2005/8/layout/default"/>
     <dgm:cxn modelId="{38304054-0DC4-9249-A192-DCB028047D01}" type="presOf" srcId="{A557E678-8B76-BA42-8E58-CCD29F8CE914}" destId="{F82F5239-D5CF-F547-9A55-74375277FA50}" srcOrd="0" destOrd="0" presId="urn:microsoft.com/office/officeart/2005/8/layout/default"/>
     <dgm:cxn modelId="{764BB6A9-4C60-054B-A2C1-C61874F13DE4}" srcId="{A557E678-8B76-BA42-8E58-CCD29F8CE914}" destId="{2A334FA2-9A29-8146-AD6A-FDF6D797CB67}" srcOrd="3" destOrd="0" parTransId="{DA5BFF4D-64C1-B64F-A811-25CA6EE86540}" sibTransId="{30A64343-F120-E245-9194-9365C12B36A0}"/>
+    <dgm:cxn modelId="{B0B02D49-3004-B34A-A4B7-26C75EE0CFA3}" srcId="{A557E678-8B76-BA42-8E58-CCD29F8CE914}" destId="{14FB72F5-EB58-F54F-A01F-28F49443774E}" srcOrd="4" destOrd="0" parTransId="{4C92F82E-340C-E64C-83BD-859EF05A69F1}" sibTransId="{7DFA0051-40E0-4249-8321-FDBD6B62359B}"/>
+    <dgm:cxn modelId="{F591FEB1-F214-824B-8D25-43B77DDC79FF}" srcId="{A557E678-8B76-BA42-8E58-CCD29F8CE914}" destId="{60F475E4-09BB-BA47-A035-CD72F696976E}" srcOrd="5" destOrd="0" parTransId="{161CA00A-34CF-8A4B-AEE7-8A7223245C45}" sibTransId="{FB7E0C12-49DB-5749-BB37-4A640B137843}"/>
     <dgm:cxn modelId="{89899823-EA5C-FF4F-A608-8A1480F76462}" type="presParOf" srcId="{F82F5239-D5CF-F547-9A55-74375277FA50}" destId="{FB7A09C5-3EB6-D64E-AD07-D400418956C9}" srcOrd="0" destOrd="0" presId="urn:microsoft.com/office/officeart/2005/8/layout/default"/>
     <dgm:cxn modelId="{5D335F4E-F741-E142-89A3-8BE31F8D61D9}" type="presParOf" srcId="{F82F5239-D5CF-F547-9A55-74375277FA50}" destId="{BD94E313-734C-BC40-8091-1292E7C40E73}" srcOrd="1" destOrd="0" presId="urn:microsoft.com/office/officeart/2005/8/layout/default"/>
     <dgm:cxn modelId="{FEE80B7B-29FA-8746-9297-40194DF71A97}" type="presParOf" srcId="{F82F5239-D5CF-F547-9A55-74375277FA50}" destId="{1360C53F-BB0E-7141-848F-5FAC756425A2}" srcOrd="2" destOrd="0" presId="urn:microsoft.com/office/officeart/2005/8/layout/default"/>
@@ -2742,7 +2753,7 @@
   <dgm:whole/>
   <dgm:extLst>
     <a:ext uri="http://schemas.microsoft.com/office/drawing/2008/diagram">
-      <dsp:dataModelExt xmlns:dsp="http://schemas.microsoft.com/office/drawing/2008/diagram" relId="rId6" minVer="http://schemas.openxmlformats.org/drawingml/2006/diagram"/>
+      <dsp:dataModelExt xmlns:dsp="http://schemas.microsoft.com/office/drawing/2008/diagram" relId="rId7" minVer="http://schemas.openxmlformats.org/drawingml/2006/diagram"/>
     </a:ext>
   </dgm:extLst>
 </dgm:dataModel>
@@ -2992,6 +3003,13 @@
         </dgm:presLayoutVars>
       </dgm:prSet>
       <dgm:spPr/>
+      <dgm:t>
+        <a:bodyPr/>
+        <a:lstStyle/>
+        <a:p>
+          <a:endParaRPr lang="en-US"/>
+        </a:p>
+      </dgm:t>
     </dgm:pt>
     <dgm:pt modelId="{1F058D56-9E24-A547-A358-56C92C483F79}" type="pres">
       <dgm:prSet presAssocID="{238DA16E-529D-B340-9094-F491D2B27E10}" presName="node" presStyleLbl="node1" presStyleIdx="0" presStyleCnt="6">
@@ -3000,6 +3018,13 @@
         </dgm:presLayoutVars>
       </dgm:prSet>
       <dgm:spPr/>
+      <dgm:t>
+        <a:bodyPr/>
+        <a:lstStyle/>
+        <a:p>
+          <a:endParaRPr lang="en-US"/>
+        </a:p>
+      </dgm:t>
     </dgm:pt>
     <dgm:pt modelId="{B578C0EF-FBBE-324E-94FC-71FC36C25105}" type="pres">
       <dgm:prSet presAssocID="{B334C6EA-1A69-4C47-B416-1EE0B4B67EA8}" presName="sibTrans" presStyleCnt="0"/>
@@ -3031,6 +3056,13 @@
         </dgm:presLayoutVars>
       </dgm:prSet>
       <dgm:spPr/>
+      <dgm:t>
+        <a:bodyPr/>
+        <a:lstStyle/>
+        <a:p>
+          <a:endParaRPr lang="en-US"/>
+        </a:p>
+      </dgm:t>
     </dgm:pt>
     <dgm:pt modelId="{ABAA847A-1A32-6340-AD45-9B4543A86683}" type="pres">
       <dgm:prSet presAssocID="{9F1EDFEC-E6BC-4C47-A38E-4C6FA0D872A3}" presName="sibTrans" presStyleCnt="0"/>
@@ -3096,8 +3128,8 @@
     <dgm:cxn modelId="{8FE92933-79E1-FA49-9714-AEB646343D8D}" type="presOf" srcId="{26EBB5B8-EDCD-E143-9434-CEBD335707F3}" destId="{7CF53D9D-C035-0C44-BC61-68E5A01C4F95}" srcOrd="0" destOrd="0" presId="urn:microsoft.com/office/officeart/2005/8/layout/default"/>
     <dgm:cxn modelId="{33705A91-569B-994E-AE08-28975A1A6769}" srcId="{AC8ECD85-FF62-154D-8151-4C034B952A16}" destId="{1CD83918-0ABC-3F4D-B54A-5DAFE4F62615}" srcOrd="1" destOrd="0" parTransId="{5D9D6F5E-E863-774F-91FC-2538587FEACC}" sibTransId="{D446B6FE-B4B6-9740-B9E4-05020D082D51}"/>
     <dgm:cxn modelId="{D3A7E973-FBFB-2844-9522-41F4B3EB851E}" srcId="{AC8ECD85-FF62-154D-8151-4C034B952A16}" destId="{035C94F0-002A-D942-9379-D610CE14D486}" srcOrd="2" destOrd="0" parTransId="{5F02B957-B8E8-E847-91F3-099A22BB8EC0}" sibTransId="{9F1EDFEC-E6BC-4C47-A38E-4C6FA0D872A3}"/>
+    <dgm:cxn modelId="{2C1088A2-9545-7B41-9F5E-05D3B23C2E01}" type="presOf" srcId="{1CD83918-0ABC-3F4D-B54A-5DAFE4F62615}" destId="{81A784E0-A37D-584E-B95E-0D9898D67BA3}" srcOrd="0" destOrd="0" presId="urn:microsoft.com/office/officeart/2005/8/layout/default"/>
     <dgm:cxn modelId="{FDD3228A-B6E6-B042-B3A9-3A1BA09C8967}" type="presOf" srcId="{1272A5F1-6C72-C34E-AE3F-F5B93142497B}" destId="{3E5F0137-FAA3-AF42-98FA-AA8D98F2D1C0}" srcOrd="0" destOrd="0" presId="urn:microsoft.com/office/officeart/2005/8/layout/default"/>
-    <dgm:cxn modelId="{2C1088A2-9545-7B41-9F5E-05D3B23C2E01}" type="presOf" srcId="{1CD83918-0ABC-3F4D-B54A-5DAFE4F62615}" destId="{81A784E0-A37D-584E-B95E-0D9898D67BA3}" srcOrd="0" destOrd="0" presId="urn:microsoft.com/office/officeart/2005/8/layout/default"/>
     <dgm:cxn modelId="{D8544DB8-6955-9F46-842E-5A8CD5884F14}" srcId="{AC8ECD85-FF62-154D-8151-4C034B952A16}" destId="{1272A5F1-6C72-C34E-AE3F-F5B93142497B}" srcOrd="4" destOrd="0" parTransId="{6F86996B-B835-6C4F-9556-FE16594E112D}" sibTransId="{0AB642A7-2D63-EA4F-B031-62C5A8A4DF4A}"/>
     <dgm:cxn modelId="{2EB93408-50F1-2946-9207-242BA35CF8BF}" type="presOf" srcId="{AC8ECD85-FF62-154D-8151-4C034B952A16}" destId="{D812AE24-42EB-8042-A57C-76E985D14E40}" srcOrd="0" destOrd="0" presId="urn:microsoft.com/office/officeart/2005/8/layout/default"/>
     <dgm:cxn modelId="{D533B882-3D00-3B44-B74F-47897B4E82F9}" srcId="{AC8ECD85-FF62-154D-8151-4C034B952A16}" destId="{B5D2DBF9-FC27-D44D-BAF6-6466C2BB29D3}" srcOrd="5" destOrd="0" parTransId="{777D15A0-591D-2045-8045-5AA8822BA90B}" sibTransId="{709BF55E-1AD3-184B-86F7-FFCB7BD4A99D}"/>
@@ -3120,7 +3152,7 @@
   <dgm:whole/>
   <dgm:extLst>
     <a:ext uri="http://schemas.microsoft.com/office/drawing/2008/diagram">
-      <dsp:dataModelExt xmlns:dsp="http://schemas.microsoft.com/office/drawing/2008/diagram" relId="rId6" minVer="http://schemas.openxmlformats.org/drawingml/2006/diagram"/>
+      <dsp:dataModelExt xmlns:dsp="http://schemas.microsoft.com/office/drawing/2008/diagram" relId="rId7" minVer="http://schemas.openxmlformats.org/drawingml/2006/diagram"/>
     </a:ext>
   </dgm:extLst>
 </dgm:dataModel>
@@ -3294,6 +3326,13 @@
         </dgm:presLayoutVars>
       </dgm:prSet>
       <dgm:spPr/>
+      <dgm:t>
+        <a:bodyPr/>
+        <a:lstStyle/>
+        <a:p>
+          <a:endParaRPr lang="en-US"/>
+        </a:p>
+      </dgm:t>
     </dgm:pt>
     <dgm:pt modelId="{7EDC4AF0-6D5C-5744-A15A-E9637C9563F4}" type="pres">
       <dgm:prSet presAssocID="{A3FD5AF9-599A-ED4D-9C67-9275AA10A24A}" presName="node" presStyleLbl="node1" presStyleIdx="0" presStyleCnt="4">
@@ -3313,10 +3352,24 @@
     <dgm:pt modelId="{B88AC726-BDC6-B743-83B0-D1037DF18D15}" type="pres">
       <dgm:prSet presAssocID="{673D0B5D-982D-B748-A6DD-0165CDB0D554}" presName="sibTrans" presStyleLbl="sibTrans2D1" presStyleIdx="0" presStyleCnt="3"/>
       <dgm:spPr/>
+      <dgm:t>
+        <a:bodyPr/>
+        <a:lstStyle/>
+        <a:p>
+          <a:endParaRPr lang="en-US"/>
+        </a:p>
+      </dgm:t>
     </dgm:pt>
     <dgm:pt modelId="{EB50E867-A7B6-BD4E-8CBD-9522D284C7E8}" type="pres">
       <dgm:prSet presAssocID="{673D0B5D-982D-B748-A6DD-0165CDB0D554}" presName="connectorText" presStyleLbl="sibTrans2D1" presStyleIdx="0" presStyleCnt="3"/>
       <dgm:spPr/>
+      <dgm:t>
+        <a:bodyPr/>
+        <a:lstStyle/>
+        <a:p>
+          <a:endParaRPr lang="en-US"/>
+        </a:p>
+      </dgm:t>
     </dgm:pt>
     <dgm:pt modelId="{231A5A51-F1F4-C449-B554-35D247EC4BD6}" type="pres">
       <dgm:prSet presAssocID="{C8EECDAC-416A-4E4D-B9C5-5DB6DE18E0E1}" presName="node" presStyleLbl="node1" presStyleIdx="1" presStyleCnt="4">
@@ -3336,10 +3389,24 @@
     <dgm:pt modelId="{4DA99805-2CAC-4F43-A086-135885EEF21C}" type="pres">
       <dgm:prSet presAssocID="{D3E912FF-57EF-BD4C-B186-8FE940CDE4A2}" presName="sibTrans" presStyleLbl="sibTrans2D1" presStyleIdx="1" presStyleCnt="3"/>
       <dgm:spPr/>
+      <dgm:t>
+        <a:bodyPr/>
+        <a:lstStyle/>
+        <a:p>
+          <a:endParaRPr lang="en-US"/>
+        </a:p>
+      </dgm:t>
     </dgm:pt>
     <dgm:pt modelId="{68C50EA2-F885-874E-AD39-E0F1890DDE9C}" type="pres">
       <dgm:prSet presAssocID="{D3E912FF-57EF-BD4C-B186-8FE940CDE4A2}" presName="connectorText" presStyleLbl="sibTrans2D1" presStyleIdx="1" presStyleCnt="3"/>
       <dgm:spPr/>
+      <dgm:t>
+        <a:bodyPr/>
+        <a:lstStyle/>
+        <a:p>
+          <a:endParaRPr lang="en-US"/>
+        </a:p>
+      </dgm:t>
     </dgm:pt>
     <dgm:pt modelId="{8DDFEFE7-0797-0147-BD52-724D1C55B60D}" type="pres">
       <dgm:prSet presAssocID="{F47272E4-B689-8949-B9E5-EADE9E6E73D4}" presName="node" presStyleLbl="node1" presStyleIdx="2" presStyleCnt="4">
@@ -3359,10 +3426,24 @@
     <dgm:pt modelId="{F508F213-ED5C-4740-B79F-6B1F584F9DEA}" type="pres">
       <dgm:prSet presAssocID="{766C3B29-D530-0546-A28B-6C20CCD9E17B}" presName="sibTrans" presStyleLbl="sibTrans2D1" presStyleIdx="2" presStyleCnt="3"/>
       <dgm:spPr/>
+      <dgm:t>
+        <a:bodyPr/>
+        <a:lstStyle/>
+        <a:p>
+          <a:endParaRPr lang="en-US"/>
+        </a:p>
+      </dgm:t>
     </dgm:pt>
     <dgm:pt modelId="{E32272F7-C1F1-AD47-98FE-121110DBFEC7}" type="pres">
       <dgm:prSet presAssocID="{766C3B29-D530-0546-A28B-6C20CCD9E17B}" presName="connectorText" presStyleLbl="sibTrans2D1" presStyleIdx="2" presStyleCnt="3"/>
       <dgm:spPr/>
+      <dgm:t>
+        <a:bodyPr/>
+        <a:lstStyle/>
+        <a:p>
+          <a:endParaRPr lang="en-US"/>
+        </a:p>
+      </dgm:t>
     </dgm:pt>
     <dgm:pt modelId="{FB538D3B-AE9C-594E-BAAD-8B9BCB954377}" type="pres">
       <dgm:prSet presAssocID="{AC91F815-2150-8741-B496-5D1714DAB547}" presName="node" presStyleLbl="node1" presStyleIdx="3" presStyleCnt="4">
@@ -3371,6 +3452,13 @@
         </dgm:presLayoutVars>
       </dgm:prSet>
       <dgm:spPr/>
+      <dgm:t>
+        <a:bodyPr/>
+        <a:lstStyle/>
+        <a:p>
+          <a:endParaRPr lang="en-US"/>
+        </a:p>
+      </dgm:t>
     </dgm:pt>
   </dgm:ptLst>
   <dgm:cxnLst>
@@ -3467,12 +3555,12 @@
         </a:fontRef>
       </dsp:style>
       <dsp:txBody>
-        <a:bodyPr spcFirstLastPara="0" vert="horz" wrap="square" lIns="110490" tIns="110490" rIns="110490" bIns="110490" numCol="1" spcCol="1270" anchor="ctr" anchorCtr="0">
+        <a:bodyPr spcFirstLastPara="0" vert="horz" wrap="square" lIns="106680" tIns="106680" rIns="106680" bIns="106680" numCol="1" spcCol="1270" anchor="ctr" anchorCtr="0">
           <a:noAutofit/>
         </a:bodyPr>
         <a:lstStyle/>
         <a:p>
-          <a:pPr lvl="0" algn="ctr" defTabSz="1289050">
+          <a:pPr lvl="0" algn="ctr" defTabSz="1244600">
             <a:lnSpc>
               <a:spcPct val="90000"/>
             </a:lnSpc>
@@ -3484,10 +3572,10 @@
             </a:spcAft>
           </a:pPr>
           <a:r>
-            <a:rPr lang="en-US" sz="2900" kern="1200" dirty="0" smtClean="0"/>
+            <a:rPr lang="en-US" sz="2800" kern="1200" dirty="0" smtClean="0"/>
             <a:t>Patient Management</a:t>
           </a:r>
-          <a:endParaRPr lang="en-US" sz="2900" kern="1200" dirty="0"/>
+          <a:endParaRPr lang="en-US" sz="2800" kern="1200" dirty="0"/>
         </a:p>
       </dsp:txBody>
       <dsp:txXfrm>
@@ -3544,12 +3632,12 @@
         </a:fontRef>
       </dsp:style>
       <dsp:txBody>
-        <a:bodyPr spcFirstLastPara="0" vert="horz" wrap="square" lIns="110490" tIns="110490" rIns="110490" bIns="110490" numCol="1" spcCol="1270" anchor="ctr" anchorCtr="0">
+        <a:bodyPr spcFirstLastPara="0" vert="horz" wrap="square" lIns="106680" tIns="106680" rIns="106680" bIns="106680" numCol="1" spcCol="1270" anchor="ctr" anchorCtr="0">
           <a:noAutofit/>
         </a:bodyPr>
         <a:lstStyle/>
         <a:p>
-          <a:pPr lvl="0" algn="ctr" defTabSz="1289050">
+          <a:pPr lvl="0" algn="ctr" defTabSz="1244600">
             <a:lnSpc>
               <a:spcPct val="90000"/>
             </a:lnSpc>
@@ -3561,10 +3649,10 @@
             </a:spcAft>
           </a:pPr>
           <a:r>
-            <a:rPr lang="en-US" sz="2900" kern="1200" dirty="0" smtClean="0"/>
+            <a:rPr lang="en-US" sz="2800" kern="1200" dirty="0" smtClean="0"/>
             <a:t>Reporting</a:t>
           </a:r>
-          <a:endParaRPr lang="en-US" sz="2900" kern="1200" dirty="0"/>
+          <a:endParaRPr lang="en-US" sz="2800" kern="1200" dirty="0"/>
         </a:p>
       </dsp:txBody>
       <dsp:txXfrm>
@@ -3621,12 +3709,12 @@
         </a:fontRef>
       </dsp:style>
       <dsp:txBody>
-        <a:bodyPr spcFirstLastPara="0" vert="horz" wrap="square" lIns="110490" tIns="110490" rIns="110490" bIns="110490" numCol="1" spcCol="1270" anchor="ctr" anchorCtr="0">
+        <a:bodyPr spcFirstLastPara="0" vert="horz" wrap="square" lIns="106680" tIns="106680" rIns="106680" bIns="106680" numCol="1" spcCol="1270" anchor="ctr" anchorCtr="0">
           <a:noAutofit/>
         </a:bodyPr>
         <a:lstStyle/>
         <a:p>
-          <a:pPr lvl="0" algn="ctr" defTabSz="1289050">
+          <a:pPr lvl="0" algn="ctr" defTabSz="1244600">
             <a:lnSpc>
               <a:spcPct val="90000"/>
             </a:lnSpc>
@@ -3638,10 +3726,10 @@
             </a:spcAft>
           </a:pPr>
           <a:r>
-            <a:rPr lang="en-US" sz="2900" kern="1200" dirty="0" smtClean="0"/>
+            <a:rPr lang="en-US" sz="2800" kern="1200" dirty="0" smtClean="0"/>
             <a:t>Medication</a:t>
           </a:r>
-          <a:endParaRPr lang="en-US" sz="2900" kern="1200" dirty="0"/>
+          <a:endParaRPr lang="en-US" sz="2800" kern="1200" dirty="0"/>
         </a:p>
       </dsp:txBody>
       <dsp:txXfrm>
@@ -3698,12 +3786,12 @@
         </a:fontRef>
       </dsp:style>
       <dsp:txBody>
-        <a:bodyPr spcFirstLastPara="0" vert="horz" wrap="square" lIns="110490" tIns="110490" rIns="110490" bIns="110490" numCol="1" spcCol="1270" anchor="ctr" anchorCtr="0">
+        <a:bodyPr spcFirstLastPara="0" vert="horz" wrap="square" lIns="106680" tIns="106680" rIns="106680" bIns="106680" numCol="1" spcCol="1270" anchor="ctr" anchorCtr="0">
           <a:noAutofit/>
         </a:bodyPr>
         <a:lstStyle/>
         <a:p>
-          <a:pPr lvl="0" algn="ctr" defTabSz="1289050">
+          <a:pPr lvl="0" algn="ctr" defTabSz="1244600">
             <a:lnSpc>
               <a:spcPct val="90000"/>
             </a:lnSpc>
@@ -3715,10 +3803,10 @@
             </a:spcAft>
           </a:pPr>
           <a:r>
-            <a:rPr lang="en-US" sz="2900" kern="1200" dirty="0" smtClean="0"/>
-            <a:t>Calendar</a:t>
+            <a:rPr lang="en-US" sz="2800" kern="1200" dirty="0" smtClean="0"/>
+            <a:t>Appointments</a:t>
           </a:r>
-          <a:endParaRPr lang="en-US" sz="2900" kern="1200" dirty="0"/>
+          <a:endParaRPr lang="en-US" sz="2800" kern="1200" dirty="0"/>
         </a:p>
       </dsp:txBody>
       <dsp:txXfrm>
@@ -3775,12 +3863,12 @@
         </a:fontRef>
       </dsp:style>
       <dsp:txBody>
-        <a:bodyPr spcFirstLastPara="0" vert="horz" wrap="square" lIns="110490" tIns="110490" rIns="110490" bIns="110490" numCol="1" spcCol="1270" anchor="ctr" anchorCtr="0">
+        <a:bodyPr spcFirstLastPara="0" vert="horz" wrap="square" lIns="106680" tIns="106680" rIns="106680" bIns="106680" numCol="1" spcCol="1270" anchor="ctr" anchorCtr="0">
           <a:noAutofit/>
         </a:bodyPr>
         <a:lstStyle/>
         <a:p>
-          <a:pPr lvl="0" algn="ctr" defTabSz="1289050">
+          <a:pPr lvl="0" algn="ctr" defTabSz="1244600">
             <a:lnSpc>
               <a:spcPct val="90000"/>
             </a:lnSpc>
@@ -3792,10 +3880,10 @@
             </a:spcAft>
           </a:pPr>
           <a:r>
-            <a:rPr lang="en-US" sz="2900" kern="1200" dirty="0" smtClean="0"/>
+            <a:rPr lang="en-US" sz="2800" kern="1200" dirty="0" smtClean="0"/>
             <a:t>Clinic Management</a:t>
           </a:r>
-          <a:endParaRPr lang="en-US" sz="2900" kern="1200" dirty="0"/>
+          <a:endParaRPr lang="en-US" sz="2800" kern="1200" dirty="0"/>
         </a:p>
       </dsp:txBody>
       <dsp:txXfrm>
@@ -3852,12 +3940,12 @@
         </a:fontRef>
       </dsp:style>
       <dsp:txBody>
-        <a:bodyPr spcFirstLastPara="0" vert="horz" wrap="square" lIns="110490" tIns="110490" rIns="110490" bIns="110490" numCol="1" spcCol="1270" anchor="ctr" anchorCtr="0">
+        <a:bodyPr spcFirstLastPara="0" vert="horz" wrap="square" lIns="106680" tIns="106680" rIns="106680" bIns="106680" numCol="1" spcCol="1270" anchor="ctr" anchorCtr="0">
           <a:noAutofit/>
         </a:bodyPr>
         <a:lstStyle/>
         <a:p>
-          <a:pPr lvl="0" algn="ctr" defTabSz="1289050">
+          <a:pPr lvl="0" algn="ctr" defTabSz="1244600">
             <a:lnSpc>
               <a:spcPct val="90000"/>
             </a:lnSpc>
@@ -3869,10 +3957,10 @@
             </a:spcAft>
           </a:pPr>
           <a:r>
-            <a:rPr lang="en-US" sz="2900" kern="1200" dirty="0" smtClean="0"/>
-            <a:t>Security</a:t>
+            <a:rPr lang="en-US" sz="2800" kern="1200" dirty="0" smtClean="0"/>
+            <a:t>Security / Availability</a:t>
           </a:r>
-          <a:endParaRPr lang="en-US" sz="2900" kern="1200" dirty="0"/>
+          <a:endParaRPr lang="en-US" sz="2800" kern="1200" dirty="0"/>
         </a:p>
       </dsp:txBody>
       <dsp:txXfrm>
@@ -8720,7 +8808,7 @@
           <a:p>
             <a:fld id="{D5050E7F-CFC5-4B48-B55C-24FD73E310E3}" type="datetimeFigureOut">
               <a:rPr lang="en-US" smtClean="0"/>
-              <a:t>28.02.13</a:t>
+              <a:t>01.03.13</a:t>
             </a:fld>
             <a:endParaRPr lang="en-US"/>
           </a:p>
@@ -9118,9 +9206,16 @@
             </a:r>
           </a:p>
           <a:p>
+            <a:endParaRPr lang="en-US" baseline="0" dirty="0" smtClean="0"/>
+          </a:p>
+          <a:p>
             <a:r>
               <a:rPr lang="en-US" baseline="0" dirty="0" smtClean="0"/>
-              <a:t>Links die Target Users </a:t>
+              <a:t>Links </a:t>
+            </a:r>
+            <a:r>
+              <a:rPr lang="en-US" baseline="0" dirty="0" smtClean="0"/>
+              <a:t>die Target Users </a:t>
             </a:r>
             <a:r>
               <a:rPr lang="en-US" baseline="0" dirty="0" err="1" smtClean="0"/>
@@ -9131,15 +9226,15 @@
               <a:t> </a:t>
             </a:r>
             <a:r>
-              <a:rPr lang="en-US" baseline="0" dirty="0" err="1" smtClean="0"/>
+              <a:rPr lang="en-US" b="1" baseline="0" dirty="0" err="1" smtClean="0"/>
               <a:t>medizinischer</a:t>
             </a:r>
             <a:r>
-              <a:rPr lang="en-US" baseline="0" dirty="0" smtClean="0"/>
+              <a:rPr lang="en-US" b="1" baseline="0" dirty="0" smtClean="0"/>
               <a:t> </a:t>
             </a:r>
             <a:r>
-              <a:rPr lang="en-US" baseline="0" dirty="0" err="1" smtClean="0"/>
+              <a:rPr lang="en-US" b="1" baseline="0" dirty="0" err="1" smtClean="0"/>
               <a:t>Ausbildung</a:t>
             </a:r>
             <a:r>
@@ -9227,23 +9322,31 @@
             </a:r>
             <a:r>
               <a:rPr lang="en-US" baseline="0" dirty="0" smtClean="0"/>
-              <a:t> auf den </a:t>
-            </a:r>
-            <a:r>
-              <a:rPr lang="en-US" baseline="0" dirty="0" err="1" smtClean="0"/>
+              <a:t> auf </a:t>
+            </a:r>
+            <a:r>
+              <a:rPr lang="en-US" b="1" baseline="0" dirty="0" smtClean="0"/>
+              <a:t>den </a:t>
+            </a:r>
+            <a:r>
+              <a:rPr lang="en-US" b="1" baseline="0" dirty="0" err="1" smtClean="0"/>
               <a:t>kompletten</a:t>
             </a:r>
             <a:r>
+              <a:rPr lang="en-US" b="1" baseline="0" dirty="0" smtClean="0"/>
+              <a:t> </a:t>
+            </a:r>
+            <a:r>
+              <a:rPr lang="en-US" b="1" baseline="0" dirty="0" err="1" smtClean="0"/>
+              <a:t>Datensatz</a:t>
+            </a:r>
+            <a:r>
+              <a:rPr lang="en-US" b="1" baseline="0" dirty="0" smtClean="0"/>
+              <a:t> </a:t>
+            </a:r>
+            <a:r>
               <a:rPr lang="en-US" baseline="0" dirty="0" smtClean="0"/>
-              <a:t> </a:t>
-            </a:r>
-            <a:r>
-              <a:rPr lang="en-US" baseline="0" dirty="0" err="1" smtClean="0"/>
-              <a:t>Datensatz</a:t>
-            </a:r>
-            <a:r>
-              <a:rPr lang="en-US" baseline="0" dirty="0" smtClean="0"/>
-              <a:t> des </a:t>
+              <a:t>des </a:t>
             </a:r>
             <a:r>
               <a:rPr lang="en-US" baseline="0" dirty="0" err="1" smtClean="0"/>
@@ -9373,50 +9476,50 @@
               <a:t> </a:t>
             </a:r>
             <a:r>
-              <a:rPr lang="en-US" baseline="0" dirty="0" err="1" smtClean="0"/>
+              <a:rPr lang="en-US" b="1" baseline="0" dirty="0" err="1" smtClean="0"/>
               <a:t>zugewiesenen</a:t>
             </a:r>
             <a:r>
-              <a:rPr lang="en-US" baseline="0" dirty="0" smtClean="0"/>
+              <a:rPr lang="en-US" b="1" baseline="0" dirty="0" smtClean="0"/>
               <a:t> </a:t>
             </a:r>
             <a:r>
-              <a:rPr lang="en-US" baseline="0" dirty="0" err="1" smtClean="0"/>
+              <a:rPr lang="en-US" b="1" baseline="0" dirty="0" err="1" smtClean="0"/>
               <a:t>Medikamente</a:t>
             </a:r>
             <a:r>
-              <a:rPr lang="en-US" baseline="0" dirty="0" smtClean="0"/>
+              <a:rPr lang="en-US" b="1" baseline="0" dirty="0" smtClean="0"/>
               <a:t> und die </a:t>
             </a:r>
             <a:r>
-              <a:rPr lang="en-US" baseline="0" dirty="0" err="1" smtClean="0"/>
+              <a:rPr lang="en-US" b="1" baseline="0" dirty="0" err="1" smtClean="0"/>
               <a:t>durch</a:t>
             </a:r>
             <a:r>
-              <a:rPr lang="en-US" baseline="0" dirty="0" smtClean="0"/>
+              <a:rPr lang="en-US" b="1" baseline="0" dirty="0" smtClean="0"/>
               <a:t> den </a:t>
             </a:r>
             <a:r>
-              <a:rPr lang="en-US" baseline="0" dirty="0" err="1" smtClean="0"/>
+              <a:rPr lang="en-US" b="1" baseline="0" dirty="0" err="1" smtClean="0"/>
               <a:t>Arzt</a:t>
             </a:r>
             <a:r>
-              <a:rPr lang="en-US" baseline="0" dirty="0" smtClean="0"/>
+              <a:rPr lang="en-US" b="1" baseline="0" dirty="0" smtClean="0"/>
               <a:t> </a:t>
             </a:r>
             <a:r>
-              <a:rPr lang="en-US" baseline="0" dirty="0" err="1" smtClean="0"/>
+              <a:rPr lang="en-US" b="1" baseline="0" dirty="0" err="1" smtClean="0"/>
               <a:t>ausgewählte</a:t>
             </a:r>
             <a:r>
-              <a:rPr lang="en-US" baseline="0" dirty="0" smtClean="0"/>
+              <a:rPr lang="en-US" b="1" baseline="0" dirty="0" smtClean="0"/>
               <a:t> </a:t>
             </a:r>
             <a:r>
-              <a:rPr lang="en-US" baseline="0" dirty="0" err="1" smtClean="0"/>
+              <a:rPr lang="en-US" b="1" baseline="0" dirty="0" err="1" smtClean="0"/>
               <a:t>Behandlungsmethode</a:t>
             </a:r>
-            <a:endParaRPr lang="en-US" baseline="0" dirty="0" smtClean="0"/>
+            <a:endParaRPr lang="en-US" b="1" baseline="0" dirty="0" smtClean="0"/>
           </a:p>
           <a:p>
             <a:pPr marL="171450" indent="-171450">
@@ -9532,19 +9635,19 @@
               <a:t> </a:t>
             </a:r>
             <a:r>
-              <a:rPr lang="en-US" baseline="0" dirty="0" err="1" smtClean="0"/>
+              <a:rPr lang="en-US" b="1" baseline="0" dirty="0" err="1" smtClean="0"/>
               <a:t>Allem</a:t>
             </a:r>
             <a:r>
-              <a:rPr lang="en-US" baseline="0" dirty="0" smtClean="0"/>
+              <a:rPr lang="en-US" b="1" baseline="0" dirty="0" smtClean="0"/>
               <a:t> </a:t>
             </a:r>
             <a:r>
-              <a:rPr lang="en-US" baseline="0" dirty="0" err="1" smtClean="0"/>
+              <a:rPr lang="en-US" b="1" baseline="0" dirty="0" err="1" smtClean="0"/>
               <a:t>Termine</a:t>
             </a:r>
             <a:r>
-              <a:rPr lang="en-US" baseline="0" dirty="0" smtClean="0"/>
+              <a:rPr lang="en-US" b="1" baseline="0" dirty="0" smtClean="0"/>
               <a:t> </a:t>
             </a:r>
             <a:r>
@@ -9611,11 +9714,11 @@
               <a:t> </a:t>
             </a:r>
             <a:r>
-              <a:rPr lang="en-US" baseline="0" dirty="0" err="1" smtClean="0"/>
+              <a:rPr lang="en-US" b="1" baseline="0" dirty="0" err="1" smtClean="0"/>
               <a:t>Berichte</a:t>
             </a:r>
             <a:r>
-              <a:rPr lang="en-US" baseline="0" dirty="0" smtClean="0"/>
+              <a:rPr lang="en-US" b="1" baseline="0" dirty="0" smtClean="0"/>
               <a:t> </a:t>
             </a:r>
             <a:r>
@@ -9710,7 +9813,7 @@
           <a:p>
             <a:fld id="{2011728C-8DA9-4C4B-BAC7-28355581E9A6}" type="slidenum">
               <a:rPr lang="en-US" smtClean="0"/>
-              <a:t>4</a:t>
+              <a:t>3</a:t>
             </a:fld>
             <a:endParaRPr lang="en-US"/>
           </a:p>
@@ -9720,6 +9823,754 @@
     <p:extLst>
       <p:ext uri="{BB962C8B-B14F-4D97-AF65-F5344CB8AC3E}">
         <p14:creationId xmlns:p14="http://schemas.microsoft.com/office/powerpoint/2010/main" val="2904537187"/>
+      </p:ext>
+    </p:extLst>
+  </p:cSld>
+  <p:clrMapOvr>
+    <a:masterClrMapping/>
+  </p:clrMapOvr>
+</p:notes>
+</file>
+
+<file path=ppt/notesSlides/notesSlide2.xml><?xml version="1.0" encoding="utf-8"?>
+<p:notes xmlns:a="http://schemas.openxmlformats.org/drawingml/2006/main" xmlns:r="http://schemas.openxmlformats.org/officeDocument/2006/relationships" xmlns:p="http://schemas.openxmlformats.org/presentationml/2006/main">
+  <p:cSld>
+    <p:spTree>
+      <p:nvGrpSpPr>
+        <p:cNvPr id="1" name=""/>
+        <p:cNvGrpSpPr/>
+        <p:nvPr/>
+      </p:nvGrpSpPr>
+      <p:grpSpPr>
+        <a:xfrm>
+          <a:off x="0" y="0"/>
+          <a:ext cx="0" cy="0"/>
+          <a:chOff x="0" y="0"/>
+          <a:chExt cx="0" cy="0"/>
+        </a:xfrm>
+      </p:grpSpPr>
+      <p:sp>
+        <p:nvSpPr>
+          <p:cNvPr id="2" name="Slide Image Placeholder 1"/>
+          <p:cNvSpPr>
+            <a:spLocks noGrp="1" noRot="1" noChangeAspect="1"/>
+          </p:cNvSpPr>
+          <p:nvPr>
+            <p:ph type="sldImg"/>
+          </p:nvPr>
+        </p:nvSpPr>
+        <p:spPr/>
+      </p:sp>
+      <p:sp>
+        <p:nvSpPr>
+          <p:cNvPr id="3" name="Notes Placeholder 2"/>
+          <p:cNvSpPr>
+            <a:spLocks noGrp="1"/>
+          </p:cNvSpPr>
+          <p:nvPr>
+            <p:ph type="body" idx="1"/>
+          </p:nvPr>
+        </p:nvSpPr>
+        <p:spPr/>
+        <p:txBody>
+          <a:bodyPr/>
+          <a:lstStyle/>
+          <a:p>
+            <a:pPr marL="171450" lvl="0" indent="-171450">
+              <a:buFont typeface="Arial"/>
+              <a:buChar char="•"/>
+            </a:pPr>
+            <a:r>
+              <a:rPr lang="de-CH" sz="1200" kern="1200" dirty="0" smtClean="0">
+                <a:solidFill>
+                  <a:schemeClr val="tx1"/>
+                </a:solidFill>
+                <a:effectLst/>
+                <a:latin typeface="+mn-lt"/>
+                <a:ea typeface="+mn-ea"/>
+                <a:cs typeface="+mn-cs"/>
+              </a:rPr>
+              <a:t>Patientenverwaltung</a:t>
+            </a:r>
+            <a:endParaRPr lang="en-US" sz="1200" kern="1200" dirty="0" smtClean="0">
+              <a:solidFill>
+                <a:schemeClr val="tx1"/>
+              </a:solidFill>
+              <a:effectLst/>
+              <a:latin typeface="+mn-lt"/>
+              <a:ea typeface="+mn-ea"/>
+              <a:cs typeface="+mn-cs"/>
+            </a:endParaRPr>
+          </a:p>
+          <a:p>
+            <a:pPr marL="628650" lvl="1" indent="-171450">
+              <a:buFont typeface="Arial"/>
+              <a:buChar char="•"/>
+            </a:pPr>
+            <a:r>
+              <a:rPr lang="de-CH" sz="1200" kern="1200" dirty="0" smtClean="0">
+                <a:solidFill>
+                  <a:schemeClr val="tx1"/>
+                </a:solidFill>
+                <a:effectLst/>
+                <a:latin typeface="+mn-lt"/>
+                <a:ea typeface="+mn-ea"/>
+                <a:cs typeface="+mn-cs"/>
+              </a:rPr>
+              <a:t>Erstellen, </a:t>
+            </a:r>
+            <a:r>
+              <a:rPr lang="de-CH" sz="1200" kern="1200" dirty="0" err="1" smtClean="0">
+                <a:solidFill>
+                  <a:schemeClr val="tx1"/>
+                </a:solidFill>
+                <a:effectLst/>
+                <a:latin typeface="+mn-lt"/>
+                <a:ea typeface="+mn-ea"/>
+                <a:cs typeface="+mn-cs"/>
+              </a:rPr>
+              <a:t>Stati</a:t>
+            </a:r>
+            <a:r>
+              <a:rPr lang="de-CH" sz="1200" kern="1200" dirty="0" smtClean="0">
+                <a:solidFill>
+                  <a:schemeClr val="tx1"/>
+                </a:solidFill>
+                <a:effectLst/>
+                <a:latin typeface="+mn-lt"/>
+                <a:ea typeface="+mn-ea"/>
+                <a:cs typeface="+mn-cs"/>
+              </a:rPr>
+              <a:t> erfassen, Medikamente erfassen, Medikamenten-Dosen erfassen, Medikamenten-</a:t>
+            </a:r>
+            <a:r>
+              <a:rPr lang="de-CH" sz="1200" kern="1200" dirty="0" err="1" smtClean="0">
+                <a:solidFill>
+                  <a:schemeClr val="tx1"/>
+                </a:solidFill>
+                <a:effectLst/>
+                <a:latin typeface="+mn-lt"/>
+                <a:ea typeface="+mn-ea"/>
+                <a:cs typeface="+mn-cs"/>
+              </a:rPr>
+              <a:t>History</a:t>
+            </a:r>
+            <a:r>
+              <a:rPr lang="de-CH" sz="1200" kern="1200" dirty="0" smtClean="0">
+                <a:solidFill>
+                  <a:schemeClr val="tx1"/>
+                </a:solidFill>
+                <a:effectLst/>
+                <a:latin typeface="+mn-lt"/>
+                <a:ea typeface="+mn-ea"/>
+                <a:cs typeface="+mn-cs"/>
+              </a:rPr>
+              <a:t>, Diagnose</a:t>
+            </a:r>
+            <a:endParaRPr lang="en-US" sz="1200" kern="1200" dirty="0" smtClean="0">
+              <a:solidFill>
+                <a:schemeClr val="tx1"/>
+              </a:solidFill>
+              <a:effectLst/>
+              <a:latin typeface="+mn-lt"/>
+              <a:ea typeface="+mn-ea"/>
+              <a:cs typeface="+mn-cs"/>
+            </a:endParaRPr>
+          </a:p>
+          <a:p>
+            <a:pPr marL="171450" lvl="0" indent="-171450">
+              <a:buFont typeface="Arial"/>
+              <a:buChar char="•"/>
+            </a:pPr>
+            <a:r>
+              <a:rPr lang="de-CH" sz="1200" kern="1200" dirty="0" smtClean="0">
+                <a:solidFill>
+                  <a:schemeClr val="tx1"/>
+                </a:solidFill>
+                <a:effectLst/>
+                <a:latin typeface="+mn-lt"/>
+                <a:ea typeface="+mn-ea"/>
+                <a:cs typeface="+mn-cs"/>
+              </a:rPr>
+              <a:t>Reporting-Funktion (Patienten-</a:t>
+            </a:r>
+            <a:r>
+              <a:rPr lang="de-CH" sz="1200" kern="1200" dirty="0" err="1" smtClean="0">
+                <a:solidFill>
+                  <a:schemeClr val="tx1"/>
+                </a:solidFill>
+                <a:effectLst/>
+                <a:latin typeface="+mn-lt"/>
+                <a:ea typeface="+mn-ea"/>
+                <a:cs typeface="+mn-cs"/>
+              </a:rPr>
+              <a:t>History</a:t>
+            </a:r>
+            <a:r>
+              <a:rPr lang="de-CH" sz="1200" kern="1200" dirty="0" smtClean="0">
+                <a:solidFill>
+                  <a:schemeClr val="tx1"/>
+                </a:solidFill>
+                <a:effectLst/>
+                <a:latin typeface="+mn-lt"/>
+                <a:ea typeface="+mn-ea"/>
+                <a:cs typeface="+mn-cs"/>
+              </a:rPr>
+              <a:t>, Statistiken)</a:t>
+            </a:r>
+            <a:endParaRPr lang="en-US" sz="1200" kern="1200" dirty="0" smtClean="0">
+              <a:solidFill>
+                <a:schemeClr val="tx1"/>
+              </a:solidFill>
+              <a:effectLst/>
+              <a:latin typeface="+mn-lt"/>
+              <a:ea typeface="+mn-ea"/>
+              <a:cs typeface="+mn-cs"/>
+            </a:endParaRPr>
+          </a:p>
+          <a:p>
+            <a:pPr marL="171450" lvl="0" indent="-171450">
+              <a:buFont typeface="Arial"/>
+              <a:buChar char="•"/>
+            </a:pPr>
+            <a:r>
+              <a:rPr lang="de-CH" sz="1200" kern="1200" dirty="0" smtClean="0">
+                <a:solidFill>
+                  <a:schemeClr val="tx1"/>
+                </a:solidFill>
+                <a:effectLst/>
+                <a:latin typeface="+mn-lt"/>
+                <a:ea typeface="+mn-ea"/>
+                <a:cs typeface="+mn-cs"/>
+              </a:rPr>
+              <a:t>Medikamentenliste (Dosis)</a:t>
+            </a:r>
+            <a:endParaRPr lang="en-US" sz="1200" kern="1200" dirty="0" smtClean="0">
+              <a:solidFill>
+                <a:schemeClr val="tx1"/>
+              </a:solidFill>
+              <a:effectLst/>
+              <a:latin typeface="+mn-lt"/>
+              <a:ea typeface="+mn-ea"/>
+              <a:cs typeface="+mn-cs"/>
+            </a:endParaRPr>
+          </a:p>
+          <a:p>
+            <a:pPr marL="171450" lvl="0" indent="-171450">
+              <a:buFont typeface="Arial"/>
+              <a:buChar char="•"/>
+            </a:pPr>
+            <a:r>
+              <a:rPr lang="de-CH" sz="1200" kern="1200" dirty="0" err="1" smtClean="0">
+                <a:solidFill>
+                  <a:schemeClr val="tx1"/>
+                </a:solidFill>
+                <a:effectLst/>
+                <a:latin typeface="+mn-lt"/>
+                <a:ea typeface="+mn-ea"/>
+                <a:cs typeface="+mn-cs"/>
+              </a:rPr>
+              <a:t>Appointments</a:t>
+            </a:r>
+            <a:r>
+              <a:rPr lang="de-CH" sz="1200" kern="1200" dirty="0" smtClean="0">
+                <a:solidFill>
+                  <a:schemeClr val="tx1"/>
+                </a:solidFill>
+                <a:effectLst/>
+                <a:latin typeface="+mn-lt"/>
+                <a:ea typeface="+mn-ea"/>
+                <a:cs typeface="+mn-cs"/>
+              </a:rPr>
+              <a:t> machen, Termine aus Sicht der Patienten</a:t>
+            </a:r>
+            <a:endParaRPr lang="en-US" sz="1200" kern="1200" dirty="0" smtClean="0">
+              <a:solidFill>
+                <a:schemeClr val="tx1"/>
+              </a:solidFill>
+              <a:effectLst/>
+              <a:latin typeface="+mn-lt"/>
+              <a:ea typeface="+mn-ea"/>
+              <a:cs typeface="+mn-cs"/>
+            </a:endParaRPr>
+          </a:p>
+          <a:p>
+            <a:pPr marL="171450" lvl="0" indent="-171450">
+              <a:buFont typeface="Arial"/>
+              <a:buChar char="•"/>
+            </a:pPr>
+            <a:r>
+              <a:rPr lang="de-CH" sz="1200" kern="1200" dirty="0" smtClean="0">
+                <a:solidFill>
+                  <a:schemeClr val="tx1"/>
+                </a:solidFill>
+                <a:effectLst/>
+                <a:latin typeface="+mn-lt"/>
+                <a:ea typeface="+mn-ea"/>
+                <a:cs typeface="+mn-cs"/>
+              </a:rPr>
+              <a:t>Klinikverwaltung (mit Ärzte)</a:t>
+            </a:r>
+            <a:endParaRPr lang="en-US" sz="1200" kern="1200" dirty="0" smtClean="0">
+              <a:solidFill>
+                <a:schemeClr val="tx1"/>
+              </a:solidFill>
+              <a:effectLst/>
+              <a:latin typeface="+mn-lt"/>
+              <a:ea typeface="+mn-ea"/>
+              <a:cs typeface="+mn-cs"/>
+            </a:endParaRPr>
+          </a:p>
+          <a:p>
+            <a:pPr marL="171450" lvl="0" indent="-171450">
+              <a:buFont typeface="Arial"/>
+              <a:buChar char="•"/>
+            </a:pPr>
+            <a:r>
+              <a:rPr lang="de-CH" sz="1200" kern="1200" dirty="0" smtClean="0">
+                <a:solidFill>
+                  <a:schemeClr val="tx1"/>
+                </a:solidFill>
+                <a:effectLst/>
+                <a:latin typeface="+mn-lt"/>
+                <a:ea typeface="+mn-ea"/>
+                <a:cs typeface="+mn-cs"/>
+              </a:rPr>
+              <a:t>Critical </a:t>
+            </a:r>
+            <a:r>
+              <a:rPr lang="de-CH" sz="1200" kern="1200" dirty="0" err="1" smtClean="0">
+                <a:solidFill>
+                  <a:schemeClr val="tx1"/>
+                </a:solidFill>
+                <a:effectLst/>
+                <a:latin typeface="+mn-lt"/>
+                <a:ea typeface="+mn-ea"/>
+                <a:cs typeface="+mn-cs"/>
+              </a:rPr>
+              <a:t>success</a:t>
+            </a:r>
+            <a:r>
+              <a:rPr lang="de-CH" sz="1200" kern="1200" dirty="0" smtClean="0">
+                <a:solidFill>
+                  <a:schemeClr val="tx1"/>
+                </a:solidFill>
+                <a:effectLst/>
+                <a:latin typeface="+mn-lt"/>
+                <a:ea typeface="+mn-ea"/>
+                <a:cs typeface="+mn-cs"/>
+              </a:rPr>
+              <a:t> </a:t>
+            </a:r>
+            <a:r>
+              <a:rPr lang="de-CH" sz="1200" kern="1200" dirty="0" err="1" smtClean="0">
+                <a:solidFill>
+                  <a:schemeClr val="tx1"/>
+                </a:solidFill>
+                <a:effectLst/>
+                <a:latin typeface="+mn-lt"/>
+                <a:ea typeface="+mn-ea"/>
+                <a:cs typeface="+mn-cs"/>
+              </a:rPr>
+              <a:t>factors</a:t>
+            </a:r>
+            <a:endParaRPr lang="en-US" sz="1200" kern="1200" dirty="0" smtClean="0">
+              <a:solidFill>
+                <a:schemeClr val="tx1"/>
+              </a:solidFill>
+              <a:effectLst/>
+              <a:latin typeface="+mn-lt"/>
+              <a:ea typeface="+mn-ea"/>
+              <a:cs typeface="+mn-cs"/>
+            </a:endParaRPr>
+          </a:p>
+          <a:p>
+            <a:pPr marL="171450" lvl="0" indent="-171450">
+              <a:buFont typeface="Arial"/>
+              <a:buChar char="•"/>
+            </a:pPr>
+            <a:r>
+              <a:rPr lang="de-CH" sz="1200" kern="1200" dirty="0" smtClean="0">
+                <a:solidFill>
+                  <a:schemeClr val="tx1"/>
+                </a:solidFill>
+                <a:effectLst/>
+                <a:latin typeface="+mn-lt"/>
+                <a:ea typeface="+mn-ea"/>
+                <a:cs typeface="+mn-cs"/>
+              </a:rPr>
+              <a:t>Suchfunktion (Nach Fränzi)</a:t>
+            </a:r>
+            <a:endParaRPr lang="en-US" sz="1200" kern="1200" dirty="0" smtClean="0">
+              <a:solidFill>
+                <a:schemeClr val="tx1"/>
+              </a:solidFill>
+              <a:effectLst/>
+              <a:latin typeface="+mn-lt"/>
+              <a:ea typeface="+mn-ea"/>
+              <a:cs typeface="+mn-cs"/>
+            </a:endParaRPr>
+          </a:p>
+          <a:p>
+            <a:pPr marL="171450" lvl="0" indent="-171450">
+              <a:buFont typeface="Arial"/>
+              <a:buChar char="•"/>
+            </a:pPr>
+            <a:r>
+              <a:rPr lang="de-CH" sz="1200" kern="1200" dirty="0" smtClean="0">
+                <a:solidFill>
+                  <a:schemeClr val="tx1"/>
+                </a:solidFill>
+                <a:effectLst/>
+                <a:latin typeface="+mn-lt"/>
+                <a:ea typeface="+mn-ea"/>
+                <a:cs typeface="+mn-cs"/>
+              </a:rPr>
+              <a:t>Datenschutz, Datensicherheit, Verfügbarkeit</a:t>
+            </a:r>
+            <a:endParaRPr lang="en-US" sz="1200" kern="1200" dirty="0" smtClean="0">
+              <a:solidFill>
+                <a:schemeClr val="tx1"/>
+              </a:solidFill>
+              <a:effectLst/>
+              <a:latin typeface="+mn-lt"/>
+              <a:ea typeface="+mn-ea"/>
+              <a:cs typeface="+mn-cs"/>
+            </a:endParaRPr>
+          </a:p>
+          <a:p>
+            <a:endParaRPr lang="en-US" dirty="0"/>
+          </a:p>
+        </p:txBody>
+      </p:sp>
+      <p:sp>
+        <p:nvSpPr>
+          <p:cNvPr id="4" name="Slide Number Placeholder 3"/>
+          <p:cNvSpPr>
+            <a:spLocks noGrp="1"/>
+          </p:cNvSpPr>
+          <p:nvPr>
+            <p:ph type="sldNum" sz="quarter" idx="10"/>
+          </p:nvPr>
+        </p:nvSpPr>
+        <p:spPr/>
+        <p:txBody>
+          <a:bodyPr/>
+          <a:lstStyle/>
+          <a:p>
+            <a:fld id="{2011728C-8DA9-4C4B-BAC7-28355581E9A6}" type="slidenum">
+              <a:rPr lang="en-US" smtClean="0"/>
+              <a:t>5</a:t>
+            </a:fld>
+            <a:endParaRPr lang="en-US"/>
+          </a:p>
+        </p:txBody>
+      </p:sp>
+    </p:spTree>
+    <p:extLst>
+      <p:ext uri="{BB962C8B-B14F-4D97-AF65-F5344CB8AC3E}">
+        <p14:creationId xmlns:p14="http://schemas.microsoft.com/office/powerpoint/2010/main" val="2145433959"/>
+      </p:ext>
+    </p:extLst>
+  </p:cSld>
+  <p:clrMapOvr>
+    <a:masterClrMapping/>
+  </p:clrMapOvr>
+</p:notes>
+</file>
+
+<file path=ppt/notesSlides/notesSlide3.xml><?xml version="1.0" encoding="utf-8"?>
+<p:notes xmlns:a="http://schemas.openxmlformats.org/drawingml/2006/main" xmlns:r="http://schemas.openxmlformats.org/officeDocument/2006/relationships" xmlns:p="http://schemas.openxmlformats.org/presentationml/2006/main">
+  <p:cSld>
+    <p:spTree>
+      <p:nvGrpSpPr>
+        <p:cNvPr id="1" name=""/>
+        <p:cNvGrpSpPr/>
+        <p:nvPr/>
+      </p:nvGrpSpPr>
+      <p:grpSpPr>
+        <a:xfrm>
+          <a:off x="0" y="0"/>
+          <a:ext cx="0" cy="0"/>
+          <a:chOff x="0" y="0"/>
+          <a:chExt cx="0" cy="0"/>
+        </a:xfrm>
+      </p:grpSpPr>
+      <p:sp>
+        <p:nvSpPr>
+          <p:cNvPr id="2" name="Slide Image Placeholder 1"/>
+          <p:cNvSpPr>
+            <a:spLocks noGrp="1" noRot="1" noChangeAspect="1"/>
+          </p:cNvSpPr>
+          <p:nvPr>
+            <p:ph type="sldImg"/>
+          </p:nvPr>
+        </p:nvSpPr>
+        <p:spPr/>
+      </p:sp>
+      <p:sp>
+        <p:nvSpPr>
+          <p:cNvPr id="3" name="Notes Placeholder 2"/>
+          <p:cNvSpPr>
+            <a:spLocks noGrp="1"/>
+          </p:cNvSpPr>
+          <p:nvPr>
+            <p:ph type="body" idx="1"/>
+          </p:nvPr>
+        </p:nvSpPr>
+        <p:spPr/>
+        <p:txBody>
+          <a:bodyPr/>
+          <a:lstStyle/>
+          <a:p>
+            <a:pPr marL="171450" lvl="0" indent="-171450">
+              <a:buFont typeface="Arial"/>
+              <a:buChar char="•"/>
+            </a:pPr>
+            <a:r>
+              <a:rPr lang="de-CH" sz="1200" kern="1200" dirty="0" smtClean="0">
+                <a:solidFill>
+                  <a:schemeClr val="tx1"/>
+                </a:solidFill>
+                <a:effectLst/>
+                <a:latin typeface="+mn-lt"/>
+                <a:ea typeface="+mn-ea"/>
+                <a:cs typeface="+mn-cs"/>
+              </a:rPr>
+              <a:t>Key </a:t>
+            </a:r>
+            <a:r>
+              <a:rPr lang="de-CH" sz="1200" kern="1200" dirty="0" err="1" smtClean="0">
+                <a:solidFill>
+                  <a:schemeClr val="tx1"/>
+                </a:solidFill>
+                <a:effectLst/>
+                <a:latin typeface="+mn-lt"/>
+                <a:ea typeface="+mn-ea"/>
+                <a:cs typeface="+mn-cs"/>
+              </a:rPr>
+              <a:t>features</a:t>
+            </a:r>
+            <a:r>
+              <a:rPr lang="de-CH" sz="1200" kern="1200" dirty="0" smtClean="0">
+                <a:solidFill>
+                  <a:schemeClr val="tx1"/>
+                </a:solidFill>
+                <a:effectLst/>
+                <a:latin typeface="+mn-lt"/>
+                <a:ea typeface="+mn-ea"/>
+                <a:cs typeface="+mn-cs"/>
+              </a:rPr>
+              <a:t> implementiert</a:t>
+            </a:r>
+            <a:endParaRPr lang="en-US" sz="1200" kern="1200" dirty="0" smtClean="0">
+              <a:solidFill>
+                <a:schemeClr val="tx1"/>
+              </a:solidFill>
+              <a:effectLst/>
+              <a:latin typeface="+mn-lt"/>
+              <a:ea typeface="+mn-ea"/>
+              <a:cs typeface="+mn-cs"/>
+            </a:endParaRPr>
+          </a:p>
+          <a:p>
+            <a:pPr marL="171450" lvl="0" indent="-171450">
+              <a:buFont typeface="Arial"/>
+              <a:buChar char="•"/>
+            </a:pPr>
+            <a:r>
+              <a:rPr lang="de-CH" sz="1200" kern="1200" dirty="0" smtClean="0">
+                <a:solidFill>
+                  <a:schemeClr val="tx1"/>
+                </a:solidFill>
+                <a:effectLst/>
+                <a:latin typeface="+mn-lt"/>
+                <a:ea typeface="+mn-ea"/>
+                <a:cs typeface="+mn-cs"/>
+              </a:rPr>
+              <a:t>Ärzte haben PC mit Netzwerk-Zugang</a:t>
+            </a:r>
+            <a:endParaRPr lang="en-US" sz="1200" kern="1200" dirty="0" smtClean="0">
+              <a:solidFill>
+                <a:schemeClr val="tx1"/>
+              </a:solidFill>
+              <a:effectLst/>
+              <a:latin typeface="+mn-lt"/>
+              <a:ea typeface="+mn-ea"/>
+              <a:cs typeface="+mn-cs"/>
+            </a:endParaRPr>
+          </a:p>
+          <a:p>
+            <a:pPr marL="171450" lvl="0" indent="-171450">
+              <a:buFont typeface="Arial"/>
+              <a:buChar char="•"/>
+            </a:pPr>
+            <a:r>
+              <a:rPr lang="de-CH" sz="1200" kern="1200" dirty="0" smtClean="0">
+                <a:solidFill>
+                  <a:schemeClr val="tx1"/>
+                </a:solidFill>
+                <a:effectLst/>
+                <a:latin typeface="+mn-lt"/>
+                <a:ea typeface="+mn-ea"/>
+                <a:cs typeface="+mn-cs"/>
+              </a:rPr>
+              <a:t>Gesetzliche Rahmenbedingungen für Datenaustausch</a:t>
+            </a:r>
+            <a:endParaRPr lang="en-US" sz="1200" kern="1200" dirty="0" smtClean="0">
+              <a:solidFill>
+                <a:schemeClr val="tx1"/>
+              </a:solidFill>
+              <a:effectLst/>
+              <a:latin typeface="+mn-lt"/>
+              <a:ea typeface="+mn-ea"/>
+              <a:cs typeface="+mn-cs"/>
+            </a:endParaRPr>
+          </a:p>
+          <a:p>
+            <a:pPr marL="171450" lvl="0" indent="-171450">
+              <a:buFont typeface="Arial"/>
+              <a:buChar char="•"/>
+            </a:pPr>
+            <a:r>
+              <a:rPr lang="de-CH" sz="1200" kern="1200" dirty="0" smtClean="0">
+                <a:solidFill>
+                  <a:schemeClr val="tx1"/>
+                </a:solidFill>
+                <a:effectLst/>
+                <a:latin typeface="+mn-lt"/>
+                <a:ea typeface="+mn-ea"/>
+                <a:cs typeface="+mn-cs"/>
+              </a:rPr>
+              <a:t>Professionelles Projektmanagement</a:t>
+            </a:r>
+            <a:endParaRPr lang="en-US" sz="1200" kern="1200" dirty="0" smtClean="0">
+              <a:solidFill>
+                <a:schemeClr val="tx1"/>
+              </a:solidFill>
+              <a:effectLst/>
+              <a:latin typeface="+mn-lt"/>
+              <a:ea typeface="+mn-ea"/>
+              <a:cs typeface="+mn-cs"/>
+            </a:endParaRPr>
+          </a:p>
+          <a:p>
+            <a:pPr marL="171450" lvl="0" indent="-171450">
+              <a:buFont typeface="Arial"/>
+              <a:buChar char="•"/>
+            </a:pPr>
+            <a:r>
+              <a:rPr lang="de-CH" sz="1200" kern="1200" dirty="0" smtClean="0">
+                <a:solidFill>
+                  <a:schemeClr val="tx1"/>
+                </a:solidFill>
+                <a:effectLst/>
+                <a:latin typeface="+mn-lt"/>
+                <a:ea typeface="+mn-ea"/>
+                <a:cs typeface="+mn-cs"/>
+              </a:rPr>
+              <a:t>Frühzeitiges Erkennen von Risiken</a:t>
+            </a:r>
+            <a:endParaRPr lang="en-US" sz="1200" kern="1200" dirty="0" smtClean="0">
+              <a:solidFill>
+                <a:schemeClr val="tx1"/>
+              </a:solidFill>
+              <a:effectLst/>
+              <a:latin typeface="+mn-lt"/>
+              <a:ea typeface="+mn-ea"/>
+              <a:cs typeface="+mn-cs"/>
+            </a:endParaRPr>
+          </a:p>
+          <a:p>
+            <a:pPr marL="171450" lvl="0" indent="-171450">
+              <a:buFont typeface="Arial"/>
+              <a:buChar char="•"/>
+            </a:pPr>
+            <a:r>
+              <a:rPr lang="de-CH" sz="1200" kern="1200" dirty="0" smtClean="0">
+                <a:solidFill>
+                  <a:schemeClr val="tx1"/>
+                </a:solidFill>
+                <a:effectLst/>
+                <a:latin typeface="+mn-lt"/>
+                <a:ea typeface="+mn-ea"/>
+                <a:cs typeface="+mn-cs"/>
+              </a:rPr>
+              <a:t>Ausreichende Planung vor der Implementierung</a:t>
+            </a:r>
+            <a:endParaRPr lang="en-US" sz="1200" kern="1200" dirty="0" smtClean="0">
+              <a:solidFill>
+                <a:schemeClr val="tx1"/>
+              </a:solidFill>
+              <a:effectLst/>
+              <a:latin typeface="+mn-lt"/>
+              <a:ea typeface="+mn-ea"/>
+              <a:cs typeface="+mn-cs"/>
+            </a:endParaRPr>
+          </a:p>
+          <a:p>
+            <a:pPr marL="171450" lvl="0" indent="-171450">
+              <a:buFont typeface="Arial"/>
+              <a:buChar char="•"/>
+            </a:pPr>
+            <a:r>
+              <a:rPr lang="de-CH" sz="1200" kern="1200" dirty="0" smtClean="0">
+                <a:solidFill>
+                  <a:schemeClr val="tx1"/>
+                </a:solidFill>
+                <a:effectLst/>
+                <a:latin typeface="+mn-lt"/>
+                <a:ea typeface="+mn-ea"/>
+                <a:cs typeface="+mn-cs"/>
+              </a:rPr>
+              <a:t>Weitere, projektspezifische Faktoren</a:t>
+            </a:r>
+            <a:endParaRPr lang="en-US" sz="1200" kern="1200" dirty="0" smtClean="0">
+              <a:solidFill>
+                <a:schemeClr val="tx1"/>
+              </a:solidFill>
+              <a:effectLst/>
+              <a:latin typeface="+mn-lt"/>
+              <a:ea typeface="+mn-ea"/>
+              <a:cs typeface="+mn-cs"/>
+            </a:endParaRPr>
+          </a:p>
+          <a:p>
+            <a:pPr marL="171450" indent="-171450">
+              <a:buFont typeface="Arial"/>
+              <a:buChar char="•"/>
+            </a:pPr>
+            <a:endParaRPr lang="en-US" dirty="0"/>
+          </a:p>
+        </p:txBody>
+      </p:sp>
+      <p:sp>
+        <p:nvSpPr>
+          <p:cNvPr id="4" name="Slide Number Placeholder 3"/>
+          <p:cNvSpPr>
+            <a:spLocks noGrp="1"/>
+          </p:cNvSpPr>
+          <p:nvPr>
+            <p:ph type="sldNum" sz="quarter" idx="10"/>
+          </p:nvPr>
+        </p:nvSpPr>
+        <p:spPr/>
+        <p:txBody>
+          <a:bodyPr/>
+          <a:lstStyle/>
+          <a:p>
+            <a:fld id="{2011728C-8DA9-4C4B-BAC7-28355581E9A6}" type="slidenum">
+              <a:rPr lang="en-US" smtClean="0"/>
+              <a:t>7</a:t>
+            </a:fld>
+            <a:endParaRPr lang="en-US"/>
+          </a:p>
+        </p:txBody>
+      </p:sp>
+    </p:spTree>
+    <p:extLst>
+      <p:ext uri="{BB962C8B-B14F-4D97-AF65-F5344CB8AC3E}">
+        <p14:creationId xmlns:p14="http://schemas.microsoft.com/office/powerpoint/2010/main" val="3828349362"/>
       </p:ext>
     </p:extLst>
   </p:cSld>
@@ -10198,7 +11049,7 @@
             <a:fld id="{7D0065BE-0657-4A47-90AD-C21C55E16B19}" type="datetime4">
               <a:rPr lang="en-US" smtClean="0"/>
               <a:pPr/>
-              <a:t>February 28, 2013</a:t>
+              <a:t>March 1, 2013</a:t>
             </a:fld>
             <a:endParaRPr lang="en-US"/>
           </a:p>
@@ -10365,7 +11216,7 @@
             <a:fld id="{A16C3AA4-67BE-44F7-809A-3582401494AF}" type="datetime4">
               <a:rPr lang="en-US" smtClean="0"/>
               <a:pPr/>
-              <a:t>February 28, 2013</a:t>
+              <a:t>March 1, 2013</a:t>
             </a:fld>
             <a:endParaRPr lang="en-US"/>
           </a:p>
@@ -10542,7 +11393,7 @@
             <a:fld id="{25172EEB-1769-4776-AD69-E7C1260563EB}" type="datetime4">
               <a:rPr lang="en-US" smtClean="0"/>
               <a:pPr/>
-              <a:t>February 28, 2013</a:t>
+              <a:t>March 1, 2013</a:t>
             </a:fld>
             <a:endParaRPr lang="en-US"/>
           </a:p>
@@ -10709,7 +11560,7 @@
             <a:fld id="{D47BB8AF-C16A-4836-A92D-61834B5F0BA5}" type="datetime4">
               <a:rPr lang="en-US" smtClean="0"/>
               <a:pPr/>
-              <a:t>February 28, 2013</a:t>
+              <a:t>March 1, 2013</a:t>
             </a:fld>
             <a:endParaRPr lang="en-US"/>
           </a:p>
@@ -11264,7 +12115,7 @@
             <a:fld id="{647D2193-4505-4A75-99BB-880C6989A757}" type="datetime4">
               <a:rPr lang="en-US" smtClean="0"/>
               <a:pPr/>
-              <a:t>February 28, 2013</a:t>
+              <a:t>March 1, 2013</a:t>
             </a:fld>
             <a:endParaRPr lang="en-US"/>
           </a:p>
@@ -11526,7 +12377,7 @@
             <a:fld id="{113A18F4-33C3-445B-924C-31108C51719C}" type="datetime4">
               <a:rPr lang="en-US" smtClean="0"/>
               <a:pPr/>
-              <a:t>February 28, 2013</a:t>
+              <a:t>March 1, 2013</a:t>
             </a:fld>
             <a:endParaRPr lang="en-US"/>
           </a:p>
@@ -12016,7 +12867,7 @@
             <a:fld id="{3AF7543A-E259-478F-9E0D-57BA40E442B7}" type="datetime4">
               <a:rPr lang="en-US" smtClean="0"/>
               <a:pPr/>
-              <a:t>February 28, 2013</a:t>
+              <a:t>March 1, 2013</a:t>
             </a:fld>
             <a:endParaRPr lang="en-US"/>
           </a:p>
@@ -12131,7 +12982,7 @@
             <a:fld id="{1EFB012D-77A1-44B0-BB26-329BA1EE55C9}" type="datetime4">
               <a:rPr lang="en-US" smtClean="0"/>
               <a:pPr/>
-              <a:t>February 28, 2013</a:t>
+              <a:t>March 1, 2013</a:t>
             </a:fld>
             <a:endParaRPr lang="en-US"/>
           </a:p>
@@ -12223,7 +13074,7 @@
             <a:fld id="{94B7499E-3031-413E-B01E-B94970708CAA}" type="datetime4">
               <a:rPr lang="en-US" smtClean="0"/>
               <a:pPr/>
-              <a:t>February 28, 2013</a:t>
+              <a:t>March 1, 2013</a:t>
             </a:fld>
             <a:endParaRPr lang="en-US"/>
           </a:p>
@@ -12655,7 +13506,7 @@
             <a:fld id="{DC7EAB0C-2220-4D0E-A0DD-DB7FA0F742F4}" type="datetime4">
               <a:rPr lang="en-US" smtClean="0"/>
               <a:pPr/>
-              <a:t>February 28, 2013</a:t>
+              <a:t>March 1, 2013</a:t>
             </a:fld>
             <a:endParaRPr lang="en-US"/>
           </a:p>
@@ -13186,7 +14037,7 @@
             <a:fld id="{E3416D63-31BF-4B94-B6C5-E20B2C63F515}" type="datetime4">
               <a:rPr lang="en-US" smtClean="0"/>
               <a:pPr/>
-              <a:t>February 28, 2013</a:t>
+              <a:t>March 1, 2013</a:t>
             </a:fld>
             <a:endParaRPr lang="en-US"/>
           </a:p>
@@ -14028,7 +14879,7 @@
             <a:fld id="{62B1B13E-D5AF-485E-81A1-82A140076526}" type="datetime4">
               <a:rPr lang="en-US" smtClean="0"/>
               <a:pPr/>
-              <a:t>February 28, 2013</a:t>
+              <a:t>March 1, 2013</a:t>
             </a:fld>
             <a:endParaRPr lang="en-US" dirty="0"/>
           </a:p>
@@ -14487,201 +15338,17 @@
   <p:clrMapOvr>
     <a:masterClrMapping/>
   </p:clrMapOvr>
+  <p:timing>
+    <p:tnLst>
+      <p:par>
+        <p:cTn xmlns:p14="http://schemas.microsoft.com/office/powerpoint/2010/main" id="1" dur="indefinite" restart="never" nodeType="tmRoot"/>
+      </p:par>
+    </p:tnLst>
+  </p:timing>
 </p:sld>
 </file>
 
 <file path=ppt/slides/slide10.xml><?xml version="1.0" encoding="utf-8"?>
-<p:sld xmlns:a="http://schemas.openxmlformats.org/drawingml/2006/main" xmlns:r="http://schemas.openxmlformats.org/officeDocument/2006/relationships" xmlns:p="http://schemas.openxmlformats.org/presentationml/2006/main">
-  <p:cSld>
-    <p:spTree>
-      <p:nvGrpSpPr>
-        <p:cNvPr id="1" name=""/>
-        <p:cNvGrpSpPr/>
-        <p:nvPr/>
-      </p:nvGrpSpPr>
-      <p:grpSpPr>
-        <a:xfrm>
-          <a:off x="0" y="0"/>
-          <a:ext cx="0" cy="0"/>
-          <a:chOff x="0" y="0"/>
-          <a:chExt cx="0" cy="0"/>
-        </a:xfrm>
-      </p:grpSpPr>
-      <p:sp>
-        <p:nvSpPr>
-          <p:cNvPr id="2" name="Title 1"/>
-          <p:cNvSpPr>
-            <a:spLocks noGrp="1"/>
-          </p:cNvSpPr>
-          <p:nvPr>
-            <p:ph type="title"/>
-          </p:nvPr>
-        </p:nvSpPr>
-        <p:spPr/>
-        <p:txBody>
-          <a:bodyPr/>
-          <a:lstStyle/>
-          <a:p>
-            <a:r>
-              <a:rPr lang="en-US" dirty="0" smtClean="0"/>
-              <a:t>System components and high-level architecture</a:t>
-            </a:r>
-            <a:endParaRPr lang="en-US" dirty="0"/>
-          </a:p>
-        </p:txBody>
-      </p:sp>
-      <p:sp>
-        <p:nvSpPr>
-          <p:cNvPr id="3" name="Text Placeholder 2"/>
-          <p:cNvSpPr>
-            <a:spLocks noGrp="1"/>
-          </p:cNvSpPr>
-          <p:nvPr>
-            <p:ph type="body" idx="1"/>
-          </p:nvPr>
-        </p:nvSpPr>
-        <p:spPr/>
-        <p:txBody>
-          <a:bodyPr/>
-          <a:lstStyle/>
-          <a:p>
-            <a:endParaRPr lang="en-US"/>
-          </a:p>
-        </p:txBody>
-      </p:sp>
-    </p:spTree>
-    <p:extLst>
-      <p:ext uri="{BB962C8B-B14F-4D97-AF65-F5344CB8AC3E}">
-        <p14:creationId xmlns:p14="http://schemas.microsoft.com/office/powerpoint/2010/main" val="1223993298"/>
-      </p:ext>
-    </p:extLst>
-  </p:cSld>
-  <p:clrMapOvr>
-    <a:masterClrMapping/>
-  </p:clrMapOvr>
-</p:sld>
-</file>
-
-<file path=ppt/slides/slide11.xml><?xml version="1.0" encoding="utf-8"?>
-<p:sld xmlns:a="http://schemas.openxmlformats.org/drawingml/2006/main" xmlns:r="http://schemas.openxmlformats.org/officeDocument/2006/relationships" xmlns:p="http://schemas.openxmlformats.org/presentationml/2006/main">
-  <p:cSld>
-    <p:spTree>
-      <p:nvGrpSpPr>
-        <p:cNvPr id="1" name=""/>
-        <p:cNvGrpSpPr/>
-        <p:nvPr/>
-      </p:nvGrpSpPr>
-      <p:grpSpPr>
-        <a:xfrm>
-          <a:off x="0" y="0"/>
-          <a:ext cx="0" cy="0"/>
-          <a:chOff x="0" y="0"/>
-          <a:chExt cx="0" cy="0"/>
-        </a:xfrm>
-      </p:grpSpPr>
-      <p:sp>
-        <p:nvSpPr>
-          <p:cNvPr id="2" name="Title 1"/>
-          <p:cNvSpPr>
-            <a:spLocks noGrp="1"/>
-          </p:cNvSpPr>
-          <p:nvPr>
-            <p:ph type="title"/>
-          </p:nvPr>
-        </p:nvSpPr>
-        <p:spPr/>
-        <p:txBody>
-          <a:bodyPr/>
-          <a:lstStyle/>
-          <a:p>
-            <a:r>
-              <a:rPr lang="en-US" dirty="0" smtClean="0"/>
-              <a:t>high-level architecture</a:t>
-            </a:r>
-            <a:endParaRPr lang="en-US" dirty="0"/>
-          </a:p>
-        </p:txBody>
-      </p:sp>
-      <p:sp>
-        <p:nvSpPr>
-          <p:cNvPr id="4" name="Content Placeholder 3"/>
-          <p:cNvSpPr>
-            <a:spLocks noGrp="1"/>
-          </p:cNvSpPr>
-          <p:nvPr>
-            <p:ph idx="1"/>
-          </p:nvPr>
-        </p:nvSpPr>
-        <p:spPr/>
-        <p:txBody>
-          <a:bodyPr/>
-          <a:lstStyle/>
-          <a:p>
-            <a:pPr marL="457200" indent="-457200">
-              <a:buFont typeface="Arial"/>
-              <a:buChar char="•"/>
-            </a:pPr>
-            <a:r>
-              <a:rPr lang="en-US" dirty="0" smtClean="0"/>
-              <a:t>Client – Server</a:t>
-            </a:r>
-          </a:p>
-          <a:p>
-            <a:pPr marL="457200" indent="-457200">
-              <a:buFont typeface="Arial"/>
-              <a:buChar char="•"/>
-            </a:pPr>
-            <a:endParaRPr lang="en-US" dirty="0" smtClean="0"/>
-          </a:p>
-          <a:p>
-            <a:pPr marL="457200" indent="-457200">
-              <a:buFont typeface="Arial"/>
-              <a:buChar char="•"/>
-            </a:pPr>
-            <a:r>
-              <a:rPr lang="en-US" dirty="0" smtClean="0"/>
-              <a:t>Web Application</a:t>
-            </a:r>
-          </a:p>
-        </p:txBody>
-      </p:sp>
-      <p:sp>
-        <p:nvSpPr>
-          <p:cNvPr id="5" name="Text Placeholder 4"/>
-          <p:cNvSpPr>
-            <a:spLocks noGrp="1"/>
-          </p:cNvSpPr>
-          <p:nvPr>
-            <p:ph type="body" sz="half" idx="2"/>
-          </p:nvPr>
-        </p:nvSpPr>
-        <p:spPr/>
-        <p:txBody>
-          <a:bodyPr/>
-          <a:lstStyle/>
-          <a:p>
-            <a:r>
-              <a:rPr lang="en-US" dirty="0" smtClean="0"/>
-              <a:t>Decisions</a:t>
-            </a:r>
-            <a:endParaRPr lang="en-US" dirty="0"/>
-          </a:p>
-        </p:txBody>
-      </p:sp>
-    </p:spTree>
-    <p:extLst>
-      <p:ext uri="{BB962C8B-B14F-4D97-AF65-F5344CB8AC3E}">
-        <p14:creationId xmlns:p14="http://schemas.microsoft.com/office/powerpoint/2010/main" val="1868776008"/>
-      </p:ext>
-    </p:extLst>
-  </p:cSld>
-  <p:clrMapOvr>
-    <a:masterClrMapping/>
-  </p:clrMapOvr>
-</p:sld>
-</file>
-
-<file path=ppt/slides/slide12.xml><?xml version="1.0" encoding="utf-8"?>
 <p:sld xmlns:a="http://schemas.openxmlformats.org/drawingml/2006/main" xmlns:r="http://schemas.openxmlformats.org/officeDocument/2006/relationships" xmlns:p="http://schemas.openxmlformats.org/presentationml/2006/main">
   <p:cSld>
     <p:spTree>
@@ -14756,86 +15423,13 @@
   <p:clrMapOvr>
     <a:masterClrMapping/>
   </p:clrMapOvr>
-</p:sld>
-</file>
-
-<file path=ppt/slides/slide13.xml><?xml version="1.0" encoding="utf-8"?>
-<p:sld xmlns:a="http://schemas.openxmlformats.org/drawingml/2006/main" xmlns:r="http://schemas.openxmlformats.org/officeDocument/2006/relationships" xmlns:p="http://schemas.openxmlformats.org/presentationml/2006/main">
-  <p:cSld>
-    <p:spTree>
-      <p:nvGrpSpPr>
-        <p:cNvPr id="1" name=""/>
-        <p:cNvGrpSpPr/>
-        <p:nvPr/>
-      </p:nvGrpSpPr>
-      <p:grpSpPr>
-        <a:xfrm>
-          <a:off x="0" y="0"/>
-          <a:ext cx="0" cy="0"/>
-          <a:chOff x="0" y="0"/>
-          <a:chExt cx="0" cy="0"/>
-        </a:xfrm>
-      </p:grpSpPr>
-      <p:sp>
-        <p:nvSpPr>
-          <p:cNvPr id="2" name="Title 1"/>
-          <p:cNvSpPr>
-            <a:spLocks noGrp="1"/>
-          </p:cNvSpPr>
-          <p:nvPr>
-            <p:ph type="title"/>
-          </p:nvPr>
-        </p:nvSpPr>
-        <p:spPr/>
-        <p:txBody>
-          <a:bodyPr/>
-          <a:lstStyle/>
-          <a:p>
-            <a:r>
-              <a:rPr lang="en-US" dirty="0" smtClean="0"/>
-              <a:t>questions?</a:t>
-            </a:r>
-            <a:endParaRPr lang="en-US" dirty="0"/>
-          </a:p>
-        </p:txBody>
-      </p:sp>
-      <p:sp>
-        <p:nvSpPr>
-          <p:cNvPr id="3" name="Text Placeholder 2"/>
-          <p:cNvSpPr>
-            <a:spLocks noGrp="1"/>
-          </p:cNvSpPr>
-          <p:nvPr>
-            <p:ph type="body" idx="1"/>
-          </p:nvPr>
-        </p:nvSpPr>
-        <p:spPr/>
-        <p:txBody>
-          <a:bodyPr/>
-          <a:lstStyle/>
-          <a:p>
-            <a:r>
-              <a:rPr lang="en-US" dirty="0" smtClean="0"/>
-              <a:t>project pink – </a:t>
-            </a:r>
-            <a:r>
-              <a:rPr lang="en-US" dirty="0" err="1" smtClean="0"/>
-              <a:t>hmc-pms</a:t>
-            </a:r>
-            <a:endParaRPr lang="en-US" dirty="0"/>
-          </a:p>
-        </p:txBody>
-      </p:sp>
-    </p:spTree>
-    <p:extLst>
-      <p:ext uri="{BB962C8B-B14F-4D97-AF65-F5344CB8AC3E}">
-        <p14:creationId xmlns:p14="http://schemas.microsoft.com/office/powerpoint/2010/main" val="1753375129"/>
-      </p:ext>
-    </p:extLst>
-  </p:cSld>
-  <p:clrMapOvr>
-    <a:masterClrMapping/>
-  </p:clrMapOvr>
+  <p:timing>
+    <p:tnLst>
+      <p:par>
+        <p:cTn xmlns:p14="http://schemas.microsoft.com/office/powerpoint/2010/main" id="1" dur="indefinite" restart="never" nodeType="tmRoot"/>
+      </p:par>
+    </p:tnLst>
+  </p:timing>
 </p:sld>
 </file>
 
@@ -14873,181 +15467,6 @@
           <a:p>
             <a:r>
               <a:rPr lang="en-US" dirty="0" smtClean="0"/>
-              <a:t>Overview</a:t>
-            </a:r>
-            <a:endParaRPr lang="en-US" dirty="0"/>
-          </a:p>
-        </p:txBody>
-      </p:sp>
-      <p:sp>
-        <p:nvSpPr>
-          <p:cNvPr id="3" name="Content Placeholder 2"/>
-          <p:cNvSpPr>
-            <a:spLocks noGrp="1"/>
-          </p:cNvSpPr>
-          <p:nvPr>
-            <p:ph idx="1"/>
-          </p:nvPr>
-        </p:nvSpPr>
-        <p:spPr/>
-        <p:txBody>
-          <a:bodyPr/>
-          <a:lstStyle/>
-          <a:p>
-            <a:pPr>
-              <a:buFont typeface="Arial"/>
-              <a:buChar char="•"/>
-            </a:pPr>
-            <a:r>
-              <a:rPr lang="en-US" dirty="0" smtClean="0"/>
-              <a:t>We identified </a:t>
-            </a:r>
-            <a:r>
-              <a:rPr lang="en-US" dirty="0" smtClean="0">
-                <a:solidFill>
-                  <a:schemeClr val="accent4"/>
-                </a:solidFill>
-              </a:rPr>
-              <a:t>target users </a:t>
-            </a:r>
-            <a:r>
-              <a:rPr lang="en-US" dirty="0" smtClean="0"/>
-              <a:t>for MHC-PMS</a:t>
-            </a:r>
-          </a:p>
-          <a:p>
-            <a:pPr>
-              <a:buFont typeface="Arial"/>
-              <a:buChar char="•"/>
-            </a:pPr>
-            <a:endParaRPr lang="en-US" dirty="0" smtClean="0"/>
-          </a:p>
-          <a:p>
-            <a:pPr>
-              <a:buFont typeface="Arial"/>
-              <a:buChar char="•"/>
-            </a:pPr>
-            <a:r>
-              <a:rPr lang="en-US" dirty="0" smtClean="0"/>
-              <a:t>We defined </a:t>
-            </a:r>
-            <a:r>
-              <a:rPr lang="en-US" dirty="0" smtClean="0">
-                <a:solidFill>
-                  <a:srgbClr val="B45EC7"/>
-                </a:solidFill>
-              </a:rPr>
-              <a:t>key features </a:t>
-            </a:r>
-            <a:r>
-              <a:rPr lang="en-US" dirty="0" smtClean="0"/>
-              <a:t>of the system</a:t>
-            </a:r>
-          </a:p>
-          <a:p>
-            <a:pPr>
-              <a:buFont typeface="Arial"/>
-              <a:buChar char="•"/>
-            </a:pPr>
-            <a:endParaRPr lang="en-US" dirty="0" smtClean="0"/>
-          </a:p>
-          <a:p>
-            <a:pPr>
-              <a:buFont typeface="Arial"/>
-              <a:buChar char="•"/>
-            </a:pPr>
-            <a:r>
-              <a:rPr lang="en-US" dirty="0" smtClean="0"/>
-              <a:t>For the project, we identified </a:t>
-            </a:r>
-            <a:r>
-              <a:rPr lang="en-US" dirty="0" smtClean="0">
-                <a:solidFill>
-                  <a:srgbClr val="B45EC7"/>
-                </a:solidFill>
-              </a:rPr>
-              <a:t>critical success factors</a:t>
-            </a:r>
-          </a:p>
-          <a:p>
-            <a:pPr>
-              <a:buFont typeface="Arial"/>
-              <a:buChar char="•"/>
-            </a:pPr>
-            <a:endParaRPr lang="en-US" dirty="0"/>
-          </a:p>
-          <a:p>
-            <a:pPr>
-              <a:buFont typeface="Arial"/>
-              <a:buChar char="•"/>
-            </a:pPr>
-            <a:r>
-              <a:rPr lang="en-US" dirty="0" smtClean="0"/>
-              <a:t>And as a first step in designing the system, we defined</a:t>
-            </a:r>
-            <a:r>
-              <a:rPr lang="en-US" dirty="0" smtClean="0">
-                <a:solidFill>
-                  <a:srgbClr val="B45EC7"/>
-                </a:solidFill>
-              </a:rPr>
-              <a:t> potential system components and a possible high-level architecture</a:t>
-            </a:r>
-            <a:endParaRPr lang="en-US" dirty="0">
-              <a:solidFill>
-                <a:srgbClr val="B45EC7"/>
-              </a:solidFill>
-            </a:endParaRPr>
-          </a:p>
-        </p:txBody>
-      </p:sp>
-    </p:spTree>
-    <p:extLst>
-      <p:ext uri="{BB962C8B-B14F-4D97-AF65-F5344CB8AC3E}">
-        <p14:creationId xmlns:p14="http://schemas.microsoft.com/office/powerpoint/2010/main" val="867285725"/>
-      </p:ext>
-    </p:extLst>
-  </p:cSld>
-  <p:clrMapOvr>
-    <a:masterClrMapping/>
-  </p:clrMapOvr>
-</p:sld>
-</file>
-
-<file path=ppt/slides/slide3.xml><?xml version="1.0" encoding="utf-8"?>
-<p:sld xmlns:a="http://schemas.openxmlformats.org/drawingml/2006/main" xmlns:r="http://schemas.openxmlformats.org/officeDocument/2006/relationships" xmlns:p="http://schemas.openxmlformats.org/presentationml/2006/main">
-  <p:cSld>
-    <p:spTree>
-      <p:nvGrpSpPr>
-        <p:cNvPr id="1" name=""/>
-        <p:cNvGrpSpPr/>
-        <p:nvPr/>
-      </p:nvGrpSpPr>
-      <p:grpSpPr>
-        <a:xfrm>
-          <a:off x="0" y="0"/>
-          <a:ext cx="0" cy="0"/>
-          <a:chOff x="0" y="0"/>
-          <a:chExt cx="0" cy="0"/>
-        </a:xfrm>
-      </p:grpSpPr>
-      <p:sp>
-        <p:nvSpPr>
-          <p:cNvPr id="2" name="Title 1"/>
-          <p:cNvSpPr>
-            <a:spLocks noGrp="1"/>
-          </p:cNvSpPr>
-          <p:nvPr>
-            <p:ph type="title"/>
-          </p:nvPr>
-        </p:nvSpPr>
-        <p:spPr/>
-        <p:txBody>
-          <a:bodyPr/>
-          <a:lstStyle/>
-          <a:p>
-            <a:r>
-              <a:rPr lang="en-US" dirty="0" smtClean="0"/>
               <a:t>Identifying target users</a:t>
             </a:r>
             <a:endParaRPr lang="en-US" dirty="0"/>
@@ -15105,7 +15524,7 @@
 </p:sld>
 </file>
 
-<file path=ppt/slides/slide4.xml><?xml version="1.0" encoding="utf-8"?>
+<file path=ppt/slides/slide3.xml><?xml version="1.0" encoding="utf-8"?>
 <p:sld xmlns:a="http://schemas.openxmlformats.org/drawingml/2006/main" xmlns:r="http://schemas.openxmlformats.org/officeDocument/2006/relationships" xmlns:p="http://schemas.openxmlformats.org/presentationml/2006/main">
   <p:cSld>
     <p:spTree>
@@ -15503,7 +15922,7 @@
 </p:sld>
 </file>
 
-<file path=ppt/slides/slide5.xml><?xml version="1.0" encoding="utf-8"?>
+<file path=ppt/slides/slide4.xml><?xml version="1.0" encoding="utf-8"?>
 <p:sld xmlns:a="http://schemas.openxmlformats.org/drawingml/2006/main" xmlns:r="http://schemas.openxmlformats.org/officeDocument/2006/relationships" xmlns:p="http://schemas.openxmlformats.org/presentationml/2006/main">
   <p:cSld>
     <p:spTree>
@@ -15580,6 +15999,98 @@
   <p:clrMapOvr>
     <a:masterClrMapping/>
   </p:clrMapOvr>
+  <p:timing>
+    <p:tnLst>
+      <p:par>
+        <p:cTn xmlns:p14="http://schemas.microsoft.com/office/powerpoint/2010/main" id="1" dur="indefinite" restart="never" nodeType="tmRoot"/>
+      </p:par>
+    </p:tnLst>
+  </p:timing>
+</p:sld>
+</file>
+
+<file path=ppt/slides/slide5.xml><?xml version="1.0" encoding="utf-8"?>
+<p:sld xmlns:a="http://schemas.openxmlformats.org/drawingml/2006/main" xmlns:r="http://schemas.openxmlformats.org/officeDocument/2006/relationships" xmlns:p="http://schemas.openxmlformats.org/presentationml/2006/main">
+  <p:cSld>
+    <p:spTree>
+      <p:nvGrpSpPr>
+        <p:cNvPr id="1" name=""/>
+        <p:cNvGrpSpPr/>
+        <p:nvPr/>
+      </p:nvGrpSpPr>
+      <p:grpSpPr>
+        <a:xfrm>
+          <a:off x="0" y="0"/>
+          <a:ext cx="0" cy="0"/>
+          <a:chOff x="0" y="0"/>
+          <a:chExt cx="0" cy="0"/>
+        </a:xfrm>
+      </p:grpSpPr>
+      <p:sp>
+        <p:nvSpPr>
+          <p:cNvPr id="2" name="Title 1"/>
+          <p:cNvSpPr>
+            <a:spLocks noGrp="1"/>
+          </p:cNvSpPr>
+          <p:nvPr>
+            <p:ph type="title"/>
+          </p:nvPr>
+        </p:nvSpPr>
+        <p:spPr/>
+        <p:txBody>
+          <a:bodyPr/>
+          <a:lstStyle/>
+          <a:p>
+            <a:r>
+              <a:rPr lang="en-US" dirty="0" smtClean="0"/>
+              <a:t>key features</a:t>
+            </a:r>
+            <a:endParaRPr lang="en-US" dirty="0"/>
+          </a:p>
+        </p:txBody>
+      </p:sp>
+      <p:graphicFrame>
+        <p:nvGraphicFramePr>
+          <p:cNvPr id="5" name="Content Placeholder 4"/>
+          <p:cNvGraphicFramePr>
+            <a:graphicFrameLocks noGrp="1"/>
+          </p:cNvGraphicFramePr>
+          <p:nvPr>
+            <p:ph idx="1"/>
+            <p:extLst>
+              <p:ext uri="{D42A27DB-BD31-4B8C-83A1-F6EECF244321}">
+                <p14:modId xmlns:p14="http://schemas.microsoft.com/office/powerpoint/2010/main" val="3908103841"/>
+              </p:ext>
+            </p:extLst>
+          </p:nvPr>
+        </p:nvGraphicFramePr>
+        <p:xfrm>
+          <a:off x="822960" y="1100628"/>
+          <a:ext cx="7520940" cy="3579849"/>
+        </p:xfrm>
+        <a:graphic>
+          <a:graphicData uri="http://schemas.openxmlformats.org/drawingml/2006/diagram">
+            <dgm:relIds xmlns:dgm="http://schemas.openxmlformats.org/drawingml/2006/diagram" xmlns:r="http://schemas.openxmlformats.org/officeDocument/2006/relationships" r:dm="rId3" r:lo="rId4" r:qs="rId5" r:cs="rId6"/>
+          </a:graphicData>
+        </a:graphic>
+      </p:graphicFrame>
+    </p:spTree>
+    <p:extLst>
+      <p:ext uri="{BB962C8B-B14F-4D97-AF65-F5344CB8AC3E}">
+        <p14:creationId xmlns:p14="http://schemas.microsoft.com/office/powerpoint/2010/main" val="3103134270"/>
+      </p:ext>
+    </p:extLst>
+  </p:cSld>
+  <p:clrMapOvr>
+    <a:masterClrMapping/>
+  </p:clrMapOvr>
+  <p:timing>
+    <p:tnLst>
+      <p:par>
+        <p:cTn xmlns:p14="http://schemas.microsoft.com/office/powerpoint/2010/main" id="1" dur="indefinite" restart="never" nodeType="tmRoot"/>
+      </p:par>
+    </p:tnLst>
+  </p:timing>
 </p:sld>
 </file>
 
@@ -15617,7 +16128,7 @@
           <a:p>
             <a:r>
               <a:rPr lang="en-US" dirty="0" smtClean="0"/>
-              <a:t>overall goals</a:t>
+              <a:t>Critical Success Factors</a:t>
             </a:r>
             <a:endParaRPr lang="en-US" dirty="0"/>
           </a:p>
@@ -15625,281 +16136,12 @@
       </p:sp>
       <p:sp>
         <p:nvSpPr>
-          <p:cNvPr id="3" name="Content Placeholder 2"/>
+          <p:cNvPr id="3" name="Text Placeholder 2"/>
           <p:cNvSpPr>
             <a:spLocks noGrp="1"/>
           </p:cNvSpPr>
           <p:nvPr>
-            <p:ph idx="1"/>
-          </p:nvPr>
-        </p:nvSpPr>
-        <p:spPr/>
-        <p:txBody>
-          <a:bodyPr>
-            <a:normAutofit fontScale="70000" lnSpcReduction="20000"/>
-          </a:bodyPr>
-          <a:lstStyle/>
-          <a:p>
-            <a:pPr lvl="0"/>
-            <a:r>
-              <a:rPr lang="de-CH" dirty="0" err="1"/>
-              <a:t>To</a:t>
-            </a:r>
-            <a:r>
-              <a:rPr lang="de-CH" dirty="0"/>
-              <a:t> </a:t>
-            </a:r>
-            <a:r>
-              <a:rPr lang="de-CH" dirty="0" err="1"/>
-              <a:t>provide</a:t>
-            </a:r>
-            <a:r>
-              <a:rPr lang="de-CH" dirty="0"/>
-              <a:t> </a:t>
-            </a:r>
-            <a:r>
-              <a:rPr lang="de-CH" dirty="0" err="1"/>
-              <a:t>medical</a:t>
-            </a:r>
-            <a:r>
-              <a:rPr lang="de-CH" dirty="0"/>
-              <a:t> </a:t>
-            </a:r>
-            <a:r>
-              <a:rPr lang="de-CH" dirty="0" err="1"/>
-              <a:t>staff</a:t>
-            </a:r>
-            <a:r>
-              <a:rPr lang="de-CH" dirty="0"/>
-              <a:t> </a:t>
-            </a:r>
-            <a:r>
-              <a:rPr lang="de-CH" dirty="0" err="1"/>
-              <a:t>with</a:t>
-            </a:r>
-            <a:r>
-              <a:rPr lang="de-CH" dirty="0"/>
-              <a:t> </a:t>
-            </a:r>
-            <a:r>
-              <a:rPr lang="de-CH" dirty="0" err="1"/>
-              <a:t>timely</a:t>
-            </a:r>
-            <a:r>
-              <a:rPr lang="de-CH" dirty="0"/>
-              <a:t> </a:t>
-            </a:r>
-            <a:r>
-              <a:rPr lang="de-CH" dirty="0" err="1"/>
-              <a:t>information</a:t>
-            </a:r>
-            <a:r>
-              <a:rPr lang="de-CH" dirty="0"/>
-              <a:t> </a:t>
-            </a:r>
-            <a:r>
-              <a:rPr lang="de-CH" dirty="0" err="1"/>
-              <a:t>to</a:t>
-            </a:r>
-            <a:r>
-              <a:rPr lang="de-CH" dirty="0"/>
-              <a:t> </a:t>
-            </a:r>
-            <a:r>
-              <a:rPr lang="de-CH" dirty="0" err="1"/>
-              <a:t>facilitate</a:t>
-            </a:r>
-            <a:r>
-              <a:rPr lang="de-CH" dirty="0"/>
-              <a:t> </a:t>
-            </a:r>
-            <a:r>
-              <a:rPr lang="de-CH" dirty="0" err="1"/>
-              <a:t>the</a:t>
-            </a:r>
-            <a:r>
-              <a:rPr lang="de-CH" dirty="0"/>
-              <a:t> </a:t>
-            </a:r>
-            <a:r>
-              <a:rPr lang="de-CH" dirty="0" err="1"/>
-              <a:t>treatment</a:t>
-            </a:r>
-            <a:r>
-              <a:rPr lang="de-CH" dirty="0"/>
-              <a:t> </a:t>
-            </a:r>
-            <a:r>
-              <a:rPr lang="de-CH" dirty="0" err="1"/>
-              <a:t>of</a:t>
-            </a:r>
-            <a:r>
-              <a:rPr lang="de-CH" dirty="0"/>
-              <a:t> </a:t>
-            </a:r>
-            <a:r>
-              <a:rPr lang="de-CH" dirty="0" err="1"/>
-              <a:t>patients</a:t>
-            </a:r>
-            <a:r>
-              <a:rPr lang="de-CH" dirty="0"/>
-              <a:t>. </a:t>
-            </a:r>
-            <a:endParaRPr lang="en-US" dirty="0"/>
-          </a:p>
-          <a:p>
-            <a:pPr lvl="0"/>
-            <a:r>
-              <a:rPr lang="de-CH" dirty="0" err="1"/>
-              <a:t>To</a:t>
-            </a:r>
-            <a:r>
-              <a:rPr lang="de-CH" dirty="0"/>
-              <a:t> </a:t>
-            </a:r>
-            <a:r>
-              <a:rPr lang="de-CH" dirty="0" err="1"/>
-              <a:t>generate</a:t>
-            </a:r>
-            <a:r>
-              <a:rPr lang="de-CH" dirty="0"/>
-              <a:t> </a:t>
-            </a:r>
-            <a:r>
-              <a:rPr lang="de-CH" dirty="0" err="1"/>
-              <a:t>management</a:t>
-            </a:r>
-            <a:r>
-              <a:rPr lang="de-CH" dirty="0"/>
-              <a:t> </a:t>
-            </a:r>
-            <a:r>
-              <a:rPr lang="de-CH" dirty="0" err="1"/>
-              <a:t>information</a:t>
-            </a:r>
-            <a:r>
-              <a:rPr lang="de-CH" dirty="0"/>
-              <a:t> </a:t>
-            </a:r>
-            <a:r>
-              <a:rPr lang="de-CH" dirty="0" err="1"/>
-              <a:t>that</a:t>
-            </a:r>
-            <a:r>
-              <a:rPr lang="de-CH" dirty="0"/>
-              <a:t> </a:t>
-            </a:r>
-            <a:r>
-              <a:rPr lang="de-CH" dirty="0" err="1"/>
-              <a:t>allows</a:t>
-            </a:r>
-            <a:r>
-              <a:rPr lang="de-CH" dirty="0"/>
-              <a:t> </a:t>
-            </a:r>
-            <a:r>
-              <a:rPr lang="de-CH" dirty="0" err="1"/>
-              <a:t>health</a:t>
-            </a:r>
-            <a:r>
-              <a:rPr lang="de-CH" dirty="0"/>
-              <a:t> </a:t>
-            </a:r>
-            <a:r>
-              <a:rPr lang="de-CH" dirty="0" err="1"/>
-              <a:t>service</a:t>
-            </a:r>
-            <a:r>
-              <a:rPr lang="de-CH" dirty="0"/>
-              <a:t> </a:t>
-            </a:r>
-            <a:r>
-              <a:rPr lang="de-CH" dirty="0" err="1"/>
-              <a:t>managers</a:t>
-            </a:r>
-            <a:r>
-              <a:rPr lang="de-CH" dirty="0"/>
-              <a:t> </a:t>
-            </a:r>
-            <a:r>
-              <a:rPr lang="de-CH" dirty="0" err="1"/>
-              <a:t>to</a:t>
-            </a:r>
-            <a:r>
-              <a:rPr lang="de-CH" dirty="0"/>
-              <a:t> </a:t>
-            </a:r>
-            <a:r>
-              <a:rPr lang="de-CH" dirty="0" err="1"/>
-              <a:t>assess</a:t>
-            </a:r>
-            <a:r>
-              <a:rPr lang="de-CH" dirty="0"/>
-              <a:t> </a:t>
-            </a:r>
-            <a:r>
-              <a:rPr lang="de-CH" dirty="0" err="1"/>
-              <a:t>performance</a:t>
-            </a:r>
-            <a:r>
-              <a:rPr lang="de-CH" dirty="0"/>
-              <a:t> </a:t>
-            </a:r>
-            <a:r>
-              <a:rPr lang="de-CH" dirty="0" err="1"/>
-              <a:t>against</a:t>
-            </a:r>
-            <a:r>
-              <a:rPr lang="de-CH" dirty="0"/>
-              <a:t> </a:t>
-            </a:r>
-            <a:r>
-              <a:rPr lang="de-CH" dirty="0" err="1"/>
-              <a:t>local</a:t>
-            </a:r>
-            <a:r>
-              <a:rPr lang="de-CH" dirty="0"/>
-              <a:t> </a:t>
-            </a:r>
-            <a:r>
-              <a:rPr lang="de-CH" dirty="0" err="1"/>
-              <a:t>and</a:t>
-            </a:r>
-            <a:r>
-              <a:rPr lang="de-CH" dirty="0"/>
-              <a:t> </a:t>
-            </a:r>
-            <a:r>
-              <a:rPr lang="de-CH" dirty="0" err="1"/>
-              <a:t>government</a:t>
-            </a:r>
-            <a:r>
-              <a:rPr lang="de-CH" dirty="0"/>
-              <a:t> </a:t>
-            </a:r>
-            <a:r>
-              <a:rPr lang="de-CH" dirty="0" err="1"/>
-              <a:t>targets</a:t>
-            </a:r>
-            <a:r>
-              <a:rPr lang="de-CH" dirty="0"/>
-              <a:t>. </a:t>
-            </a:r>
-            <a:endParaRPr lang="en-US" dirty="0"/>
-          </a:p>
-          <a:p>
-            <a:endParaRPr lang="en-US" dirty="0"/>
-          </a:p>
-        </p:txBody>
-      </p:sp>
-      <p:sp>
-        <p:nvSpPr>
-          <p:cNvPr id="4" name="Text Placeholder 3"/>
-          <p:cNvSpPr>
-            <a:spLocks noGrp="1"/>
-          </p:cNvSpPr>
-          <p:nvPr>
-            <p:ph type="body" sz="half" idx="2"/>
+            <p:ph type="body" idx="1"/>
           </p:nvPr>
         </p:nvSpPr>
         <p:spPr/>
@@ -15914,13 +16156,20 @@
     </p:spTree>
     <p:extLst>
       <p:ext uri="{BB962C8B-B14F-4D97-AF65-F5344CB8AC3E}">
-        <p14:creationId xmlns:p14="http://schemas.microsoft.com/office/powerpoint/2010/main" val="2535639879"/>
+        <p14:creationId xmlns:p14="http://schemas.microsoft.com/office/powerpoint/2010/main" val="1115139671"/>
       </p:ext>
     </p:extLst>
   </p:cSld>
   <p:clrMapOvr>
     <a:masterClrMapping/>
   </p:clrMapOvr>
+  <p:timing>
+    <p:tnLst>
+      <p:par>
+        <p:cTn xmlns:p14="http://schemas.microsoft.com/office/powerpoint/2010/main" id="1" dur="indefinite" restart="never" nodeType="tmRoot"/>
+      </p:par>
+    </p:tnLst>
+  </p:timing>
 </p:sld>
 </file>
 
@@ -15958,7 +16207,7 @@
           <a:p>
             <a:r>
               <a:rPr lang="en-US" dirty="0" smtClean="0"/>
-              <a:t>key features</a:t>
+              <a:t>critical success factors</a:t>
             </a:r>
             <a:endParaRPr lang="en-US" dirty="0"/>
           </a:p>
@@ -15966,7 +16215,7 @@
       </p:sp>
       <p:graphicFrame>
         <p:nvGraphicFramePr>
-          <p:cNvPr id="5" name="Content Placeholder 4"/>
+          <p:cNvPr id="4" name="Content Placeholder 3"/>
           <p:cNvGraphicFramePr>
             <a:graphicFrameLocks noGrp="1"/>
           </p:cNvGraphicFramePr>
@@ -15974,7 +16223,7 @@
             <p:ph idx="1"/>
             <p:extLst>
               <p:ext uri="{D42A27DB-BD31-4B8C-83A1-F6EECF244321}">
-                <p14:modId xmlns:p14="http://schemas.microsoft.com/office/powerpoint/2010/main" val="2723100124"/>
+                <p14:modId xmlns:p14="http://schemas.microsoft.com/office/powerpoint/2010/main" val="920542732"/>
               </p:ext>
             </p:extLst>
           </p:nvPr>
@@ -15985,20 +16234,27 @@
         </p:xfrm>
         <a:graphic>
           <a:graphicData uri="http://schemas.openxmlformats.org/drawingml/2006/diagram">
-            <dgm:relIds xmlns:dgm="http://schemas.openxmlformats.org/drawingml/2006/diagram" xmlns:r="http://schemas.openxmlformats.org/officeDocument/2006/relationships" r:dm="rId2" r:lo="rId3" r:qs="rId4" r:cs="rId5"/>
+            <dgm:relIds xmlns:dgm="http://schemas.openxmlformats.org/drawingml/2006/diagram" xmlns:r="http://schemas.openxmlformats.org/officeDocument/2006/relationships" r:dm="rId3" r:lo="rId4" r:qs="rId5" r:cs="rId6"/>
           </a:graphicData>
         </a:graphic>
       </p:graphicFrame>
     </p:spTree>
     <p:extLst>
       <p:ext uri="{BB962C8B-B14F-4D97-AF65-F5344CB8AC3E}">
-        <p14:creationId xmlns:p14="http://schemas.microsoft.com/office/powerpoint/2010/main" val="3103134270"/>
+        <p14:creationId xmlns:p14="http://schemas.microsoft.com/office/powerpoint/2010/main" val="777820883"/>
       </p:ext>
     </p:extLst>
   </p:cSld>
   <p:clrMapOvr>
     <a:masterClrMapping/>
   </p:clrMapOvr>
+  <p:timing>
+    <p:tnLst>
+      <p:par>
+        <p:cTn xmlns:p14="http://schemas.microsoft.com/office/powerpoint/2010/main" id="1" dur="indefinite" restart="never" nodeType="tmRoot"/>
+      </p:par>
+    </p:tnLst>
+  </p:timing>
 </p:sld>
 </file>
 
@@ -16036,7 +16292,7 @@
           <a:p>
             <a:r>
               <a:rPr lang="en-US" dirty="0" smtClean="0"/>
-              <a:t>Critical Success Factors</a:t>
+              <a:t>System components and high-level architecture</a:t>
             </a:r>
             <a:endParaRPr lang="en-US" dirty="0"/>
           </a:p>
@@ -16057,20 +16313,27 @@
           <a:bodyPr/>
           <a:lstStyle/>
           <a:p>
-            <a:endParaRPr lang="en-US" dirty="0"/>
+            <a:endParaRPr lang="en-US"/>
           </a:p>
         </p:txBody>
       </p:sp>
     </p:spTree>
     <p:extLst>
       <p:ext uri="{BB962C8B-B14F-4D97-AF65-F5344CB8AC3E}">
-        <p14:creationId xmlns:p14="http://schemas.microsoft.com/office/powerpoint/2010/main" val="1115139671"/>
+        <p14:creationId xmlns:p14="http://schemas.microsoft.com/office/powerpoint/2010/main" val="1223993298"/>
       </p:ext>
     </p:extLst>
   </p:cSld>
   <p:clrMapOvr>
     <a:masterClrMapping/>
   </p:clrMapOvr>
+  <p:timing>
+    <p:tnLst>
+      <p:par>
+        <p:cTn xmlns:p14="http://schemas.microsoft.com/office/powerpoint/2010/main" id="1" dur="indefinite" restart="never" nodeType="tmRoot"/>
+      </p:par>
+    </p:tnLst>
+  </p:timing>
 </p:sld>
 </file>
 
@@ -16108,54 +16371,102 @@
           <a:p>
             <a:r>
               <a:rPr lang="en-US" dirty="0" smtClean="0"/>
-              <a:t>critical success factors</a:t>
+              <a:t>high-level architecture</a:t>
             </a:r>
             <a:endParaRPr lang="en-US" dirty="0"/>
           </a:p>
         </p:txBody>
       </p:sp>
-      <p:graphicFrame>
-        <p:nvGraphicFramePr>
+      <p:sp>
+        <p:nvSpPr>
           <p:cNvPr id="4" name="Content Placeholder 3"/>
-          <p:cNvGraphicFramePr>
-            <a:graphicFrameLocks noGrp="1"/>
-          </p:cNvGraphicFramePr>
+          <p:cNvSpPr>
+            <a:spLocks noGrp="1"/>
+          </p:cNvSpPr>
           <p:nvPr>
             <p:ph idx="1"/>
-            <p:extLst>
-              <p:ext uri="{D42A27DB-BD31-4B8C-83A1-F6EECF244321}">
-                <p14:modId xmlns:p14="http://schemas.microsoft.com/office/powerpoint/2010/main" val="920542732"/>
-              </p:ext>
-            </p:extLst>
           </p:nvPr>
-        </p:nvGraphicFramePr>
-        <p:xfrm>
-          <a:off x="822960" y="1100628"/>
-          <a:ext cx="7520940" cy="3579849"/>
-        </p:xfrm>
-        <a:graphic>
-          <a:graphicData uri="http://schemas.openxmlformats.org/drawingml/2006/diagram">
-            <dgm:relIds xmlns:dgm="http://schemas.openxmlformats.org/drawingml/2006/diagram" xmlns:r="http://schemas.openxmlformats.org/officeDocument/2006/relationships" r:dm="rId2" r:lo="rId3" r:qs="rId4" r:cs="rId5"/>
-          </a:graphicData>
-        </a:graphic>
-      </p:graphicFrame>
+        </p:nvSpPr>
+        <p:spPr/>
+        <p:txBody>
+          <a:bodyPr/>
+          <a:lstStyle/>
+          <a:p>
+            <a:pPr marL="457200" indent="-457200">
+              <a:buFont typeface="Arial"/>
+              <a:buChar char="•"/>
+            </a:pPr>
+            <a:r>
+              <a:rPr lang="en-US" dirty="0" smtClean="0"/>
+              <a:t>Client – Server</a:t>
+            </a:r>
+          </a:p>
+          <a:p>
+            <a:pPr marL="457200" indent="-457200">
+              <a:buFont typeface="Arial"/>
+              <a:buChar char="•"/>
+            </a:pPr>
+            <a:endParaRPr lang="en-US" dirty="0" smtClean="0"/>
+          </a:p>
+          <a:p>
+            <a:pPr marL="457200" indent="-457200">
+              <a:buFont typeface="Arial"/>
+              <a:buChar char="•"/>
+            </a:pPr>
+            <a:r>
+              <a:rPr lang="en-US" dirty="0" smtClean="0"/>
+              <a:t>Web Application</a:t>
+            </a:r>
+          </a:p>
+        </p:txBody>
+      </p:sp>
+      <p:sp>
+        <p:nvSpPr>
+          <p:cNvPr id="5" name="Text Placeholder 4"/>
+          <p:cNvSpPr>
+            <a:spLocks noGrp="1"/>
+          </p:cNvSpPr>
+          <p:nvPr>
+            <p:ph type="body" sz="half" idx="2"/>
+          </p:nvPr>
+        </p:nvSpPr>
+        <p:spPr/>
+        <p:txBody>
+          <a:bodyPr/>
+          <a:lstStyle/>
+          <a:p>
+            <a:r>
+              <a:rPr lang="en-US" dirty="0" smtClean="0"/>
+              <a:t>Decisions</a:t>
+            </a:r>
+            <a:endParaRPr lang="en-US" dirty="0"/>
+          </a:p>
+        </p:txBody>
+      </p:sp>
     </p:spTree>
     <p:extLst>
       <p:ext uri="{BB962C8B-B14F-4D97-AF65-F5344CB8AC3E}">
-        <p14:creationId xmlns:p14="http://schemas.microsoft.com/office/powerpoint/2010/main" val="777820883"/>
+        <p14:creationId xmlns:p14="http://schemas.microsoft.com/office/powerpoint/2010/main" val="1868776008"/>
       </p:ext>
     </p:extLst>
   </p:cSld>
   <p:clrMapOvr>
     <a:masterClrMapping/>
   </p:clrMapOvr>
+  <p:timing>
+    <p:tnLst>
+      <p:par>
+        <p:cTn xmlns:p14="http://schemas.microsoft.com/office/powerpoint/2010/main" id="1" dur="indefinite" restart="never" nodeType="tmRoot"/>
+      </p:par>
+    </p:tnLst>
+  </p:timing>
 </p:sld>
 </file>
 
 <file path=ppt/theme/theme1.xml><?xml version="1.0" encoding="utf-8"?>
 <a:theme xmlns:a="http://schemas.openxmlformats.org/drawingml/2006/main" name="Angles">
   <a:themeElements>
-    <a:clrScheme name="Infusion">
+    <a:clrScheme name="Custom 2">
       <a:dk1>
         <a:sysClr val="windowText" lastClr="000000"/>
       </a:dk1>
@@ -16169,13 +16480,13 @@
         <a:srgbClr val="B7A9E0"/>
       </a:lt2>
       <a:accent1>
-        <a:srgbClr val="8C73D0"/>
+        <a:srgbClr val="FF0080"/>
       </a:accent1>
       <a:accent2>
-        <a:srgbClr val="C2E8C4"/>
+        <a:srgbClr val="FF0080"/>
       </a:accent2>
       <a:accent3>
-        <a:srgbClr val="C5A6E8"/>
+        <a:srgbClr val="B3B3B3"/>
       </a:accent3>
       <a:accent4>
         <a:srgbClr val="B45EC7"/>

</xml_diff>

<commit_message>
Updated presentation (Colors approved by Fränzi, removed some unnecessary slides)
</commit_message>
<xml_diff>
--- a/Project Pink/doc/task01/Presentation - CS Task 1.pptx
+++ b/Project Pink/doc/task01/Presentation - CS Task 1.pptx
@@ -9211,11 +9211,7 @@
           <a:p>
             <a:r>
               <a:rPr lang="en-US" baseline="0" dirty="0" smtClean="0"/>
-              <a:t>Links </a:t>
-            </a:r>
-            <a:r>
-              <a:rPr lang="en-US" baseline="0" dirty="0" smtClean="0"/>
-              <a:t>die Target Users </a:t>
+              <a:t>Links die Target Users </a:t>
             </a:r>
             <a:r>
               <a:rPr lang="en-US" baseline="0" dirty="0" err="1" smtClean="0"/>
@@ -16396,9 +16392,20 @@
               <a:buFont typeface="Arial"/>
               <a:buChar char="•"/>
             </a:pPr>
+            <a:endParaRPr lang="en-US" smtClean="0"/>
+          </a:p>
+          <a:p>
+            <a:pPr marL="457200" indent="-457200">
+              <a:buFont typeface="Arial"/>
+              <a:buChar char="•"/>
+            </a:pPr>
+            <a:r>
+              <a:rPr lang="en-US" smtClean="0"/>
+              <a:t>Client </a:t>
+            </a:r>
             <a:r>
               <a:rPr lang="en-US" dirty="0" smtClean="0"/>
-              <a:t>Client – Server</a:t>
+              <a:t>– Server</a:t>
             </a:r>
           </a:p>
           <a:p>

</xml_diff>

<commit_message>
Updated presentation with new subtitles
</commit_message>
<xml_diff>
--- a/Project Pink/doc/task01/Presentation - CS Task 1.pptx
+++ b/Project Pink/doc/task01/Presentation - CS Task 1.pptx
@@ -7,6 +7,9 @@
   <p:notesMasterIdLst>
     <p:notesMasterId r:id="rId12"/>
   </p:notesMasterIdLst>
+  <p:handoutMasterIdLst>
+    <p:handoutMasterId r:id="rId13"/>
+  </p:handoutMasterIdLst>
   <p:sldIdLst>
     <p:sldId id="256" r:id="rId2"/>
     <p:sldId id="258" r:id="rId3"/>
@@ -3162,7 +3165,7 @@
 <dgm:dataModel xmlns:dgm="http://schemas.openxmlformats.org/drawingml/2006/diagram" xmlns:a="http://schemas.openxmlformats.org/drawingml/2006/main">
   <dgm:ptLst>
     <dgm:pt modelId="{6783C3C6-F71B-D045-ADD9-55A69F3CCDEB}" type="doc">
-      <dgm:prSet loTypeId="urn:microsoft.com/office/officeart/2005/8/layout/process1" loCatId="" qsTypeId="urn:microsoft.com/office/officeart/2005/8/quickstyle/simple4" qsCatId="simple" csTypeId="urn:microsoft.com/office/officeart/2005/8/colors/accent1_2" csCatId="accent1" phldr="1"/>
+      <dgm:prSet loTypeId="urn:microsoft.com/office/officeart/2005/8/layout/process1" loCatId="" qsTypeId="urn:microsoft.com/office/officeart/2005/8/quickstyle/simple1" qsCatId="simple" csTypeId="urn:microsoft.com/office/officeart/2005/8/colors/accent1_2" csCatId="accent1" phldr="1"/>
       <dgm:spPr/>
       <dgm:t>
         <a:bodyPr/>
@@ -4469,60 +4472,35 @@
             <a:gd name="adj" fmla="val 10000"/>
           </a:avLst>
         </a:prstGeom>
-        <a:gradFill rotWithShape="0">
-          <a:gsLst>
-            <a:gs pos="0">
-              <a:schemeClr val="accent1">
-                <a:hueOff val="0"/>
-                <a:satOff val="0"/>
-                <a:lumOff val="0"/>
-                <a:alphaOff val="0"/>
-                <a:shade val="51000"/>
-                <a:satMod val="130000"/>
-              </a:schemeClr>
-            </a:gs>
-            <a:gs pos="80000">
-              <a:schemeClr val="accent1">
-                <a:hueOff val="0"/>
-                <a:satOff val="0"/>
-                <a:lumOff val="0"/>
-                <a:alphaOff val="0"/>
-                <a:shade val="93000"/>
-                <a:satMod val="130000"/>
-              </a:schemeClr>
-            </a:gs>
-            <a:gs pos="100000">
-              <a:schemeClr val="accent1">
-                <a:hueOff val="0"/>
-                <a:satOff val="0"/>
-                <a:lumOff val="0"/>
-                <a:alphaOff val="0"/>
-                <a:shade val="94000"/>
-                <a:satMod val="135000"/>
-              </a:schemeClr>
-            </a:gs>
-          </a:gsLst>
-          <a:lin ang="16200000" scaled="0"/>
-        </a:gradFill>
-        <a:ln>
-          <a:noFill/>
+        <a:solidFill>
+          <a:schemeClr val="accent1">
+            <a:hueOff val="0"/>
+            <a:satOff val="0"/>
+            <a:lumOff val="0"/>
+            <a:alphaOff val="0"/>
+          </a:schemeClr>
+        </a:solidFill>
+        <a:ln w="25400" cap="flat" cmpd="sng" algn="ctr">
+          <a:solidFill>
+            <a:schemeClr val="lt1">
+              <a:hueOff val="0"/>
+              <a:satOff val="0"/>
+              <a:lumOff val="0"/>
+              <a:alphaOff val="0"/>
+            </a:schemeClr>
+          </a:solidFill>
+          <a:prstDash val="solid"/>
         </a:ln>
-        <a:effectLst>
-          <a:outerShdw blurRad="40000" dist="23000" dir="5400000" rotWithShape="0">
-            <a:srgbClr val="000000">
-              <a:alpha val="35000"/>
-            </a:srgbClr>
-          </a:outerShdw>
-        </a:effectLst>
+        <a:effectLst/>
       </dsp:spPr>
       <dsp:style>
-        <a:lnRef idx="0">
+        <a:lnRef idx="2">
           <a:scrgbClr r="0" g="0" b="0"/>
         </a:lnRef>
-        <a:fillRef idx="3">
+        <a:fillRef idx="1">
           <a:scrgbClr r="0" g="0" b="0"/>
         </a:fillRef>
-        <a:effectRef idx="2">
+        <a:effectRef idx="0">
           <a:scrgbClr r="0" g="0" b="0"/>
         </a:effectRef>
         <a:fontRef idx="minor">
@@ -4574,63 +4552,28 @@
             <a:gd name="adj2" fmla="val 50000"/>
           </a:avLst>
         </a:prstGeom>
-        <a:gradFill rotWithShape="0">
-          <a:gsLst>
-            <a:gs pos="0">
-              <a:schemeClr val="accent1">
-                <a:tint val="60000"/>
-                <a:hueOff val="0"/>
-                <a:satOff val="0"/>
-                <a:lumOff val="0"/>
-                <a:alphaOff val="0"/>
-                <a:shade val="51000"/>
-                <a:satMod val="130000"/>
-              </a:schemeClr>
-            </a:gs>
-            <a:gs pos="80000">
-              <a:schemeClr val="accent1">
-                <a:tint val="60000"/>
-                <a:hueOff val="0"/>
-                <a:satOff val="0"/>
-                <a:lumOff val="0"/>
-                <a:alphaOff val="0"/>
-                <a:shade val="93000"/>
-                <a:satMod val="130000"/>
-              </a:schemeClr>
-            </a:gs>
-            <a:gs pos="100000">
-              <a:schemeClr val="accent1">
-                <a:tint val="60000"/>
-                <a:hueOff val="0"/>
-                <a:satOff val="0"/>
-                <a:lumOff val="0"/>
-                <a:alphaOff val="0"/>
-                <a:shade val="94000"/>
-                <a:satMod val="135000"/>
-              </a:schemeClr>
-            </a:gs>
-          </a:gsLst>
-          <a:lin ang="16200000" scaled="0"/>
-        </a:gradFill>
+        <a:solidFill>
+          <a:schemeClr val="accent1">
+            <a:tint val="60000"/>
+            <a:hueOff val="0"/>
+            <a:satOff val="0"/>
+            <a:lumOff val="0"/>
+            <a:alphaOff val="0"/>
+          </a:schemeClr>
+        </a:solidFill>
         <a:ln>
           <a:noFill/>
         </a:ln>
-        <a:effectLst>
-          <a:outerShdw blurRad="40000" dist="23000" dir="5400000" rotWithShape="0">
-            <a:srgbClr val="000000">
-              <a:alpha val="35000"/>
-            </a:srgbClr>
-          </a:outerShdw>
-        </a:effectLst>
+        <a:effectLst/>
       </dsp:spPr>
       <dsp:style>
         <a:lnRef idx="0">
           <a:scrgbClr r="0" g="0" b="0"/>
         </a:lnRef>
-        <a:fillRef idx="3">
+        <a:fillRef idx="1">
           <a:scrgbClr r="0" g="0" b="0"/>
         </a:fillRef>
-        <a:effectRef idx="2">
+        <a:effectRef idx="0">
           <a:scrgbClr r="0" g="0" b="0"/>
         </a:effectRef>
         <a:fontRef idx="minor">
@@ -4677,60 +4620,35 @@
             <a:gd name="adj" fmla="val 10000"/>
           </a:avLst>
         </a:prstGeom>
-        <a:gradFill rotWithShape="0">
-          <a:gsLst>
-            <a:gs pos="0">
-              <a:schemeClr val="accent1">
-                <a:hueOff val="0"/>
-                <a:satOff val="0"/>
-                <a:lumOff val="0"/>
-                <a:alphaOff val="0"/>
-                <a:shade val="51000"/>
-                <a:satMod val="130000"/>
-              </a:schemeClr>
-            </a:gs>
-            <a:gs pos="80000">
-              <a:schemeClr val="accent1">
-                <a:hueOff val="0"/>
-                <a:satOff val="0"/>
-                <a:lumOff val="0"/>
-                <a:alphaOff val="0"/>
-                <a:shade val="93000"/>
-                <a:satMod val="130000"/>
-              </a:schemeClr>
-            </a:gs>
-            <a:gs pos="100000">
-              <a:schemeClr val="accent1">
-                <a:hueOff val="0"/>
-                <a:satOff val="0"/>
-                <a:lumOff val="0"/>
-                <a:alphaOff val="0"/>
-                <a:shade val="94000"/>
-                <a:satMod val="135000"/>
-              </a:schemeClr>
-            </a:gs>
-          </a:gsLst>
-          <a:lin ang="16200000" scaled="0"/>
-        </a:gradFill>
-        <a:ln>
-          <a:noFill/>
+        <a:solidFill>
+          <a:schemeClr val="accent1">
+            <a:hueOff val="0"/>
+            <a:satOff val="0"/>
+            <a:lumOff val="0"/>
+            <a:alphaOff val="0"/>
+          </a:schemeClr>
+        </a:solidFill>
+        <a:ln w="25400" cap="flat" cmpd="sng" algn="ctr">
+          <a:solidFill>
+            <a:schemeClr val="lt1">
+              <a:hueOff val="0"/>
+              <a:satOff val="0"/>
+              <a:lumOff val="0"/>
+              <a:alphaOff val="0"/>
+            </a:schemeClr>
+          </a:solidFill>
+          <a:prstDash val="solid"/>
         </a:ln>
-        <a:effectLst>
-          <a:outerShdw blurRad="40000" dist="23000" dir="5400000" rotWithShape="0">
-            <a:srgbClr val="000000">
-              <a:alpha val="35000"/>
-            </a:srgbClr>
-          </a:outerShdw>
-        </a:effectLst>
+        <a:effectLst/>
       </dsp:spPr>
       <dsp:style>
-        <a:lnRef idx="0">
+        <a:lnRef idx="2">
           <a:scrgbClr r="0" g="0" b="0"/>
         </a:lnRef>
-        <a:fillRef idx="3">
+        <a:fillRef idx="1">
           <a:scrgbClr r="0" g="0" b="0"/>
         </a:fillRef>
-        <a:effectRef idx="2">
+        <a:effectRef idx="0">
           <a:scrgbClr r="0" g="0" b="0"/>
         </a:effectRef>
         <a:fontRef idx="minor">
@@ -4782,63 +4700,28 @@
             <a:gd name="adj2" fmla="val 50000"/>
           </a:avLst>
         </a:prstGeom>
-        <a:gradFill rotWithShape="0">
-          <a:gsLst>
-            <a:gs pos="0">
-              <a:schemeClr val="accent1">
-                <a:tint val="60000"/>
-                <a:hueOff val="0"/>
-                <a:satOff val="0"/>
-                <a:lumOff val="0"/>
-                <a:alphaOff val="0"/>
-                <a:shade val="51000"/>
-                <a:satMod val="130000"/>
-              </a:schemeClr>
-            </a:gs>
-            <a:gs pos="80000">
-              <a:schemeClr val="accent1">
-                <a:tint val="60000"/>
-                <a:hueOff val="0"/>
-                <a:satOff val="0"/>
-                <a:lumOff val="0"/>
-                <a:alphaOff val="0"/>
-                <a:shade val="93000"/>
-                <a:satMod val="130000"/>
-              </a:schemeClr>
-            </a:gs>
-            <a:gs pos="100000">
-              <a:schemeClr val="accent1">
-                <a:tint val="60000"/>
-                <a:hueOff val="0"/>
-                <a:satOff val="0"/>
-                <a:lumOff val="0"/>
-                <a:alphaOff val="0"/>
-                <a:shade val="94000"/>
-                <a:satMod val="135000"/>
-              </a:schemeClr>
-            </a:gs>
-          </a:gsLst>
-          <a:lin ang="16200000" scaled="0"/>
-        </a:gradFill>
+        <a:solidFill>
+          <a:schemeClr val="accent1">
+            <a:tint val="60000"/>
+            <a:hueOff val="0"/>
+            <a:satOff val="0"/>
+            <a:lumOff val="0"/>
+            <a:alphaOff val="0"/>
+          </a:schemeClr>
+        </a:solidFill>
         <a:ln>
           <a:noFill/>
         </a:ln>
-        <a:effectLst>
-          <a:outerShdw blurRad="40000" dist="23000" dir="5400000" rotWithShape="0">
-            <a:srgbClr val="000000">
-              <a:alpha val="35000"/>
-            </a:srgbClr>
-          </a:outerShdw>
-        </a:effectLst>
+        <a:effectLst/>
       </dsp:spPr>
       <dsp:style>
         <a:lnRef idx="0">
           <a:scrgbClr r="0" g="0" b="0"/>
         </a:lnRef>
-        <a:fillRef idx="3">
+        <a:fillRef idx="1">
           <a:scrgbClr r="0" g="0" b="0"/>
         </a:fillRef>
-        <a:effectRef idx="2">
+        <a:effectRef idx="0">
           <a:scrgbClr r="0" g="0" b="0"/>
         </a:effectRef>
         <a:fontRef idx="minor">
@@ -4885,60 +4768,35 @@
             <a:gd name="adj" fmla="val 10000"/>
           </a:avLst>
         </a:prstGeom>
-        <a:gradFill rotWithShape="0">
-          <a:gsLst>
-            <a:gs pos="0">
-              <a:schemeClr val="accent1">
-                <a:hueOff val="0"/>
-                <a:satOff val="0"/>
-                <a:lumOff val="0"/>
-                <a:alphaOff val="0"/>
-                <a:shade val="51000"/>
-                <a:satMod val="130000"/>
-              </a:schemeClr>
-            </a:gs>
-            <a:gs pos="80000">
-              <a:schemeClr val="accent1">
-                <a:hueOff val="0"/>
-                <a:satOff val="0"/>
-                <a:lumOff val="0"/>
-                <a:alphaOff val="0"/>
-                <a:shade val="93000"/>
-                <a:satMod val="130000"/>
-              </a:schemeClr>
-            </a:gs>
-            <a:gs pos="100000">
-              <a:schemeClr val="accent1">
-                <a:hueOff val="0"/>
-                <a:satOff val="0"/>
-                <a:lumOff val="0"/>
-                <a:alphaOff val="0"/>
-                <a:shade val="94000"/>
-                <a:satMod val="135000"/>
-              </a:schemeClr>
-            </a:gs>
-          </a:gsLst>
-          <a:lin ang="16200000" scaled="0"/>
-        </a:gradFill>
-        <a:ln>
-          <a:noFill/>
+        <a:solidFill>
+          <a:schemeClr val="accent1">
+            <a:hueOff val="0"/>
+            <a:satOff val="0"/>
+            <a:lumOff val="0"/>
+            <a:alphaOff val="0"/>
+          </a:schemeClr>
+        </a:solidFill>
+        <a:ln w="25400" cap="flat" cmpd="sng" algn="ctr">
+          <a:solidFill>
+            <a:schemeClr val="lt1">
+              <a:hueOff val="0"/>
+              <a:satOff val="0"/>
+              <a:lumOff val="0"/>
+              <a:alphaOff val="0"/>
+            </a:schemeClr>
+          </a:solidFill>
+          <a:prstDash val="solid"/>
         </a:ln>
-        <a:effectLst>
-          <a:outerShdw blurRad="40000" dist="23000" dir="5400000" rotWithShape="0">
-            <a:srgbClr val="000000">
-              <a:alpha val="35000"/>
-            </a:srgbClr>
-          </a:outerShdw>
-        </a:effectLst>
+        <a:effectLst/>
       </dsp:spPr>
       <dsp:style>
-        <a:lnRef idx="0">
+        <a:lnRef idx="2">
           <a:scrgbClr r="0" g="0" b="0"/>
         </a:lnRef>
-        <a:fillRef idx="3">
+        <a:fillRef idx="1">
           <a:scrgbClr r="0" g="0" b="0"/>
         </a:fillRef>
-        <a:effectRef idx="2">
+        <a:effectRef idx="0">
           <a:scrgbClr r="0" g="0" b="0"/>
         </a:effectRef>
         <a:fontRef idx="minor">
@@ -4989,63 +4847,28 @@
             <a:gd name="adj2" fmla="val 50000"/>
           </a:avLst>
         </a:prstGeom>
-        <a:gradFill rotWithShape="0">
-          <a:gsLst>
-            <a:gs pos="0">
-              <a:schemeClr val="accent1">
-                <a:tint val="60000"/>
-                <a:hueOff val="0"/>
-                <a:satOff val="0"/>
-                <a:lumOff val="0"/>
-                <a:alphaOff val="0"/>
-                <a:shade val="51000"/>
-                <a:satMod val="130000"/>
-              </a:schemeClr>
-            </a:gs>
-            <a:gs pos="80000">
-              <a:schemeClr val="accent1">
-                <a:tint val="60000"/>
-                <a:hueOff val="0"/>
-                <a:satOff val="0"/>
-                <a:lumOff val="0"/>
-                <a:alphaOff val="0"/>
-                <a:shade val="93000"/>
-                <a:satMod val="130000"/>
-              </a:schemeClr>
-            </a:gs>
-            <a:gs pos="100000">
-              <a:schemeClr val="accent1">
-                <a:tint val="60000"/>
-                <a:hueOff val="0"/>
-                <a:satOff val="0"/>
-                <a:lumOff val="0"/>
-                <a:alphaOff val="0"/>
-                <a:shade val="94000"/>
-                <a:satMod val="135000"/>
-              </a:schemeClr>
-            </a:gs>
-          </a:gsLst>
-          <a:lin ang="16200000" scaled="0"/>
-        </a:gradFill>
+        <a:solidFill>
+          <a:schemeClr val="accent1">
+            <a:tint val="60000"/>
+            <a:hueOff val="0"/>
+            <a:satOff val="0"/>
+            <a:lumOff val="0"/>
+            <a:alphaOff val="0"/>
+          </a:schemeClr>
+        </a:solidFill>
         <a:ln>
           <a:noFill/>
         </a:ln>
-        <a:effectLst>
-          <a:outerShdw blurRad="40000" dist="23000" dir="5400000" rotWithShape="0">
-            <a:srgbClr val="000000">
-              <a:alpha val="35000"/>
-            </a:srgbClr>
-          </a:outerShdw>
-        </a:effectLst>
+        <a:effectLst/>
       </dsp:spPr>
       <dsp:style>
         <a:lnRef idx="0">
           <a:scrgbClr r="0" g="0" b="0"/>
         </a:lnRef>
-        <a:fillRef idx="3">
+        <a:fillRef idx="1">
           <a:scrgbClr r="0" g="0" b="0"/>
         </a:fillRef>
-        <a:effectRef idx="2">
+        <a:effectRef idx="0">
           <a:scrgbClr r="0" g="0" b="0"/>
         </a:effectRef>
         <a:fontRef idx="minor">
@@ -5092,60 +4915,35 @@
             <a:gd name="adj" fmla="val 10000"/>
           </a:avLst>
         </a:prstGeom>
-        <a:gradFill rotWithShape="0">
-          <a:gsLst>
-            <a:gs pos="0">
-              <a:schemeClr val="accent1">
-                <a:hueOff val="0"/>
-                <a:satOff val="0"/>
-                <a:lumOff val="0"/>
-                <a:alphaOff val="0"/>
-                <a:shade val="51000"/>
-                <a:satMod val="130000"/>
-              </a:schemeClr>
-            </a:gs>
-            <a:gs pos="80000">
-              <a:schemeClr val="accent1">
-                <a:hueOff val="0"/>
-                <a:satOff val="0"/>
-                <a:lumOff val="0"/>
-                <a:alphaOff val="0"/>
-                <a:shade val="93000"/>
-                <a:satMod val="130000"/>
-              </a:schemeClr>
-            </a:gs>
-            <a:gs pos="100000">
-              <a:schemeClr val="accent1">
-                <a:hueOff val="0"/>
-                <a:satOff val="0"/>
-                <a:lumOff val="0"/>
-                <a:alphaOff val="0"/>
-                <a:shade val="94000"/>
-                <a:satMod val="135000"/>
-              </a:schemeClr>
-            </a:gs>
-          </a:gsLst>
-          <a:lin ang="16200000" scaled="0"/>
-        </a:gradFill>
-        <a:ln>
-          <a:noFill/>
+        <a:solidFill>
+          <a:schemeClr val="accent1">
+            <a:hueOff val="0"/>
+            <a:satOff val="0"/>
+            <a:lumOff val="0"/>
+            <a:alphaOff val="0"/>
+          </a:schemeClr>
+        </a:solidFill>
+        <a:ln w="25400" cap="flat" cmpd="sng" algn="ctr">
+          <a:solidFill>
+            <a:schemeClr val="lt1">
+              <a:hueOff val="0"/>
+              <a:satOff val="0"/>
+              <a:lumOff val="0"/>
+              <a:alphaOff val="0"/>
+            </a:schemeClr>
+          </a:solidFill>
+          <a:prstDash val="solid"/>
         </a:ln>
-        <a:effectLst>
-          <a:outerShdw blurRad="40000" dist="23000" dir="5400000" rotWithShape="0">
-            <a:srgbClr val="000000">
-              <a:alpha val="35000"/>
-            </a:srgbClr>
-          </a:outerShdw>
-        </a:effectLst>
+        <a:effectLst/>
       </dsp:spPr>
       <dsp:style>
-        <a:lnRef idx="0">
+        <a:lnRef idx="2">
           <a:scrgbClr r="0" g="0" b="0"/>
         </a:lnRef>
-        <a:fillRef idx="3">
+        <a:fillRef idx="1">
           <a:scrgbClr r="0" g="0" b="0"/>
         </a:fillRef>
-        <a:effectRef idx="2">
+        <a:effectRef idx="0">
           <a:scrgbClr r="0" g="0" b="0"/>
         </a:effectRef>
         <a:fontRef idx="minor">
@@ -7693,11 +7491,11 @@
 </file>
 
 <file path=ppt/diagrams/quickStyle3.xml><?xml version="1.0" encoding="utf-8"?>
-<dgm:styleDef xmlns:dgm="http://schemas.openxmlformats.org/drawingml/2006/diagram" xmlns:a="http://schemas.openxmlformats.org/drawingml/2006/main" uniqueId="urn:microsoft.com/office/officeart/2005/8/quickstyle/simple4">
+<dgm:styleDef xmlns:dgm="http://schemas.openxmlformats.org/drawingml/2006/diagram" xmlns:a="http://schemas.openxmlformats.org/drawingml/2006/main" uniqueId="urn:microsoft.com/office/officeart/2005/8/quickstyle/simple1">
   <dgm:title val=""/>
   <dgm:desc val=""/>
   <dgm:catLst>
-    <dgm:cat type="simple" pri="10400"/>
+    <dgm:cat type="simple" pri="10100"/>
   </dgm:catLst>
   <dgm:scene3d>
     <a:camera prst="orthographicFront"/>
@@ -7711,13 +7509,13 @@
     <dgm:sp3d/>
     <dgm:txPr/>
     <dgm:style>
-      <a:lnRef idx="0">
+      <a:lnRef idx="2">
         <a:scrgbClr r="0" g="0" b="0"/>
       </a:lnRef>
-      <a:fillRef idx="3">
+      <a:fillRef idx="1">
         <a:scrgbClr r="0" g="0" b="0"/>
       </a:fillRef>
-      <a:effectRef idx="2">
+      <a:effectRef idx="0">
         <a:scrgbClr r="0" g="0" b="0"/>
       </a:effectRef>
       <a:fontRef idx="minor">
@@ -7733,13 +7531,13 @@
     <dgm:sp3d/>
     <dgm:txPr/>
     <dgm:style>
-      <a:lnRef idx="1">
+      <a:lnRef idx="2">
         <a:scrgbClr r="0" g="0" b="0"/>
       </a:lnRef>
-      <a:fillRef idx="3">
+      <a:fillRef idx="1">
         <a:scrgbClr r="0" g="0" b="0"/>
       </a:fillRef>
-      <a:effectRef idx="2">
+      <a:effectRef idx="0">
         <a:scrgbClr r="0" g="0" b="0"/>
       </a:effectRef>
       <a:fontRef idx="minor">
@@ -7755,10 +7553,10 @@
     <dgm:sp3d/>
     <dgm:txPr/>
     <dgm:style>
-      <a:lnRef idx="0">
+      <a:lnRef idx="2">
         <a:scrgbClr r="0" g="0" b="0"/>
       </a:lnRef>
-      <a:fillRef idx="3">
+      <a:fillRef idx="1">
         <a:scrgbClr r="0" g="0" b="0"/>
       </a:fillRef>
       <a:effectRef idx="0">
@@ -7777,13 +7575,13 @@
     <dgm:sp3d/>
     <dgm:txPr/>
     <dgm:style>
-      <a:lnRef idx="1">
+      <a:lnRef idx="2">
         <a:scrgbClr r="0" g="0" b="0"/>
       </a:lnRef>
-      <a:fillRef idx="3">
+      <a:fillRef idx="1">
         <a:scrgbClr r="0" g="0" b="0"/>
       </a:fillRef>
-      <a:effectRef idx="2">
+      <a:effectRef idx="0">
         <a:scrgbClr r="0" g="0" b="0"/>
       </a:effectRef>
       <a:fontRef idx="minor">
@@ -7799,13 +7597,13 @@
     <dgm:sp3d/>
     <dgm:txPr/>
     <dgm:style>
-      <a:lnRef idx="0">
+      <a:lnRef idx="2">
         <a:scrgbClr r="0" g="0" b="0"/>
       </a:lnRef>
-      <a:fillRef idx="3">
+      <a:fillRef idx="1">
         <a:scrgbClr r="0" g="0" b="0"/>
       </a:fillRef>
-      <a:effectRef idx="2">
+      <a:effectRef idx="0">
         <a:scrgbClr r="0" g="0" b="0"/>
       </a:effectRef>
       <a:fontRef idx="minor">
@@ -7821,13 +7619,13 @@
     <dgm:sp3d/>
     <dgm:txPr/>
     <dgm:style>
-      <a:lnRef idx="0">
+      <a:lnRef idx="2">
         <a:scrgbClr r="0" g="0" b="0"/>
       </a:lnRef>
-      <a:fillRef idx="3">
+      <a:fillRef idx="1">
         <a:scrgbClr r="0" g="0" b="0"/>
       </a:fillRef>
-      <a:effectRef idx="2">
+      <a:effectRef idx="0">
         <a:scrgbClr r="0" g="0" b="0"/>
       </a:effectRef>
       <a:fontRef idx="minor">
@@ -7843,13 +7641,13 @@
     <dgm:sp3d/>
     <dgm:txPr/>
     <dgm:style>
-      <a:lnRef idx="0">
+      <a:lnRef idx="2">
         <a:scrgbClr r="0" g="0" b="0"/>
       </a:lnRef>
-      <a:fillRef idx="3">
+      <a:fillRef idx="1">
         <a:scrgbClr r="0" g="0" b="0"/>
       </a:fillRef>
-      <a:effectRef idx="2">
+      <a:effectRef idx="0">
         <a:scrgbClr r="0" g="0" b="0"/>
       </a:effectRef>
       <a:fontRef idx="minor">
@@ -7865,13 +7663,13 @@
     <dgm:sp3d/>
     <dgm:txPr/>
     <dgm:style>
-      <a:lnRef idx="0">
+      <a:lnRef idx="2">
         <a:scrgbClr r="0" g="0" b="0"/>
       </a:lnRef>
-      <a:fillRef idx="3">
+      <a:fillRef idx="1">
         <a:scrgbClr r="0" g="0" b="0"/>
       </a:fillRef>
-      <a:effectRef idx="2">
+      <a:effectRef idx="0">
         <a:scrgbClr r="0" g="0" b="0"/>
       </a:effectRef>
       <a:fontRef idx="minor">
@@ -7887,13 +7685,13 @@
     <dgm:sp3d/>
     <dgm:txPr/>
     <dgm:style>
-      <a:lnRef idx="0">
+      <a:lnRef idx="2">
         <a:scrgbClr r="0" g="0" b="0"/>
       </a:lnRef>
       <a:fillRef idx="1">
         <a:scrgbClr r="0" g="0" b="0"/>
       </a:fillRef>
-      <a:effectRef idx="2">
+      <a:effectRef idx="0">
         <a:scrgbClr r="0" g="0" b="0"/>
       </a:effectRef>
       <a:fontRef idx="minor"/>
@@ -7907,13 +7705,13 @@
     <dgm:sp3d/>
     <dgm:txPr/>
     <dgm:style>
-      <a:lnRef idx="0">
+      <a:lnRef idx="2">
         <a:scrgbClr r="0" g="0" b="0"/>
       </a:lnRef>
       <a:fillRef idx="1">
         <a:scrgbClr r="0" g="0" b="0"/>
       </a:fillRef>
-      <a:effectRef idx="2">
+      <a:effectRef idx="0">
         <a:scrgbClr r="0" g="0" b="0"/>
       </a:effectRef>
       <a:fontRef idx="minor"/>
@@ -7927,13 +7725,13 @@
     <dgm:sp3d/>
     <dgm:txPr/>
     <dgm:style>
-      <a:lnRef idx="0">
+      <a:lnRef idx="2">
         <a:scrgbClr r="0" g="0" b="0"/>
       </a:lnRef>
       <a:fillRef idx="1">
         <a:scrgbClr r="0" g="0" b="0"/>
       </a:fillRef>
-      <a:effectRef idx="2">
+      <a:effectRef idx="0">
         <a:scrgbClr r="0" g="0" b="0"/>
       </a:effectRef>
       <a:fontRef idx="minor"/>
@@ -7950,10 +7748,10 @@
       <a:lnRef idx="0">
         <a:scrgbClr r="0" g="0" b="0"/>
       </a:lnRef>
-      <a:fillRef idx="3">
+      <a:fillRef idx="1">
         <a:scrgbClr r="0" g="0" b="0"/>
       </a:fillRef>
-      <a:effectRef idx="2">
+      <a:effectRef idx="0">
         <a:scrgbClr r="0" g="0" b="0"/>
       </a:effectRef>
       <a:fontRef idx="minor">
@@ -7972,10 +7770,10 @@
       <a:lnRef idx="0">
         <a:scrgbClr r="0" g="0" b="0"/>
       </a:lnRef>
-      <a:fillRef idx="3">
+      <a:fillRef idx="1">
         <a:scrgbClr r="0" g="0" b="0"/>
       </a:fillRef>
-      <a:effectRef idx="2">
+      <a:effectRef idx="0">
         <a:scrgbClr r="0" g="0" b="0"/>
       </a:effectRef>
       <a:fontRef idx="minor">
@@ -7994,10 +7792,10 @@
       <a:lnRef idx="0">
         <a:scrgbClr r="0" g="0" b="0"/>
       </a:lnRef>
-      <a:fillRef idx="3">
+      <a:fillRef idx="1">
         <a:scrgbClr r="0" g="0" b="0"/>
       </a:fillRef>
-      <a:effectRef idx="2">
+      <a:effectRef idx="0">
         <a:scrgbClr r="0" g="0" b="0"/>
       </a:effectRef>
       <a:fontRef idx="minor">
@@ -8039,7 +7837,7 @@
       <a:fillRef idx="1">
         <a:scrgbClr r="0" g="0" b="0"/>
       </a:fillRef>
-      <a:effectRef idx="1">
+      <a:effectRef idx="0">
         <a:scrgbClr r="0" g="0" b="0"/>
       </a:effectRef>
       <a:fontRef idx="minor"/>
@@ -8053,13 +7851,13 @@
     <dgm:sp3d/>
     <dgm:txPr/>
     <dgm:style>
-      <a:lnRef idx="0">
+      <a:lnRef idx="2">
         <a:scrgbClr r="0" g="0" b="0"/>
       </a:lnRef>
-      <a:fillRef idx="3">
+      <a:fillRef idx="1">
         <a:scrgbClr r="0" g="0" b="0"/>
       </a:fillRef>
-      <a:effectRef idx="2">
+      <a:effectRef idx="0">
         <a:scrgbClr r="0" g="0" b="0"/>
       </a:effectRef>
       <a:fontRef idx="minor">
@@ -8075,13 +7873,13 @@
     <dgm:sp3d/>
     <dgm:txPr/>
     <dgm:style>
-      <a:lnRef idx="0">
+      <a:lnRef idx="2">
         <a:scrgbClr r="0" g="0" b="0"/>
       </a:lnRef>
-      <a:fillRef idx="3">
+      <a:fillRef idx="1">
         <a:scrgbClr r="0" g="0" b="0"/>
       </a:fillRef>
-      <a:effectRef idx="2">
+      <a:effectRef idx="0">
         <a:scrgbClr r="0" g="0" b="0"/>
       </a:effectRef>
       <a:fontRef idx="minor">
@@ -8097,13 +7895,13 @@
     <dgm:sp3d/>
     <dgm:txPr/>
     <dgm:style>
-      <a:lnRef idx="0">
+      <a:lnRef idx="2">
         <a:scrgbClr r="0" g="0" b="0"/>
       </a:lnRef>
-      <a:fillRef idx="3">
+      <a:fillRef idx="1">
         <a:scrgbClr r="0" g="0" b="0"/>
       </a:fillRef>
-      <a:effectRef idx="2">
+      <a:effectRef idx="0">
         <a:scrgbClr r="0" g="0" b="0"/>
       </a:effectRef>
       <a:fontRef idx="minor">
@@ -8119,13 +7917,13 @@
     <dgm:sp3d/>
     <dgm:txPr/>
     <dgm:style>
-      <a:lnRef idx="0">
+      <a:lnRef idx="2">
         <a:scrgbClr r="0" g="0" b="0"/>
       </a:lnRef>
-      <a:fillRef idx="3">
+      <a:fillRef idx="1">
         <a:scrgbClr r="0" g="0" b="0"/>
       </a:fillRef>
-      <a:effectRef idx="2">
+      <a:effectRef idx="0">
         <a:scrgbClr r="0" g="0" b="0"/>
       </a:effectRef>
       <a:fontRef idx="minor">
@@ -8141,13 +7939,13 @@
     <dgm:sp3d/>
     <dgm:txPr/>
     <dgm:style>
-      <a:lnRef idx="0">
+      <a:lnRef idx="2">
         <a:scrgbClr r="0" g="0" b="0"/>
       </a:lnRef>
-      <a:fillRef idx="3">
+      <a:fillRef idx="1">
         <a:scrgbClr r="0" g="0" b="0"/>
       </a:fillRef>
-      <a:effectRef idx="2">
+      <a:effectRef idx="0">
         <a:scrgbClr r="0" g="0" b="0"/>
       </a:effectRef>
       <a:fontRef idx="minor">
@@ -8163,13 +7961,13 @@
     <dgm:sp3d/>
     <dgm:txPr/>
     <dgm:style>
-      <a:lnRef idx="0">
+      <a:lnRef idx="2">
         <a:scrgbClr r="0" g="0" b="0"/>
       </a:lnRef>
-      <a:fillRef idx="3">
+      <a:fillRef idx="1">
         <a:scrgbClr r="0" g="0" b="0"/>
       </a:fillRef>
-      <a:effectRef idx="2">
+      <a:effectRef idx="0">
         <a:scrgbClr r="0" g="0" b="0"/>
       </a:effectRef>
       <a:fontRef idx="minor">
@@ -8185,13 +7983,13 @@
     <dgm:sp3d/>
     <dgm:txPr/>
     <dgm:style>
-      <a:lnRef idx="0">
+      <a:lnRef idx="2">
         <a:scrgbClr r="0" g="0" b="0"/>
       </a:lnRef>
-      <a:fillRef idx="3">
+      <a:fillRef idx="1">
         <a:scrgbClr r="0" g="0" b="0"/>
       </a:fillRef>
-      <a:effectRef idx="2">
+      <a:effectRef idx="0">
         <a:scrgbClr r="0" g="0" b="0"/>
       </a:effectRef>
       <a:fontRef idx="minor">
@@ -8207,13 +8005,13 @@
     <dgm:sp3d/>
     <dgm:txPr/>
     <dgm:style>
-      <a:lnRef idx="1">
+      <a:lnRef idx="2">
         <a:scrgbClr r="0" g="0" b="0"/>
       </a:lnRef>
-      <a:fillRef idx="3">
+      <a:fillRef idx="1">
         <a:scrgbClr r="0" g="0" b="0"/>
       </a:fillRef>
-      <a:effectRef idx="2">
+      <a:effectRef idx="0">
         <a:scrgbClr r="0" g="0" b="0"/>
       </a:effectRef>
       <a:fontRef idx="minor">
@@ -8229,13 +8027,13 @@
     <dgm:sp3d/>
     <dgm:txPr/>
     <dgm:style>
-      <a:lnRef idx="1">
+      <a:lnRef idx="2">
         <a:scrgbClr r="0" g="0" b="0"/>
       </a:lnRef>
-      <a:fillRef idx="3">
+      <a:fillRef idx="1">
         <a:scrgbClr r="0" g="0" b="0"/>
       </a:fillRef>
-      <a:effectRef idx="2">
+      <a:effectRef idx="0">
         <a:scrgbClr r="0" g="0" b="0"/>
       </a:effectRef>
       <a:fontRef idx="minor">
@@ -8251,7 +8049,7 @@
     <dgm:sp3d/>
     <dgm:txPr/>
     <dgm:style>
-      <a:lnRef idx="1">
+      <a:lnRef idx="2">
         <a:scrgbClr r="0" g="0" b="0"/>
       </a:lnRef>
       <a:fillRef idx="0">
@@ -8271,7 +8069,7 @@
     <dgm:sp3d/>
     <dgm:txPr/>
     <dgm:style>
-      <a:lnRef idx="1">
+      <a:lnRef idx="2">
         <a:scrgbClr r="0" g="0" b="0"/>
       </a:lnRef>
       <a:fillRef idx="0">
@@ -8291,7 +8089,7 @@
     <dgm:sp3d/>
     <dgm:txPr/>
     <dgm:style>
-      <a:lnRef idx="1">
+      <a:lnRef idx="2">
         <a:scrgbClr r="0" g="0" b="0"/>
       </a:lnRef>
       <a:fillRef idx="0">
@@ -8311,7 +8109,7 @@
     <dgm:sp3d/>
     <dgm:txPr/>
     <dgm:style>
-      <a:lnRef idx="1">
+      <a:lnRef idx="2">
         <a:scrgbClr r="0" g="0" b="0"/>
       </a:lnRef>
       <a:fillRef idx="0">
@@ -8331,7 +8129,7 @@
     <dgm:sp3d/>
     <dgm:txPr/>
     <dgm:style>
-      <a:lnRef idx="1">
+      <a:lnRef idx="2">
         <a:scrgbClr r="0" g="0" b="0"/>
       </a:lnRef>
       <a:fillRef idx="1">
@@ -8351,7 +8149,7 @@
     <dgm:sp3d/>
     <dgm:txPr/>
     <dgm:style>
-      <a:lnRef idx="1">
+      <a:lnRef idx="2">
         <a:scrgbClr r="0" g="0" b="0"/>
       </a:lnRef>
       <a:fillRef idx="1">
@@ -8371,7 +8169,7 @@
     <dgm:sp3d/>
     <dgm:txPr/>
     <dgm:style>
-      <a:lnRef idx="1">
+      <a:lnRef idx="2">
         <a:scrgbClr r="0" g="0" b="0"/>
       </a:lnRef>
       <a:fillRef idx="1">
@@ -8411,7 +8209,7 @@
     <dgm:sp3d/>
     <dgm:txPr/>
     <dgm:style>
-      <a:lnRef idx="1">
+      <a:lnRef idx="2">
         <a:scrgbClr r="0" g="0" b="0"/>
       </a:lnRef>
       <a:fillRef idx="1">
@@ -8431,7 +8229,7 @@
     <dgm:sp3d/>
     <dgm:txPr/>
     <dgm:style>
-      <a:lnRef idx="1">
+      <a:lnRef idx="2">
         <a:scrgbClr r="0" g="0" b="0"/>
       </a:lnRef>
       <a:fillRef idx="1">
@@ -8451,7 +8249,7 @@
     <dgm:sp3d/>
     <dgm:txPr/>
     <dgm:style>
-      <a:lnRef idx="1">
+      <a:lnRef idx="2">
         <a:scrgbClr r="0" g="0" b="0"/>
       </a:lnRef>
       <a:fillRef idx="1">
@@ -8471,7 +8269,7 @@
     <dgm:sp3d/>
     <dgm:txPr/>
     <dgm:style>
-      <a:lnRef idx="1">
+      <a:lnRef idx="2">
         <a:scrgbClr r="0" g="0" b="0"/>
       </a:lnRef>
       <a:fillRef idx="1">
@@ -8491,7 +8289,7 @@
     <dgm:sp3d/>
     <dgm:txPr/>
     <dgm:style>
-      <a:lnRef idx="1">
+      <a:lnRef idx="2">
         <a:scrgbClr r="0" g="0" b="0"/>
       </a:lnRef>
       <a:fillRef idx="1">
@@ -8511,7 +8309,7 @@
     <dgm:sp3d/>
     <dgm:txPr/>
     <dgm:style>
-      <a:lnRef idx="1">
+      <a:lnRef idx="2">
         <a:scrgbClr r="0" g="0" b="0"/>
       </a:lnRef>
       <a:fillRef idx="1">
@@ -8531,7 +8329,7 @@
     <dgm:sp3d/>
     <dgm:txPr/>
     <dgm:style>
-      <a:lnRef idx="1">
+      <a:lnRef idx="2">
         <a:scrgbClr r="0" g="0" b="0"/>
       </a:lnRef>
       <a:fillRef idx="1">
@@ -8551,7 +8349,7 @@
     <dgm:sp3d/>
     <dgm:txPr/>
     <dgm:style>
-      <a:lnRef idx="1">
+      <a:lnRef idx="2">
         <a:scrgbClr r="0" g="0" b="0"/>
       </a:lnRef>
       <a:fillRef idx="1">
@@ -8571,7 +8369,7 @@
     <dgm:sp3d/>
     <dgm:txPr/>
     <dgm:style>
-      <a:lnRef idx="1">
+      <a:lnRef idx="2">
         <a:scrgbClr r="0" g="0" b="0"/>
       </a:lnRef>
       <a:fillRef idx="1">
@@ -8591,7 +8389,7 @@
     <dgm:sp3d/>
     <dgm:txPr/>
     <dgm:style>
-      <a:lnRef idx="1">
+      <a:lnRef idx="2">
         <a:scrgbClr r="0" g="0" b="0"/>
       </a:lnRef>
       <a:fillRef idx="1">
@@ -8611,7 +8409,7 @@
     <dgm:sp3d/>
     <dgm:txPr/>
     <dgm:style>
-      <a:lnRef idx="1">
+      <a:lnRef idx="2">
         <a:scrgbClr r="0" g="0" b="0"/>
       </a:lnRef>
       <a:fillRef idx="1">
@@ -8637,7 +8435,7 @@
       <a:fillRef idx="1">
         <a:scrgbClr r="0" g="0" b="0"/>
       </a:fillRef>
-      <a:effectRef idx="2">
+      <a:effectRef idx="0">
         <a:scrgbClr r="0" g="0" b="0"/>
       </a:effectRef>
       <a:fontRef idx="minor"/>
@@ -8657,7 +8455,7 @@
       <a:fillRef idx="1">
         <a:scrgbClr r="0" g="0" b="0"/>
       </a:fillRef>
-      <a:effectRef idx="2">
+      <a:effectRef idx="0">
         <a:scrgbClr r="0" g="0" b="0"/>
       </a:effectRef>
       <a:fontRef idx="minor"/>
@@ -8691,13 +8489,13 @@
     <dgm:sp3d/>
     <dgm:txPr/>
     <dgm:style>
-      <a:lnRef idx="0">
+      <a:lnRef idx="2">
         <a:scrgbClr r="0" g="0" b="0"/>
       </a:lnRef>
-      <a:fillRef idx="3">
+      <a:fillRef idx="1">
         <a:scrgbClr r="0" g="0" b="0"/>
       </a:fillRef>
-      <a:effectRef idx="2">
+      <a:effectRef idx="0">
         <a:scrgbClr r="0" g="0" b="0"/>
       </a:effectRef>
       <a:fontRef idx="minor"/>
@@ -8724,6 +8522,172 @@
     </dgm:style>
   </dgm:styleLbl>
 </dgm:styleDef>
+</file>
+
+<file path=ppt/handoutMasters/handoutMaster1.xml><?xml version="1.0" encoding="utf-8"?>
+<p:handoutMaster xmlns:a="http://schemas.openxmlformats.org/drawingml/2006/main" xmlns:r="http://schemas.openxmlformats.org/officeDocument/2006/relationships" xmlns:p="http://schemas.openxmlformats.org/presentationml/2006/main">
+  <p:cSld>
+    <p:bg>
+      <p:bgRef idx="1001">
+        <a:schemeClr val="bg1"/>
+      </p:bgRef>
+    </p:bg>
+    <p:spTree>
+      <p:nvGrpSpPr>
+        <p:cNvPr id="1" name=""/>
+        <p:cNvGrpSpPr/>
+        <p:nvPr/>
+      </p:nvGrpSpPr>
+      <p:grpSpPr>
+        <a:xfrm>
+          <a:off x="0" y="0"/>
+          <a:ext cx="0" cy="0"/>
+          <a:chOff x="0" y="0"/>
+          <a:chExt cx="0" cy="0"/>
+        </a:xfrm>
+      </p:grpSpPr>
+      <p:sp>
+        <p:nvSpPr>
+          <p:cNvPr id="2" name="Header Placeholder 1"/>
+          <p:cNvSpPr>
+            <a:spLocks noGrp="1"/>
+          </p:cNvSpPr>
+          <p:nvPr>
+            <p:ph type="hdr" sz="quarter"/>
+          </p:nvPr>
+        </p:nvSpPr>
+        <p:spPr>
+          <a:xfrm>
+            <a:off x="0" y="0"/>
+            <a:ext cx="2971800" cy="457200"/>
+          </a:xfrm>
+          <a:prstGeom prst="rect">
+            <a:avLst/>
+          </a:prstGeom>
+        </p:spPr>
+        <p:txBody>
+          <a:bodyPr vert="horz" lIns="91440" tIns="45720" rIns="91440" bIns="45720" rtlCol="0"/>
+          <a:lstStyle>
+            <a:lvl1pPr algn="l">
+              <a:defRPr sz="1200"/>
+            </a:lvl1pPr>
+          </a:lstStyle>
+          <a:p>
+            <a:endParaRPr lang="en-US"/>
+          </a:p>
+        </p:txBody>
+      </p:sp>
+      <p:sp>
+        <p:nvSpPr>
+          <p:cNvPr id="3" name="Date Placeholder 2"/>
+          <p:cNvSpPr>
+            <a:spLocks noGrp="1"/>
+          </p:cNvSpPr>
+          <p:nvPr>
+            <p:ph type="dt" sz="quarter" idx="1"/>
+          </p:nvPr>
+        </p:nvSpPr>
+        <p:spPr>
+          <a:xfrm>
+            <a:off x="3884613" y="0"/>
+            <a:ext cx="2971800" cy="457200"/>
+          </a:xfrm>
+          <a:prstGeom prst="rect">
+            <a:avLst/>
+          </a:prstGeom>
+        </p:spPr>
+        <p:txBody>
+          <a:bodyPr vert="horz" lIns="91440" tIns="45720" rIns="91440" bIns="45720" rtlCol="0"/>
+          <a:lstStyle>
+            <a:lvl1pPr algn="r">
+              <a:defRPr sz="1200"/>
+            </a:lvl1pPr>
+          </a:lstStyle>
+          <a:p>
+            <a:fld id="{4ADE9095-8D95-2E4A-BDAA-4AB265AB33DB}" type="datetimeFigureOut">
+              <a:rPr lang="en-US" smtClean="0"/>
+              <a:t>01.03.13</a:t>
+            </a:fld>
+            <a:endParaRPr lang="en-US"/>
+          </a:p>
+        </p:txBody>
+      </p:sp>
+      <p:sp>
+        <p:nvSpPr>
+          <p:cNvPr id="4" name="Footer Placeholder 3"/>
+          <p:cNvSpPr>
+            <a:spLocks noGrp="1"/>
+          </p:cNvSpPr>
+          <p:nvPr>
+            <p:ph type="ftr" sz="quarter" idx="2"/>
+          </p:nvPr>
+        </p:nvSpPr>
+        <p:spPr>
+          <a:xfrm>
+            <a:off x="0" y="8685213"/>
+            <a:ext cx="2971800" cy="457200"/>
+          </a:xfrm>
+          <a:prstGeom prst="rect">
+            <a:avLst/>
+          </a:prstGeom>
+        </p:spPr>
+        <p:txBody>
+          <a:bodyPr vert="horz" lIns="91440" tIns="45720" rIns="91440" bIns="45720" rtlCol="0" anchor="b"/>
+          <a:lstStyle>
+            <a:lvl1pPr algn="l">
+              <a:defRPr sz="1200"/>
+            </a:lvl1pPr>
+          </a:lstStyle>
+          <a:p>
+            <a:endParaRPr lang="en-US"/>
+          </a:p>
+        </p:txBody>
+      </p:sp>
+      <p:sp>
+        <p:nvSpPr>
+          <p:cNvPr id="5" name="Slide Number Placeholder 4"/>
+          <p:cNvSpPr>
+            <a:spLocks noGrp="1"/>
+          </p:cNvSpPr>
+          <p:nvPr>
+            <p:ph type="sldNum" sz="quarter" idx="3"/>
+          </p:nvPr>
+        </p:nvSpPr>
+        <p:spPr>
+          <a:xfrm>
+            <a:off x="3884613" y="8685213"/>
+            <a:ext cx="2971800" cy="457200"/>
+          </a:xfrm>
+          <a:prstGeom prst="rect">
+            <a:avLst/>
+          </a:prstGeom>
+        </p:spPr>
+        <p:txBody>
+          <a:bodyPr vert="horz" lIns="91440" tIns="45720" rIns="91440" bIns="45720" rtlCol="0" anchor="b"/>
+          <a:lstStyle>
+            <a:lvl1pPr algn="r">
+              <a:defRPr sz="1200"/>
+            </a:lvl1pPr>
+          </a:lstStyle>
+          <a:p>
+            <a:fld id="{0FAC8243-5291-9142-9343-3B2B2E0A1FB0}" type="slidenum">
+              <a:rPr lang="en-US" smtClean="0"/>
+              <a:t>‹#›</a:t>
+            </a:fld>
+            <a:endParaRPr lang="en-US"/>
+          </a:p>
+        </p:txBody>
+      </p:sp>
+    </p:spTree>
+    <p:extLst>
+      <p:ext uri="{BB962C8B-B14F-4D97-AF65-F5344CB8AC3E}">
+        <p14:creationId xmlns:p14="http://schemas.microsoft.com/office/powerpoint/2010/main" val="3900575335"/>
+      </p:ext>
+    </p:extLst>
+  </p:cSld>
+  <p:clrMap bg1="lt1" tx1="dk1" bg2="lt2" tx2="dk2" accent1="accent1" accent2="accent2" accent3="accent3" accent4="accent4" accent5="accent5" accent6="accent6" hlink="hlink" folHlink="folHlink"/>
+  <p:hf hdr="0" ftr="0" dt="0"/>
+</p:handoutMaster>
 </file>
 
 <file path=ppt/notesMasters/notesMaster1.xml><?xml version="1.0" encoding="utf-8"?>
@@ -8981,6 +8945,7 @@
     </p:extLst>
   </p:cSld>
   <p:clrMap bg1="lt1" tx1="dk1" bg2="lt2" tx2="dk2" accent1="accent1" accent2="accent2" accent3="accent3" accent4="accent4" accent5="accent5" accent6="accent6" hlink="hlink" folHlink="folHlink"/>
+  <p:hf hdr="0" ftr="0" dt="0"/>
   <p:notesStyle>
     <a:lvl1pPr marL="0" algn="l" defTabSz="457200" rtl="0" eaLnBrk="1" latinLnBrk="0" hangingPunct="1">
       <a:defRPr sz="1200" kern="1200">
@@ -10333,31 +10298,7 @@
                 <a:ea typeface="+mn-ea"/>
                 <a:cs typeface="+mn-cs"/>
               </a:rPr>
-              <a:t>Key </a:t>
-            </a:r>
-            <a:r>
-              <a:rPr lang="de-CH" sz="1200" kern="1200" dirty="0" smtClean="0">
-                <a:solidFill>
-                  <a:schemeClr val="tx1"/>
-                </a:solidFill>
-                <a:effectLst/>
-                <a:latin typeface="+mn-lt"/>
-                <a:ea typeface="+mn-ea"/>
-                <a:cs typeface="+mn-cs"/>
-              </a:rPr>
-              <a:t>Features </a:t>
-            </a:r>
-            <a:r>
-              <a:rPr lang="de-CH" sz="1200" kern="1200" dirty="0" smtClean="0">
-                <a:solidFill>
-                  <a:schemeClr val="tx1"/>
-                </a:solidFill>
-                <a:effectLst/>
-                <a:latin typeface="+mn-lt"/>
-                <a:ea typeface="+mn-ea"/>
-                <a:cs typeface="+mn-cs"/>
-              </a:rPr>
-              <a:t>implementiert</a:t>
+              <a:t>Key Features implementiert</a:t>
             </a:r>
             <a:endParaRPr lang="en-US" sz="1200" kern="1200" dirty="0" smtClean="0">
               <a:solidFill>
@@ -11042,9 +10983,8 @@
           <a:bodyPr/>
           <a:lstStyle/>
           <a:p>
-            <a:fld id="{7D0065BE-0657-4A47-90AD-C21C55E16B19}" type="datetime4">
-              <a:rPr lang="en-US" smtClean="0"/>
-              <a:pPr/>
+            <a:fld id="{16F47876-0941-0241-8A5A-06A9A210CC44}" type="datetime4">
+              <a:rPr lang="de-CH" smtClean="0"/>
               <a:t>March 1, 2013</a:t>
             </a:fld>
             <a:endParaRPr lang="en-US" dirty="0"/>
@@ -11209,9 +11149,8 @@
           <a:bodyPr/>
           <a:lstStyle/>
           <a:p>
-            <a:fld id="{A16C3AA4-67BE-44F7-809A-3582401494AF}" type="datetime4">
-              <a:rPr lang="en-US" smtClean="0"/>
-              <a:pPr/>
+            <a:fld id="{5E6AB3AE-A15D-E14A-B292-05047F6FADE5}" type="datetime4">
+              <a:rPr lang="de-CH" smtClean="0"/>
               <a:t>March 1, 2013</a:t>
             </a:fld>
             <a:endParaRPr lang="en-US"/>
@@ -11386,9 +11325,8 @@
           <a:bodyPr/>
           <a:lstStyle/>
           <a:p>
-            <a:fld id="{25172EEB-1769-4776-AD69-E7C1260563EB}" type="datetime4">
-              <a:rPr lang="en-US" smtClean="0"/>
-              <a:pPr/>
+            <a:fld id="{638551AD-53AF-404A-9692-48DD06DAC0B4}" type="datetime4">
+              <a:rPr lang="de-CH" smtClean="0"/>
               <a:t>March 1, 2013</a:t>
             </a:fld>
             <a:endParaRPr lang="en-US"/>
@@ -11553,9 +11491,8 @@
           <a:bodyPr/>
           <a:lstStyle/>
           <a:p>
-            <a:fld id="{D47BB8AF-C16A-4836-A92D-61834B5F0BA5}" type="datetime4">
-              <a:rPr lang="en-US" smtClean="0"/>
-              <a:pPr/>
+            <a:fld id="{B817203E-6123-8C43-B641-434523472744}" type="datetime4">
+              <a:rPr lang="de-CH" smtClean="0"/>
               <a:t>March 1, 2013</a:t>
             </a:fld>
             <a:endParaRPr lang="en-US"/>
@@ -12108,9 +12045,8 @@
           <a:bodyPr/>
           <a:lstStyle/>
           <a:p>
-            <a:fld id="{647D2193-4505-4A75-99BB-880C6989A757}" type="datetime4">
-              <a:rPr lang="en-US" smtClean="0"/>
-              <a:pPr/>
+            <a:fld id="{45541574-87CA-3C4D-B79C-57046F3FE935}" type="datetime4">
+              <a:rPr lang="de-CH" smtClean="0"/>
               <a:t>March 1, 2013</a:t>
             </a:fld>
             <a:endParaRPr lang="en-US"/>
@@ -12370,9 +12306,8 @@
           <a:bodyPr/>
           <a:lstStyle/>
           <a:p>
-            <a:fld id="{113A18F4-33C3-445B-924C-31108C51719C}" type="datetime4">
-              <a:rPr lang="en-US" smtClean="0"/>
-              <a:pPr/>
+            <a:fld id="{4466368C-F50E-5241-AB5C-0EA6DA873E25}" type="datetime4">
+              <a:rPr lang="de-CH" smtClean="0"/>
               <a:t>March 1, 2013</a:t>
             </a:fld>
             <a:endParaRPr lang="en-US"/>
@@ -12860,9 +12795,8 @@
           <a:bodyPr/>
           <a:lstStyle/>
           <a:p>
-            <a:fld id="{3AF7543A-E259-478F-9E0D-57BA40E442B7}" type="datetime4">
-              <a:rPr lang="en-US" smtClean="0"/>
-              <a:pPr/>
+            <a:fld id="{DE63CB30-8D6D-6949-B163-4EC0FD5CE42A}" type="datetime4">
+              <a:rPr lang="de-CH" smtClean="0"/>
               <a:t>March 1, 2013</a:t>
             </a:fld>
             <a:endParaRPr lang="en-US"/>
@@ -12975,9 +12909,8 @@
           <a:bodyPr/>
           <a:lstStyle/>
           <a:p>
-            <a:fld id="{1EFB012D-77A1-44B0-BB26-329BA1EE55C9}" type="datetime4">
-              <a:rPr lang="en-US" smtClean="0"/>
-              <a:pPr/>
+            <a:fld id="{1910BE72-1D1A-7C42-919A-9FFE2119BF96}" type="datetime4">
+              <a:rPr lang="de-CH" smtClean="0"/>
               <a:t>March 1, 2013</a:t>
             </a:fld>
             <a:endParaRPr lang="en-US"/>
@@ -13067,9 +13000,8 @@
           <a:bodyPr/>
           <a:lstStyle/>
           <a:p>
-            <a:fld id="{94B7499E-3031-413E-B01E-B94970708CAA}" type="datetime4">
-              <a:rPr lang="en-US" smtClean="0"/>
-              <a:pPr/>
+            <a:fld id="{07EAE902-DFF9-F64A-B966-EBE6735A125A}" type="datetime4">
+              <a:rPr lang="de-CH" smtClean="0"/>
               <a:t>March 1, 2013</a:t>
             </a:fld>
             <a:endParaRPr lang="en-US"/>
@@ -13499,9 +13431,8 @@
           <a:bodyPr/>
           <a:lstStyle/>
           <a:p>
-            <a:fld id="{DC7EAB0C-2220-4D0E-A0DD-DB7FA0F742F4}" type="datetime4">
-              <a:rPr lang="en-US" smtClean="0"/>
-              <a:pPr/>
+            <a:fld id="{DE550BBB-44C1-1C4A-B5F4-70B51574F314}" type="datetime4">
+              <a:rPr lang="de-CH" smtClean="0"/>
               <a:t>March 1, 2013</a:t>
             </a:fld>
             <a:endParaRPr lang="en-US"/>
@@ -14030,9 +13961,8 @@
           <a:bodyPr/>
           <a:lstStyle/>
           <a:p>
-            <a:fld id="{E3416D63-31BF-4B94-B6C5-E20B2C63F515}" type="datetime4">
-              <a:rPr lang="en-US" smtClean="0"/>
-              <a:pPr/>
+            <a:fld id="{DE1A5947-F2EB-6043-B477-E767B524A39F}" type="datetime4">
+              <a:rPr lang="de-CH" smtClean="0"/>
               <a:t>March 1, 2013</a:t>
             </a:fld>
             <a:endParaRPr lang="en-US"/>
@@ -14872,9 +14802,8 @@
             </a:lvl1pPr>
           </a:lstStyle>
           <a:p>
-            <a:fld id="{62B1B13E-D5AF-485E-81A1-82A140076526}" type="datetime4">
-              <a:rPr lang="en-US" smtClean="0"/>
-              <a:pPr/>
+            <a:fld id="{7C1F2182-4672-E844-B663-240A088E739E}" type="datetime4">
+              <a:rPr lang="de-CH" smtClean="0"/>
               <a:t>March 1, 2013</a:t>
             </a:fld>
             <a:endParaRPr lang="en-US" dirty="0"/>
@@ -14979,7 +14908,7 @@
     <p:sldLayoutId id="2147483658" r:id="rId10"/>
     <p:sldLayoutId id="2147483659" r:id="rId11"/>
   </p:sldLayoutIdLst>
-  <p:hf sldNum="0" hdr="0" ftr="0" dt="0"/>
+  <p:hf hdr="0" ftr="0"/>
   <p:txStyles>
     <p:titleStyle>
       <a:lvl1pPr algn="l" defTabSz="914400" rtl="0" eaLnBrk="1" latinLnBrk="0" hangingPunct="1">
@@ -15394,7 +15323,7 @@
             <p:ph idx="1"/>
             <p:extLst>
               <p:ext uri="{D42A27DB-BD31-4B8C-83A1-F6EECF244321}">
-                <p14:modId xmlns:p14="http://schemas.microsoft.com/office/powerpoint/2010/main" val="3788881194"/>
+                <p14:modId xmlns:p14="http://schemas.microsoft.com/office/powerpoint/2010/main" val="3988443331"/>
               </p:ext>
             </p:extLst>
           </p:nvPr>
@@ -15409,6 +15338,53 @@
           </a:graphicData>
         </a:graphic>
       </p:graphicFrame>
+      <p:sp>
+        <p:nvSpPr>
+          <p:cNvPr id="3" name="Date Placeholder 2"/>
+          <p:cNvSpPr>
+            <a:spLocks noGrp="1"/>
+          </p:cNvSpPr>
+          <p:nvPr>
+            <p:ph type="dt" sz="half" idx="10"/>
+          </p:nvPr>
+        </p:nvSpPr>
+        <p:spPr/>
+        <p:txBody>
+          <a:bodyPr/>
+          <a:lstStyle/>
+          <a:p>
+            <a:fld id="{D98CFB6C-3EC2-7E49-B9FB-45F565D5386F}" type="datetime4">
+              <a:rPr lang="de-CH" smtClean="0"/>
+              <a:t>March 1, 2013</a:t>
+            </a:fld>
+            <a:endParaRPr lang="en-US"/>
+          </a:p>
+        </p:txBody>
+      </p:sp>
+      <p:sp>
+        <p:nvSpPr>
+          <p:cNvPr id="5" name="Slide Number Placeholder 4"/>
+          <p:cNvSpPr>
+            <a:spLocks noGrp="1"/>
+          </p:cNvSpPr>
+          <p:nvPr>
+            <p:ph type="sldNum" sz="quarter" idx="12"/>
+          </p:nvPr>
+        </p:nvSpPr>
+        <p:spPr/>
+        <p:txBody>
+          <a:bodyPr/>
+          <a:lstStyle/>
+          <a:p>
+            <a:fld id="{2754ED01-E2A0-4C1E-8E21-014B99041579}" type="slidenum">
+              <a:rPr lang="en-US" smtClean="0"/>
+              <a:pPr/>
+              <a:t>10</a:t>
+            </a:fld>
+            <a:endParaRPr lang="en-US"/>
+          </a:p>
+        </p:txBody>
+      </p:sp>
     </p:spTree>
     <p:extLst>
       <p:ext uri="{BB962C8B-B14F-4D97-AF65-F5344CB8AC3E}">
@@ -15486,17 +15462,56 @@
           <a:p>
             <a:r>
               <a:rPr lang="en-US" dirty="0" smtClean="0"/>
-              <a:t>for the </a:t>
-            </a:r>
-            <a:r>
-              <a:rPr lang="en-US" dirty="0" err="1" smtClean="0"/>
-              <a:t>mhc-pms</a:t>
-            </a:r>
-            <a:r>
-              <a:rPr lang="en-US" dirty="0" smtClean="0"/>
-              <a:t> system</a:t>
+              <a:t>The good, the bad and the ugly</a:t>
             </a:r>
             <a:endParaRPr lang="en-US" dirty="0"/>
+          </a:p>
+        </p:txBody>
+      </p:sp>
+      <p:sp>
+        <p:nvSpPr>
+          <p:cNvPr id="4" name="Date Placeholder 3"/>
+          <p:cNvSpPr>
+            <a:spLocks noGrp="1"/>
+          </p:cNvSpPr>
+          <p:nvPr>
+            <p:ph type="dt" sz="half" idx="10"/>
+          </p:nvPr>
+        </p:nvSpPr>
+        <p:spPr/>
+        <p:txBody>
+          <a:bodyPr/>
+          <a:lstStyle/>
+          <a:p>
+            <a:fld id="{96B5C5A7-65A3-F649-B8B1-A95A1E68497C}" type="datetime4">
+              <a:rPr lang="de-CH" smtClean="0"/>
+              <a:t>March 1, 2013</a:t>
+            </a:fld>
+            <a:endParaRPr lang="en-US"/>
+          </a:p>
+        </p:txBody>
+      </p:sp>
+      <p:sp>
+        <p:nvSpPr>
+          <p:cNvPr id="5" name="Slide Number Placeholder 4"/>
+          <p:cNvSpPr>
+            <a:spLocks noGrp="1"/>
+          </p:cNvSpPr>
+          <p:nvPr>
+            <p:ph type="sldNum" sz="quarter" idx="12"/>
+          </p:nvPr>
+        </p:nvSpPr>
+        <p:spPr/>
+        <p:txBody>
+          <a:bodyPr/>
+          <a:lstStyle/>
+          <a:p>
+            <a:fld id="{2754ED01-E2A0-4C1E-8E21-014B99041579}" type="slidenum">
+              <a:rPr lang="en-US" smtClean="0"/>
+              <a:pPr/>
+              <a:t>2</a:t>
+            </a:fld>
+            <a:endParaRPr lang="en-US"/>
           </a:p>
         </p:txBody>
       </p:sp>
@@ -15624,7 +15639,15 @@
             </a:pPr>
             <a:r>
               <a:rPr lang="en-US" dirty="0" smtClean="0"/>
-              <a:t>Medical Records staff</a:t>
+              <a:t>Medical </a:t>
+            </a:r>
+            <a:r>
+              <a:rPr lang="en-US" dirty="0" smtClean="0"/>
+              <a:t>records </a:t>
+            </a:r>
+            <a:r>
+              <a:rPr lang="en-US" dirty="0" smtClean="0"/>
+              <a:t>staff</a:t>
             </a:r>
             <a:endParaRPr lang="en-US" dirty="0"/>
           </a:p>
@@ -15650,6 +15673,53 @@
               <a:t>target users</a:t>
             </a:r>
             <a:endParaRPr lang="en-US" dirty="0"/>
+          </a:p>
+        </p:txBody>
+      </p:sp>
+      <p:sp>
+        <p:nvSpPr>
+          <p:cNvPr id="5" name="Date Placeholder 4"/>
+          <p:cNvSpPr>
+            <a:spLocks noGrp="1"/>
+          </p:cNvSpPr>
+          <p:nvPr>
+            <p:ph type="dt" sz="half" idx="10"/>
+          </p:nvPr>
+        </p:nvSpPr>
+        <p:spPr/>
+        <p:txBody>
+          <a:bodyPr/>
+          <a:lstStyle/>
+          <a:p>
+            <a:fld id="{B2115797-395F-1A44-8AF8-CF8955C3BD8E}" type="datetime4">
+              <a:rPr lang="de-CH" smtClean="0"/>
+              <a:t>March 1, 2013</a:t>
+            </a:fld>
+            <a:endParaRPr lang="en-US"/>
+          </a:p>
+        </p:txBody>
+      </p:sp>
+      <p:sp>
+        <p:nvSpPr>
+          <p:cNvPr id="6" name="Slide Number Placeholder 5"/>
+          <p:cNvSpPr>
+            <a:spLocks noGrp="1"/>
+          </p:cNvSpPr>
+          <p:nvPr>
+            <p:ph type="sldNum" sz="quarter" idx="12"/>
+          </p:nvPr>
+        </p:nvSpPr>
+        <p:spPr/>
+        <p:txBody>
+          <a:bodyPr/>
+          <a:lstStyle/>
+          <a:p>
+            <a:fld id="{2754ED01-E2A0-4C1E-8E21-014B99041579}" type="slidenum">
+              <a:rPr lang="en-US" smtClean="0"/>
+              <a:pPr/>
+              <a:t>3</a:t>
+            </a:fld>
+            <a:endParaRPr lang="en-US"/>
           </a:p>
         </p:txBody>
       </p:sp>
@@ -15975,13 +16045,56 @@
           <a:p>
             <a:r>
               <a:rPr lang="en-US" dirty="0" smtClean="0"/>
-              <a:t>of </a:t>
-            </a:r>
-            <a:r>
-              <a:rPr lang="en-US" dirty="0" err="1" smtClean="0"/>
-              <a:t>mhc-pms</a:t>
+              <a:t>pew-pew</a:t>
             </a:r>
             <a:endParaRPr lang="en-US" dirty="0"/>
+          </a:p>
+        </p:txBody>
+      </p:sp>
+      <p:sp>
+        <p:nvSpPr>
+          <p:cNvPr id="2" name="Date Placeholder 1"/>
+          <p:cNvSpPr>
+            <a:spLocks noGrp="1"/>
+          </p:cNvSpPr>
+          <p:nvPr>
+            <p:ph type="dt" sz="half" idx="10"/>
+          </p:nvPr>
+        </p:nvSpPr>
+        <p:spPr/>
+        <p:txBody>
+          <a:bodyPr/>
+          <a:lstStyle/>
+          <a:p>
+            <a:fld id="{858B37B1-49E2-4F4B-B809-185B68706B3D}" type="datetime4">
+              <a:rPr lang="de-CH" smtClean="0"/>
+              <a:t>March 1, 2013</a:t>
+            </a:fld>
+            <a:endParaRPr lang="en-US"/>
+          </a:p>
+        </p:txBody>
+      </p:sp>
+      <p:sp>
+        <p:nvSpPr>
+          <p:cNvPr id="3" name="Slide Number Placeholder 2"/>
+          <p:cNvSpPr>
+            <a:spLocks noGrp="1"/>
+          </p:cNvSpPr>
+          <p:nvPr>
+            <p:ph type="sldNum" sz="quarter" idx="12"/>
+          </p:nvPr>
+        </p:nvSpPr>
+        <p:spPr/>
+        <p:txBody>
+          <a:bodyPr/>
+          <a:lstStyle/>
+          <a:p>
+            <a:fld id="{2754ED01-E2A0-4C1E-8E21-014B99041579}" type="slidenum">
+              <a:rPr lang="en-US" smtClean="0"/>
+              <a:pPr/>
+              <a:t>4</a:t>
+            </a:fld>
+            <a:endParaRPr lang="en-US"/>
           </a:p>
         </p:txBody>
       </p:sp>
@@ -16070,6 +16183,53 @@
           </a:graphicData>
         </a:graphic>
       </p:graphicFrame>
+      <p:sp>
+        <p:nvSpPr>
+          <p:cNvPr id="3" name="Date Placeholder 2"/>
+          <p:cNvSpPr>
+            <a:spLocks noGrp="1"/>
+          </p:cNvSpPr>
+          <p:nvPr>
+            <p:ph type="dt" sz="half" idx="10"/>
+          </p:nvPr>
+        </p:nvSpPr>
+        <p:spPr/>
+        <p:txBody>
+          <a:bodyPr/>
+          <a:lstStyle/>
+          <a:p>
+            <a:fld id="{AD926FB5-FD8E-1D43-9E0F-1FF4A13C334F}" type="datetime4">
+              <a:rPr lang="de-CH" smtClean="0"/>
+              <a:t>March 1, 2013</a:t>
+            </a:fld>
+            <a:endParaRPr lang="en-US"/>
+          </a:p>
+        </p:txBody>
+      </p:sp>
+      <p:sp>
+        <p:nvSpPr>
+          <p:cNvPr id="4" name="Slide Number Placeholder 3"/>
+          <p:cNvSpPr>
+            <a:spLocks noGrp="1"/>
+          </p:cNvSpPr>
+          <p:nvPr>
+            <p:ph type="sldNum" sz="quarter" idx="12"/>
+          </p:nvPr>
+        </p:nvSpPr>
+        <p:spPr/>
+        <p:txBody>
+          <a:bodyPr/>
+          <a:lstStyle/>
+          <a:p>
+            <a:fld id="{2754ED01-E2A0-4C1E-8E21-014B99041579}" type="slidenum">
+              <a:rPr lang="en-US" smtClean="0"/>
+              <a:pPr/>
+              <a:t>5</a:t>
+            </a:fld>
+            <a:endParaRPr lang="en-US"/>
+          </a:p>
+        </p:txBody>
+      </p:sp>
     </p:spTree>
     <p:extLst>
       <p:ext uri="{BB962C8B-B14F-4D97-AF65-F5344CB8AC3E}">
@@ -16220,9 +16380,56 @@
           <a:p>
             <a:r>
               <a:rPr lang="en-US" dirty="0" smtClean="0"/>
-              <a:t>CSF</a:t>
+              <a:t>TO BE OR NOT TO BE</a:t>
             </a:r>
             <a:endParaRPr lang="en-US" dirty="0"/>
+          </a:p>
+        </p:txBody>
+      </p:sp>
+      <p:sp>
+        <p:nvSpPr>
+          <p:cNvPr id="4" name="Date Placeholder 3"/>
+          <p:cNvSpPr>
+            <a:spLocks noGrp="1"/>
+          </p:cNvSpPr>
+          <p:nvPr>
+            <p:ph type="dt" sz="half" idx="10"/>
+          </p:nvPr>
+        </p:nvSpPr>
+        <p:spPr/>
+        <p:txBody>
+          <a:bodyPr/>
+          <a:lstStyle/>
+          <a:p>
+            <a:fld id="{D6E8315F-35C3-7F4F-9694-0E281EF2991F}" type="datetime4">
+              <a:rPr lang="de-CH" smtClean="0"/>
+              <a:t>March 1, 2013</a:t>
+            </a:fld>
+            <a:endParaRPr lang="en-US"/>
+          </a:p>
+        </p:txBody>
+      </p:sp>
+      <p:sp>
+        <p:nvSpPr>
+          <p:cNvPr id="5" name="Slide Number Placeholder 4"/>
+          <p:cNvSpPr>
+            <a:spLocks noGrp="1"/>
+          </p:cNvSpPr>
+          <p:nvPr>
+            <p:ph type="sldNum" sz="quarter" idx="12"/>
+          </p:nvPr>
+        </p:nvSpPr>
+        <p:spPr/>
+        <p:txBody>
+          <a:bodyPr/>
+          <a:lstStyle/>
+          <a:p>
+            <a:fld id="{2754ED01-E2A0-4C1E-8E21-014B99041579}" type="slidenum">
+              <a:rPr lang="en-US" smtClean="0"/>
+              <a:pPr/>
+              <a:t>6</a:t>
+            </a:fld>
+            <a:endParaRPr lang="en-US"/>
           </a:p>
         </p:txBody>
       </p:sp>
@@ -16311,6 +16518,53 @@
           </a:graphicData>
         </a:graphic>
       </p:graphicFrame>
+      <p:sp>
+        <p:nvSpPr>
+          <p:cNvPr id="3" name="Date Placeholder 2"/>
+          <p:cNvSpPr>
+            <a:spLocks noGrp="1"/>
+          </p:cNvSpPr>
+          <p:nvPr>
+            <p:ph type="dt" sz="half" idx="10"/>
+          </p:nvPr>
+        </p:nvSpPr>
+        <p:spPr/>
+        <p:txBody>
+          <a:bodyPr/>
+          <a:lstStyle/>
+          <a:p>
+            <a:fld id="{B6497199-FD7D-9C45-9E20-75AB0F824596}" type="datetime4">
+              <a:rPr lang="de-CH" smtClean="0"/>
+              <a:t>March 1, 2013</a:t>
+            </a:fld>
+            <a:endParaRPr lang="en-US"/>
+          </a:p>
+        </p:txBody>
+      </p:sp>
+      <p:sp>
+        <p:nvSpPr>
+          <p:cNvPr id="5" name="Slide Number Placeholder 4"/>
+          <p:cNvSpPr>
+            <a:spLocks noGrp="1"/>
+          </p:cNvSpPr>
+          <p:nvPr>
+            <p:ph type="sldNum" sz="quarter" idx="12"/>
+          </p:nvPr>
+        </p:nvSpPr>
+        <p:spPr/>
+        <p:txBody>
+          <a:bodyPr/>
+          <a:lstStyle/>
+          <a:p>
+            <a:fld id="{2754ED01-E2A0-4C1E-8E21-014B99041579}" type="slidenum">
+              <a:rPr lang="en-US" smtClean="0"/>
+              <a:pPr/>
+              <a:t>7</a:t>
+            </a:fld>
+            <a:endParaRPr lang="en-US"/>
+          </a:p>
+        </p:txBody>
+      </p:sp>
     </p:spTree>
     <p:extLst>
       <p:ext uri="{BB962C8B-B14F-4D97-AF65-F5344CB8AC3E}">
@@ -16461,9 +16715,56 @@
           <a:p>
             <a:r>
               <a:rPr lang="en-US" dirty="0" smtClean="0"/>
-              <a:t>Design decisions</a:t>
+              <a:t>harder, better, faster, stronger</a:t>
             </a:r>
             <a:endParaRPr lang="en-US" dirty="0"/>
+          </a:p>
+        </p:txBody>
+      </p:sp>
+      <p:sp>
+        <p:nvSpPr>
+          <p:cNvPr id="4" name="Date Placeholder 3"/>
+          <p:cNvSpPr>
+            <a:spLocks noGrp="1"/>
+          </p:cNvSpPr>
+          <p:nvPr>
+            <p:ph type="dt" sz="half" idx="10"/>
+          </p:nvPr>
+        </p:nvSpPr>
+        <p:spPr/>
+        <p:txBody>
+          <a:bodyPr/>
+          <a:lstStyle/>
+          <a:p>
+            <a:fld id="{69A9A449-98CB-C04C-8617-5BB9F619BB7B}" type="datetime4">
+              <a:rPr lang="de-CH" smtClean="0"/>
+              <a:t>March 1, 2013</a:t>
+            </a:fld>
+            <a:endParaRPr lang="en-US"/>
+          </a:p>
+        </p:txBody>
+      </p:sp>
+      <p:sp>
+        <p:nvSpPr>
+          <p:cNvPr id="5" name="Slide Number Placeholder 4"/>
+          <p:cNvSpPr>
+            <a:spLocks noGrp="1"/>
+          </p:cNvSpPr>
+          <p:nvPr>
+            <p:ph type="sldNum" sz="quarter" idx="12"/>
+          </p:nvPr>
+        </p:nvSpPr>
+        <p:spPr/>
+        <p:txBody>
+          <a:bodyPr/>
+          <a:lstStyle/>
+          <a:p>
+            <a:fld id="{2754ED01-E2A0-4C1E-8E21-014B99041579}" type="slidenum">
+              <a:rPr lang="en-US" smtClean="0"/>
+              <a:pPr/>
+              <a:t>8</a:t>
+            </a:fld>
+            <a:endParaRPr lang="en-US"/>
           </a:p>
         </p:txBody>
       </p:sp>
@@ -16596,10 +16897,53 @@
           <a:bodyPr/>
           <a:lstStyle/>
           <a:p>
-            <a:r>
-              <a:rPr lang="en-US" dirty="0" smtClean="0"/>
-              <a:t>Design Decisions</a:t>
-            </a:r>
+            <a:endParaRPr lang="en-US" dirty="0"/>
+          </a:p>
+        </p:txBody>
+      </p:sp>
+      <p:sp>
+        <p:nvSpPr>
+          <p:cNvPr id="3" name="Date Placeholder 2"/>
+          <p:cNvSpPr>
+            <a:spLocks noGrp="1"/>
+          </p:cNvSpPr>
+          <p:nvPr>
+            <p:ph type="dt" sz="half" idx="10"/>
+          </p:nvPr>
+        </p:nvSpPr>
+        <p:spPr/>
+        <p:txBody>
+          <a:bodyPr/>
+          <a:lstStyle/>
+          <a:p>
+            <a:fld id="{28EB666E-D7FF-8145-9E2C-293CA3B7C8B1}" type="datetime4">
+              <a:rPr lang="de-CH" smtClean="0"/>
+              <a:t>March 1, 2013</a:t>
+            </a:fld>
+            <a:endParaRPr lang="en-US"/>
+          </a:p>
+        </p:txBody>
+      </p:sp>
+      <p:sp>
+        <p:nvSpPr>
+          <p:cNvPr id="6" name="Slide Number Placeholder 5"/>
+          <p:cNvSpPr>
+            <a:spLocks noGrp="1"/>
+          </p:cNvSpPr>
+          <p:nvPr>
+            <p:ph type="sldNum" sz="quarter" idx="12"/>
+          </p:nvPr>
+        </p:nvSpPr>
+        <p:spPr/>
+        <p:txBody>
+          <a:bodyPr/>
+          <a:lstStyle/>
+          <a:p>
+            <a:fld id="{2754ED01-E2A0-4C1E-8E21-014B99041579}" type="slidenum">
+              <a:rPr lang="en-US" smtClean="0"/>
+              <a:pPr/>
+              <a:t>9</a:t>
+            </a:fld>
             <a:endParaRPr lang="en-US" dirty="0"/>
           </a:p>
         </p:txBody>
@@ -17218,4 +17562,324 @@
   </a:objectDefaults>
   <a:extraClrSchemeLst/>
 </a:theme>
+</file>
+
+<file path=ppt/theme/theme3.xml><?xml version="1.0" encoding="utf-8"?>
+<a:theme xmlns:a="http://schemas.openxmlformats.org/drawingml/2006/main" name="Office Theme">
+  <a:themeElements>
+    <a:clrScheme name="Office">
+      <a:dk1>
+        <a:sysClr val="windowText" lastClr="000000"/>
+      </a:dk1>
+      <a:lt1>
+        <a:sysClr val="window" lastClr="FFFFFF"/>
+      </a:lt1>
+      <a:dk2>
+        <a:srgbClr val="1F497D"/>
+      </a:dk2>
+      <a:lt2>
+        <a:srgbClr val="EEECE1"/>
+      </a:lt2>
+      <a:accent1>
+        <a:srgbClr val="4F81BD"/>
+      </a:accent1>
+      <a:accent2>
+        <a:srgbClr val="C0504D"/>
+      </a:accent2>
+      <a:accent3>
+        <a:srgbClr val="9BBB59"/>
+      </a:accent3>
+      <a:accent4>
+        <a:srgbClr val="8064A2"/>
+      </a:accent4>
+      <a:accent5>
+        <a:srgbClr val="4BACC6"/>
+      </a:accent5>
+      <a:accent6>
+        <a:srgbClr val="F79646"/>
+      </a:accent6>
+      <a:hlink>
+        <a:srgbClr val="0000FF"/>
+      </a:hlink>
+      <a:folHlink>
+        <a:srgbClr val="800080"/>
+      </a:folHlink>
+    </a:clrScheme>
+    <a:fontScheme name="Office">
+      <a:majorFont>
+        <a:latin typeface="Calibri"/>
+        <a:ea typeface=""/>
+        <a:cs typeface=""/>
+        <a:font script="Jpan" typeface="ＭＳ Ｐゴシック"/>
+        <a:font script="Hang" typeface="맑은 고딕"/>
+        <a:font script="Hans" typeface="宋体"/>
+        <a:font script="Hant" typeface="新細明體"/>
+        <a:font script="Arab" typeface="Times New Roman"/>
+        <a:font script="Hebr" typeface="Times New Roman"/>
+        <a:font script="Thai" typeface="Angsana New"/>
+        <a:font script="Ethi" typeface="Nyala"/>
+        <a:font script="Beng" typeface="Vrinda"/>
+        <a:font script="Gujr" typeface="Shruti"/>
+        <a:font script="Khmr" typeface="MoolBoran"/>
+        <a:font script="Knda" typeface="Tunga"/>
+        <a:font script="Guru" typeface="Raavi"/>
+        <a:font script="Cans" typeface="Euphemia"/>
+        <a:font script="Cher" typeface="Plantagenet Cherokee"/>
+        <a:font script="Yiii" typeface="Microsoft Yi Baiti"/>
+        <a:font script="Tibt" typeface="Microsoft Himalaya"/>
+        <a:font script="Thaa" typeface="MV Boli"/>
+        <a:font script="Deva" typeface="Mangal"/>
+        <a:font script="Telu" typeface="Gautami"/>
+        <a:font script="Taml" typeface="Latha"/>
+        <a:font script="Syrc" typeface="Estrangelo Edessa"/>
+        <a:font script="Orya" typeface="Kalinga"/>
+        <a:font script="Mlym" typeface="Kartika"/>
+        <a:font script="Laoo" typeface="DokChampa"/>
+        <a:font script="Sinh" typeface="Iskoola Pota"/>
+        <a:font script="Mong" typeface="Mongolian Baiti"/>
+        <a:font script="Viet" typeface="Times New Roman"/>
+        <a:font script="Uigh" typeface="Microsoft Uighur"/>
+        <a:font script="Geor" typeface="Sylfaen"/>
+      </a:majorFont>
+      <a:minorFont>
+        <a:latin typeface="Calibri"/>
+        <a:ea typeface=""/>
+        <a:cs typeface=""/>
+        <a:font script="Jpan" typeface="ＭＳ Ｐゴシック"/>
+        <a:font script="Hang" typeface="맑은 고딕"/>
+        <a:font script="Hans" typeface="宋体"/>
+        <a:font script="Hant" typeface="新細明體"/>
+        <a:font script="Arab" typeface="Arial"/>
+        <a:font script="Hebr" typeface="Arial"/>
+        <a:font script="Thai" typeface="Cordia New"/>
+        <a:font script="Ethi" typeface="Nyala"/>
+        <a:font script="Beng" typeface="Vrinda"/>
+        <a:font script="Gujr" typeface="Shruti"/>
+        <a:font script="Khmr" typeface="DaunPenh"/>
+        <a:font script="Knda" typeface="Tunga"/>
+        <a:font script="Guru" typeface="Raavi"/>
+        <a:font script="Cans" typeface="Euphemia"/>
+        <a:font script="Cher" typeface="Plantagenet Cherokee"/>
+        <a:font script="Yiii" typeface="Microsoft Yi Baiti"/>
+        <a:font script="Tibt" typeface="Microsoft Himalaya"/>
+        <a:font script="Thaa" typeface="MV Boli"/>
+        <a:font script="Deva" typeface="Mangal"/>
+        <a:font script="Telu" typeface="Gautami"/>
+        <a:font script="Taml" typeface="Latha"/>
+        <a:font script="Syrc" typeface="Estrangelo Edessa"/>
+        <a:font script="Orya" typeface="Kalinga"/>
+        <a:font script="Mlym" typeface="Kartika"/>
+        <a:font script="Laoo" typeface="DokChampa"/>
+        <a:font script="Sinh" typeface="Iskoola Pota"/>
+        <a:font script="Mong" typeface="Mongolian Baiti"/>
+        <a:font script="Viet" typeface="Arial"/>
+        <a:font script="Uigh" typeface="Microsoft Uighur"/>
+        <a:font script="Geor" typeface="Sylfaen"/>
+      </a:minorFont>
+    </a:fontScheme>
+    <a:fmtScheme name="Office">
+      <a:fillStyleLst>
+        <a:solidFill>
+          <a:schemeClr val="phClr"/>
+        </a:solidFill>
+        <a:gradFill rotWithShape="1">
+          <a:gsLst>
+            <a:gs pos="0">
+              <a:schemeClr val="phClr">
+                <a:tint val="50000"/>
+                <a:satMod val="300000"/>
+              </a:schemeClr>
+            </a:gs>
+            <a:gs pos="35000">
+              <a:schemeClr val="phClr">
+                <a:tint val="37000"/>
+                <a:satMod val="300000"/>
+              </a:schemeClr>
+            </a:gs>
+            <a:gs pos="100000">
+              <a:schemeClr val="phClr">
+                <a:tint val="15000"/>
+                <a:satMod val="350000"/>
+              </a:schemeClr>
+            </a:gs>
+          </a:gsLst>
+          <a:lin ang="16200000" scaled="1"/>
+        </a:gradFill>
+        <a:gradFill rotWithShape="1">
+          <a:gsLst>
+            <a:gs pos="0">
+              <a:schemeClr val="phClr">
+                <a:tint val="100000"/>
+                <a:shade val="100000"/>
+                <a:satMod val="130000"/>
+              </a:schemeClr>
+            </a:gs>
+            <a:gs pos="100000">
+              <a:schemeClr val="phClr">
+                <a:tint val="50000"/>
+                <a:shade val="100000"/>
+                <a:satMod val="350000"/>
+              </a:schemeClr>
+            </a:gs>
+          </a:gsLst>
+          <a:lin ang="16200000" scaled="0"/>
+        </a:gradFill>
+      </a:fillStyleLst>
+      <a:lnStyleLst>
+        <a:ln w="9525" cap="flat" cmpd="sng" algn="ctr">
+          <a:solidFill>
+            <a:schemeClr val="phClr">
+              <a:shade val="95000"/>
+              <a:satMod val="105000"/>
+            </a:schemeClr>
+          </a:solidFill>
+          <a:prstDash val="solid"/>
+        </a:ln>
+        <a:ln w="25400" cap="flat" cmpd="sng" algn="ctr">
+          <a:solidFill>
+            <a:schemeClr val="phClr"/>
+          </a:solidFill>
+          <a:prstDash val="solid"/>
+        </a:ln>
+        <a:ln w="38100" cap="flat" cmpd="sng" algn="ctr">
+          <a:solidFill>
+            <a:schemeClr val="phClr"/>
+          </a:solidFill>
+          <a:prstDash val="solid"/>
+        </a:ln>
+      </a:lnStyleLst>
+      <a:effectStyleLst>
+        <a:effectStyle>
+          <a:effectLst>
+            <a:outerShdw blurRad="40000" dist="20000" dir="5400000" rotWithShape="0">
+              <a:srgbClr val="000000">
+                <a:alpha val="38000"/>
+              </a:srgbClr>
+            </a:outerShdw>
+          </a:effectLst>
+        </a:effectStyle>
+        <a:effectStyle>
+          <a:effectLst>
+            <a:outerShdw blurRad="40000" dist="23000" dir="5400000" rotWithShape="0">
+              <a:srgbClr val="000000">
+                <a:alpha val="35000"/>
+              </a:srgbClr>
+            </a:outerShdw>
+          </a:effectLst>
+        </a:effectStyle>
+        <a:effectStyle>
+          <a:effectLst>
+            <a:outerShdw blurRad="40000" dist="23000" dir="5400000" rotWithShape="0">
+              <a:srgbClr val="000000">
+                <a:alpha val="35000"/>
+              </a:srgbClr>
+            </a:outerShdw>
+          </a:effectLst>
+          <a:scene3d>
+            <a:camera prst="orthographicFront">
+              <a:rot lat="0" lon="0" rev="0"/>
+            </a:camera>
+            <a:lightRig rig="threePt" dir="t">
+              <a:rot lat="0" lon="0" rev="1200000"/>
+            </a:lightRig>
+          </a:scene3d>
+          <a:sp3d>
+            <a:bevelT w="63500" h="25400"/>
+          </a:sp3d>
+        </a:effectStyle>
+      </a:effectStyleLst>
+      <a:bgFillStyleLst>
+        <a:solidFill>
+          <a:schemeClr val="phClr"/>
+        </a:solidFill>
+        <a:gradFill rotWithShape="1">
+          <a:gsLst>
+            <a:gs pos="0">
+              <a:schemeClr val="phClr">
+                <a:tint val="40000"/>
+                <a:satMod val="350000"/>
+              </a:schemeClr>
+            </a:gs>
+            <a:gs pos="40000">
+              <a:schemeClr val="phClr">
+                <a:tint val="45000"/>
+                <a:shade val="99000"/>
+                <a:satMod val="350000"/>
+              </a:schemeClr>
+            </a:gs>
+            <a:gs pos="100000">
+              <a:schemeClr val="phClr">
+                <a:shade val="20000"/>
+                <a:satMod val="255000"/>
+              </a:schemeClr>
+            </a:gs>
+          </a:gsLst>
+          <a:path path="circle">
+            <a:fillToRect l="50000" t="-80000" r="50000" b="180000"/>
+          </a:path>
+        </a:gradFill>
+        <a:gradFill rotWithShape="1">
+          <a:gsLst>
+            <a:gs pos="0">
+              <a:schemeClr val="phClr">
+                <a:tint val="80000"/>
+                <a:satMod val="300000"/>
+              </a:schemeClr>
+            </a:gs>
+            <a:gs pos="100000">
+              <a:schemeClr val="phClr">
+                <a:shade val="30000"/>
+                <a:satMod val="200000"/>
+              </a:schemeClr>
+            </a:gs>
+          </a:gsLst>
+          <a:path path="circle">
+            <a:fillToRect l="50000" t="50000" r="50000" b="50000"/>
+          </a:path>
+        </a:gradFill>
+      </a:bgFillStyleLst>
+    </a:fmtScheme>
+  </a:themeElements>
+  <a:objectDefaults>
+    <a:spDef>
+      <a:spPr/>
+      <a:bodyPr/>
+      <a:lstStyle/>
+      <a:style>
+        <a:lnRef idx="1">
+          <a:schemeClr val="accent1"/>
+        </a:lnRef>
+        <a:fillRef idx="3">
+          <a:schemeClr val="accent1"/>
+        </a:fillRef>
+        <a:effectRef idx="2">
+          <a:schemeClr val="accent1"/>
+        </a:effectRef>
+        <a:fontRef idx="minor">
+          <a:schemeClr val="lt1"/>
+        </a:fontRef>
+      </a:style>
+    </a:spDef>
+    <a:lnDef>
+      <a:spPr/>
+      <a:bodyPr/>
+      <a:lstStyle/>
+      <a:style>
+        <a:lnRef idx="2">
+          <a:schemeClr val="accent1"/>
+        </a:lnRef>
+        <a:fillRef idx="0">
+          <a:schemeClr val="accent1"/>
+        </a:fillRef>
+        <a:effectRef idx="1">
+          <a:schemeClr val="accent1"/>
+        </a:effectRef>
+        <a:fontRef idx="minor">
+          <a:schemeClr val="tx1"/>
+        </a:fontRef>
+      </a:style>
+    </a:lnDef>
+  </a:objectDefaults>
+  <a:extraClrSchemeLst/>
+</a:theme>
 </file>
</xml_diff>